<commit_message>
Agregre la portada de la ppt
</commit_message>
<xml_diff>
--- a/PrimerAvance/APFP-FirstDraft.pptx
+++ b/PrimerAvance/APFP-FirstDraft.pptx
@@ -104,6 +104,11 @@
       </a:defRPr>
     </a:lvl9pPr>
   </p:defaultTextStyle>
+  <p:extLst>
+    <p:ext uri="{EFAFB233-063F-42B5-8137-9DF3F51BA10A}">
+      <p15:sldGuideLst xmlns:p15="http://schemas.microsoft.com/office/powerpoint/2012/main"/>
+    </p:ext>
+  </p:extLst>
 </p:presentation>
 </file>
 
@@ -3002,6 +3007,36 @@
           </a:p>
         </p:txBody>
       </p:sp>
+      <p:pic>
+        <p:nvPicPr>
+          <p:cNvPr id="4" name="Imagen 3"/>
+          <p:cNvPicPr>
+            <a:picLocks noChangeAspect="1"/>
+          </p:cNvPicPr>
+          <p:nvPr/>
+        </p:nvPicPr>
+        <p:blipFill>
+          <a:blip r:embed="rId2" cstate="print">
+            <a:extLst>
+              <a:ext uri="{28A0092B-C50C-407E-A947-70E740481C1C}">
+                <a14:useLocalDpi xmlns:a14="http://schemas.microsoft.com/office/drawing/2010/main" val="0"/>
+              </a:ext>
+            </a:extLst>
+          </a:blip>
+          <a:stretch>
+            <a:fillRect/>
+          </a:stretch>
+        </p:blipFill>
+        <p:spPr>
+          <a:xfrm>
+            <a:off x="0" y="0"/>
+            <a:ext cx="12186080" cy="6858000"/>
+          </a:xfrm>
+          <a:prstGeom prst="rect">
+            <a:avLst/>
+          </a:prstGeom>
+        </p:spPr>
+      </p:pic>
     </p:spTree>
     <p:extLst>
       <p:ext uri="{BB962C8B-B14F-4D97-AF65-F5344CB8AC3E}">

</xml_diff>

<commit_message>
Avance de PPT de presentación Avance
</commit_message>
<xml_diff>
--- a/PrimerAvance/APFP-FirstDraft.pptx
+++ b/PrimerAvance/APFP-FirstDraft.pptx
@@ -6,6 +6,11 @@
   </p:sldMasterIdLst>
   <p:sldIdLst>
     <p:sldId id="256" r:id="rId2"/>
+    <p:sldId id="258" r:id="rId3"/>
+    <p:sldId id="257" r:id="rId4"/>
+    <p:sldId id="259" r:id="rId5"/>
+    <p:sldId id="260" r:id="rId6"/>
+    <p:sldId id="261" r:id="rId7"/>
   </p:sldIdLst>
   <p:sldSz cx="12192000" cy="6858000"/>
   <p:notesSz cx="6858000" cy="9144000"/>
@@ -243,7 +248,7 @@
           <a:p>
             <a:fld id="{68AF8111-4F1B-4764-B218-CEDF602AB2D0}" type="datetimeFigureOut">
               <a:rPr lang="es-ES" smtClean="0"/>
-              <a:t>25/06/2019</a:t>
+              <a:t>26/06/2019</a:t>
             </a:fld>
             <a:endParaRPr lang="es-ES"/>
           </a:p>
@@ -413,7 +418,7 @@
           <a:p>
             <a:fld id="{68AF8111-4F1B-4764-B218-CEDF602AB2D0}" type="datetimeFigureOut">
               <a:rPr lang="es-ES" smtClean="0"/>
-              <a:t>25/06/2019</a:t>
+              <a:t>26/06/2019</a:t>
             </a:fld>
             <a:endParaRPr lang="es-ES"/>
           </a:p>
@@ -593,7 +598,7 @@
           <a:p>
             <a:fld id="{68AF8111-4F1B-4764-B218-CEDF602AB2D0}" type="datetimeFigureOut">
               <a:rPr lang="es-ES" smtClean="0"/>
-              <a:t>25/06/2019</a:t>
+              <a:t>26/06/2019</a:t>
             </a:fld>
             <a:endParaRPr lang="es-ES"/>
           </a:p>
@@ -763,7 +768,7 @@
           <a:p>
             <a:fld id="{68AF8111-4F1B-4764-B218-CEDF602AB2D0}" type="datetimeFigureOut">
               <a:rPr lang="es-ES" smtClean="0"/>
-              <a:t>25/06/2019</a:t>
+              <a:t>26/06/2019</a:t>
             </a:fld>
             <a:endParaRPr lang="es-ES"/>
           </a:p>
@@ -1009,7 +1014,7 @@
           <a:p>
             <a:fld id="{68AF8111-4F1B-4764-B218-CEDF602AB2D0}" type="datetimeFigureOut">
               <a:rPr lang="es-ES" smtClean="0"/>
-              <a:t>25/06/2019</a:t>
+              <a:t>26/06/2019</a:t>
             </a:fld>
             <a:endParaRPr lang="es-ES"/>
           </a:p>
@@ -1241,7 +1246,7 @@
           <a:p>
             <a:fld id="{68AF8111-4F1B-4764-B218-CEDF602AB2D0}" type="datetimeFigureOut">
               <a:rPr lang="es-ES" smtClean="0"/>
-              <a:t>25/06/2019</a:t>
+              <a:t>26/06/2019</a:t>
             </a:fld>
             <a:endParaRPr lang="es-ES"/>
           </a:p>
@@ -1608,7 +1613,7 @@
           <a:p>
             <a:fld id="{68AF8111-4F1B-4764-B218-CEDF602AB2D0}" type="datetimeFigureOut">
               <a:rPr lang="es-ES" smtClean="0"/>
-              <a:t>25/06/2019</a:t>
+              <a:t>26/06/2019</a:t>
             </a:fld>
             <a:endParaRPr lang="es-ES"/>
           </a:p>
@@ -1726,7 +1731,7 @@
           <a:p>
             <a:fld id="{68AF8111-4F1B-4764-B218-CEDF602AB2D0}" type="datetimeFigureOut">
               <a:rPr lang="es-ES" smtClean="0"/>
-              <a:t>25/06/2019</a:t>
+              <a:t>26/06/2019</a:t>
             </a:fld>
             <a:endParaRPr lang="es-ES"/>
           </a:p>
@@ -1821,7 +1826,7 @@
           <a:p>
             <a:fld id="{68AF8111-4F1B-4764-B218-CEDF602AB2D0}" type="datetimeFigureOut">
               <a:rPr lang="es-ES" smtClean="0"/>
-              <a:t>25/06/2019</a:t>
+              <a:t>26/06/2019</a:t>
             </a:fld>
             <a:endParaRPr lang="es-ES"/>
           </a:p>
@@ -2098,7 +2103,7 @@
           <a:p>
             <a:fld id="{68AF8111-4F1B-4764-B218-CEDF602AB2D0}" type="datetimeFigureOut">
               <a:rPr lang="es-ES" smtClean="0"/>
-              <a:t>25/06/2019</a:t>
+              <a:t>26/06/2019</a:t>
             </a:fld>
             <a:endParaRPr lang="es-ES"/>
           </a:p>
@@ -2351,7 +2356,7 @@
           <a:p>
             <a:fld id="{68AF8111-4F1B-4764-B218-CEDF602AB2D0}" type="datetimeFigureOut">
               <a:rPr lang="es-ES" smtClean="0"/>
-              <a:t>25/06/2019</a:t>
+              <a:t>26/06/2019</a:t>
             </a:fld>
             <a:endParaRPr lang="es-ES"/>
           </a:p>
@@ -2416,9 +2421,18 @@
 <p:sldMaster xmlns:a="http://schemas.openxmlformats.org/drawingml/2006/main" xmlns:r="http://schemas.openxmlformats.org/officeDocument/2006/relationships" xmlns:p="http://schemas.openxmlformats.org/presentationml/2006/main">
   <p:cSld>
     <p:bg>
-      <p:bgRef idx="1001">
-        <a:schemeClr val="bg1"/>
-      </p:bgRef>
+      <p:bgPr>
+        <a:blipFill dpi="0" rotWithShape="1">
+          <a:blip r:embed="rId13">
+            <a:lum/>
+          </a:blip>
+          <a:srcRect/>
+          <a:stretch>
+            <a:fillRect/>
+          </a:stretch>
+        </a:blipFill>
+        <a:effectLst/>
+      </p:bgPr>
     </p:bg>
     <p:spTree>
       <p:nvGrpSpPr>
@@ -2564,7 +2578,7 @@
           <a:p>
             <a:fld id="{68AF8111-4F1B-4764-B218-CEDF602AB2D0}" type="datetimeFigureOut">
               <a:rPr lang="es-ES" smtClean="0"/>
-              <a:t>25/06/2019</a:t>
+              <a:t>26/06/2019</a:t>
             </a:fld>
             <a:endParaRPr lang="es-ES"/>
           </a:p>
@@ -3047,6 +3061,2012 @@
   <p:clrMapOvr>
     <a:masterClrMapping/>
   </p:clrMapOvr>
+  <p:timing>
+    <p:tnLst>
+      <p:par>
+        <p:cTn id="1" dur="indefinite" restart="never" nodeType="tmRoot"/>
+      </p:par>
+    </p:tnLst>
+  </p:timing>
+</p:sld>
+</file>
+
+<file path=ppt/slides/slide2.xml><?xml version="1.0" encoding="utf-8"?>
+<p:sld xmlns:a="http://schemas.openxmlformats.org/drawingml/2006/main" xmlns:r="http://schemas.openxmlformats.org/officeDocument/2006/relationships" xmlns:p="http://schemas.openxmlformats.org/presentationml/2006/main">
+  <p:cSld>
+    <p:spTree>
+      <p:nvGrpSpPr>
+        <p:cNvPr id="1" name=""/>
+        <p:cNvGrpSpPr/>
+        <p:nvPr/>
+      </p:nvGrpSpPr>
+      <p:grpSpPr>
+        <a:xfrm>
+          <a:off x="0" y="0"/>
+          <a:ext cx="0" cy="0"/>
+          <a:chOff x="0" y="0"/>
+          <a:chExt cx="0" cy="0"/>
+        </a:xfrm>
+      </p:grpSpPr>
+      <p:sp>
+        <p:nvSpPr>
+          <p:cNvPr id="2" name="Título 1"/>
+          <p:cNvSpPr>
+            <a:spLocks noGrp="1"/>
+          </p:cNvSpPr>
+          <p:nvPr>
+            <p:ph type="title"/>
+          </p:nvPr>
+        </p:nvSpPr>
+        <p:spPr/>
+        <p:txBody>
+          <a:bodyPr>
+            <a:normAutofit/>
+          </a:bodyPr>
+          <a:lstStyle/>
+          <a:p>
+            <a:r>
+              <a:rPr lang="es-PE" sz="4800" b="1" dirty="0" smtClean="0">
+                <a:solidFill>
+                  <a:schemeClr val="accent2">
+                    <a:lumMod val="50000"/>
+                  </a:schemeClr>
+                </a:solidFill>
+              </a:rPr>
+              <a:t>DESCRIPCIÓN DEL APLICATIVO</a:t>
+            </a:r>
+            <a:endParaRPr lang="es-ES" sz="4800" b="1" dirty="0">
+              <a:solidFill>
+                <a:schemeClr val="accent2">
+                  <a:lumMod val="50000"/>
+                </a:schemeClr>
+              </a:solidFill>
+            </a:endParaRPr>
+          </a:p>
+        </p:txBody>
+      </p:sp>
+      <p:sp>
+        <p:nvSpPr>
+          <p:cNvPr id="3" name="Marcador de contenido 2"/>
+          <p:cNvSpPr>
+            <a:spLocks noGrp="1"/>
+          </p:cNvSpPr>
+          <p:nvPr>
+            <p:ph idx="1"/>
+          </p:nvPr>
+        </p:nvSpPr>
+        <p:spPr>
+          <a:xfrm>
+            <a:off x="838200" y="2193059"/>
+            <a:ext cx="10515600" cy="4351338"/>
+          </a:xfrm>
+        </p:spPr>
+        <p:txBody>
+          <a:bodyPr>
+            <a:normAutofit/>
+          </a:bodyPr>
+          <a:lstStyle/>
+          <a:p>
+            <a:pPr marL="0" indent="0">
+              <a:buNone/>
+            </a:pPr>
+            <a:r>
+              <a:rPr lang="es-PE" sz="4000" b="1" dirty="0" smtClean="0">
+                <a:solidFill>
+                  <a:srgbClr val="FF0000"/>
+                </a:solidFill>
+              </a:rPr>
+              <a:t>Problema: </a:t>
+            </a:r>
+            <a:r>
+              <a:rPr lang="es-PE" sz="3200" dirty="0" smtClean="0"/>
+              <a:t>Incidencias diarias en las estaciones del tren eléctrico, tales como congestión, largas colas, recargas de tarjetas, horarios de llegada de tren.</a:t>
+            </a:r>
+            <a:endParaRPr lang="es-PE" dirty="0"/>
+          </a:p>
+          <a:p>
+            <a:pPr marL="0" indent="0">
+              <a:buNone/>
+            </a:pPr>
+            <a:r>
+              <a:rPr lang="es-PE" sz="4000" b="1" dirty="0" smtClean="0">
+                <a:solidFill>
+                  <a:srgbClr val="00B050"/>
+                </a:solidFill>
+              </a:rPr>
+              <a:t>Motivación: </a:t>
+            </a:r>
+            <a:r>
+              <a:rPr lang="es-PE" sz="3200" dirty="0" smtClean="0"/>
+              <a:t>Poder crear un sistema que solucione estos incidentes, donde el usuario pueda </a:t>
+            </a:r>
+            <a:r>
+              <a:rPr lang="es-ES" sz="3200" dirty="0" smtClean="0"/>
+              <a:t>consultar </a:t>
+            </a:r>
+            <a:r>
+              <a:rPr lang="es-ES" sz="3200" dirty="0"/>
+              <a:t>los horarios del sistema, el saldo que tienen en sus tarjetas afiliadas, mantenerse informados en tiempo real sobre novedades e incidencias en el servicio, entre otros beneficios.</a:t>
+            </a:r>
+            <a:endParaRPr lang="es-ES" sz="3200" dirty="0"/>
+          </a:p>
+        </p:txBody>
+      </p:sp>
+      <p:sp>
+        <p:nvSpPr>
+          <p:cNvPr id="4" name="CuadroTexto 3"/>
+          <p:cNvSpPr txBox="1"/>
+          <p:nvPr/>
+        </p:nvSpPr>
+        <p:spPr>
+          <a:xfrm>
+            <a:off x="988291" y="1385455"/>
+            <a:ext cx="10021454" cy="707886"/>
+          </a:xfrm>
+          <a:prstGeom prst="rect">
+            <a:avLst/>
+          </a:prstGeom>
+        </p:spPr>
+        <p:style>
+          <a:lnRef idx="2">
+            <a:schemeClr val="accent5">
+              <a:shade val="50000"/>
+            </a:schemeClr>
+          </a:lnRef>
+          <a:fillRef idx="1">
+            <a:schemeClr val="accent5"/>
+          </a:fillRef>
+          <a:effectRef idx="0">
+            <a:schemeClr val="accent5"/>
+          </a:effectRef>
+          <a:fontRef idx="minor">
+            <a:schemeClr val="lt1"/>
+          </a:fontRef>
+        </p:style>
+        <p:txBody>
+          <a:bodyPr wrap="square" rtlCol="0">
+            <a:spAutoFit/>
+          </a:bodyPr>
+          <a:lstStyle/>
+          <a:p>
+            <a:r>
+              <a:rPr lang="es-PE" sz="2000" dirty="0" smtClean="0"/>
+              <a:t>Nuestro sistema consta de un aplicativo que consta de envío de incidencias, donde el usuario coloca sus nombres, la incidencia, fecha y hora, estación de tren de la incidencia.</a:t>
+            </a:r>
+            <a:endParaRPr lang="es-ES" sz="2000" dirty="0"/>
+          </a:p>
+        </p:txBody>
+      </p:sp>
+    </p:spTree>
+    <p:extLst>
+      <p:ext uri="{BB962C8B-B14F-4D97-AF65-F5344CB8AC3E}">
+        <p14:creationId xmlns:p14="http://schemas.microsoft.com/office/powerpoint/2010/main" val="1544225582"/>
+      </p:ext>
+    </p:extLst>
+  </p:cSld>
+  <p:clrMapOvr>
+    <a:masterClrMapping/>
+  </p:clrMapOvr>
+  <p:timing>
+    <p:tnLst>
+      <p:par>
+        <p:cTn id="1" dur="indefinite" restart="never" nodeType="tmRoot"/>
+      </p:par>
+    </p:tnLst>
+  </p:timing>
+</p:sld>
+</file>
+
+<file path=ppt/slides/slide3.xml><?xml version="1.0" encoding="utf-8"?>
+<p:sld xmlns:a="http://schemas.openxmlformats.org/drawingml/2006/main" xmlns:r="http://schemas.openxmlformats.org/officeDocument/2006/relationships" xmlns:p="http://schemas.openxmlformats.org/presentationml/2006/main">
+  <p:cSld>
+    <p:spTree>
+      <p:nvGrpSpPr>
+        <p:cNvPr id="1" name=""/>
+        <p:cNvGrpSpPr/>
+        <p:nvPr/>
+      </p:nvGrpSpPr>
+      <p:grpSpPr>
+        <a:xfrm>
+          <a:off x="0" y="0"/>
+          <a:ext cx="0" cy="0"/>
+          <a:chOff x="0" y="0"/>
+          <a:chExt cx="0" cy="0"/>
+        </a:xfrm>
+      </p:grpSpPr>
+      <p:sp>
+        <p:nvSpPr>
+          <p:cNvPr id="6" name="Rectángulo 5"/>
+          <p:cNvSpPr/>
+          <p:nvPr/>
+        </p:nvSpPr>
+        <p:spPr>
+          <a:xfrm>
+            <a:off x="5043055" y="1433370"/>
+            <a:ext cx="6770253" cy="1417998"/>
+          </a:xfrm>
+          <a:prstGeom prst="rect">
+            <a:avLst/>
+          </a:prstGeom>
+          <a:ln>
+            <a:noFill/>
+          </a:ln>
+        </p:spPr>
+        <p:style>
+          <a:lnRef idx="2">
+            <a:schemeClr val="accent4">
+              <a:shade val="50000"/>
+            </a:schemeClr>
+          </a:lnRef>
+          <a:fillRef idx="1">
+            <a:schemeClr val="accent4"/>
+          </a:fillRef>
+          <a:effectRef idx="0">
+            <a:schemeClr val="accent4"/>
+          </a:effectRef>
+          <a:fontRef idx="minor">
+            <a:schemeClr val="lt1"/>
+          </a:fontRef>
+        </p:style>
+        <p:txBody>
+          <a:bodyPr rtlCol="0" anchor="ctr"/>
+          <a:lstStyle/>
+          <a:p>
+            <a:pPr algn="ctr"/>
+            <a:endParaRPr lang="es-ES"/>
+          </a:p>
+        </p:txBody>
+      </p:sp>
+      <p:sp>
+        <p:nvSpPr>
+          <p:cNvPr id="5" name="Rectángulo 4"/>
+          <p:cNvSpPr/>
+          <p:nvPr/>
+        </p:nvSpPr>
+        <p:spPr>
+          <a:xfrm>
+            <a:off x="572655" y="1791855"/>
+            <a:ext cx="4470401" cy="794327"/>
+          </a:xfrm>
+          <a:prstGeom prst="rect">
+            <a:avLst/>
+          </a:prstGeom>
+          <a:ln>
+            <a:noFill/>
+          </a:ln>
+        </p:spPr>
+        <p:style>
+          <a:lnRef idx="2">
+            <a:schemeClr val="accent1">
+              <a:shade val="50000"/>
+            </a:schemeClr>
+          </a:lnRef>
+          <a:fillRef idx="1">
+            <a:schemeClr val="accent1"/>
+          </a:fillRef>
+          <a:effectRef idx="0">
+            <a:schemeClr val="accent1"/>
+          </a:effectRef>
+          <a:fontRef idx="minor">
+            <a:schemeClr val="lt1"/>
+          </a:fontRef>
+        </p:style>
+        <p:txBody>
+          <a:bodyPr rtlCol="0" anchor="ctr"/>
+          <a:lstStyle/>
+          <a:p>
+            <a:pPr algn="ctr"/>
+            <a:endParaRPr lang="es-ES"/>
+          </a:p>
+        </p:txBody>
+      </p:sp>
+      <p:sp>
+        <p:nvSpPr>
+          <p:cNvPr id="2" name="Título 1"/>
+          <p:cNvSpPr>
+            <a:spLocks noGrp="1"/>
+          </p:cNvSpPr>
+          <p:nvPr>
+            <p:ph type="title"/>
+          </p:nvPr>
+        </p:nvSpPr>
+        <p:spPr/>
+        <p:txBody>
+          <a:bodyPr>
+            <a:normAutofit/>
+          </a:bodyPr>
+          <a:lstStyle/>
+          <a:p>
+            <a:r>
+              <a:rPr lang="es-PE" sz="4800" b="1" dirty="0" smtClean="0">
+                <a:solidFill>
+                  <a:schemeClr val="accent2">
+                    <a:lumMod val="50000"/>
+                  </a:schemeClr>
+                </a:solidFill>
+              </a:rPr>
+              <a:t>REQUERIMIENTOS FUNCIONALES</a:t>
+            </a:r>
+            <a:endParaRPr lang="es-ES" sz="4800" b="1" dirty="0">
+              <a:solidFill>
+                <a:schemeClr val="accent2">
+                  <a:lumMod val="50000"/>
+                </a:schemeClr>
+              </a:solidFill>
+            </a:endParaRPr>
+          </a:p>
+        </p:txBody>
+      </p:sp>
+      <p:sp>
+        <p:nvSpPr>
+          <p:cNvPr id="3" name="Marcador de contenido 2"/>
+          <p:cNvSpPr>
+            <a:spLocks noGrp="1"/>
+          </p:cNvSpPr>
+          <p:nvPr>
+            <p:ph idx="1"/>
+          </p:nvPr>
+        </p:nvSpPr>
+        <p:spPr>
+          <a:xfrm>
+            <a:off x="5430982" y="1550556"/>
+            <a:ext cx="5922818" cy="1309544"/>
+          </a:xfrm>
+        </p:spPr>
+        <p:txBody>
+          <a:bodyPr>
+            <a:normAutofit fontScale="47500" lnSpcReduction="20000"/>
+          </a:bodyPr>
+          <a:lstStyle/>
+          <a:p>
+            <a:pPr marL="0" indent="0" algn="ctr">
+              <a:buNone/>
+            </a:pPr>
+            <a:r>
+              <a:rPr lang="es-ES" sz="4000" b="1" dirty="0"/>
+              <a:t>Usuario </a:t>
+            </a:r>
+            <a:r>
+              <a:rPr lang="es-ES" sz="4000" b="1" dirty="0" smtClean="0"/>
+              <a:t>Gerencial - Mantenimiento </a:t>
+            </a:r>
+            <a:r>
+              <a:rPr lang="es-ES" sz="4000" b="1" dirty="0"/>
+              <a:t>completo de  usuarios trabajadores:  </a:t>
+            </a:r>
+            <a:endParaRPr lang="es-ES" sz="4000" b="1" dirty="0" smtClean="0"/>
+          </a:p>
+          <a:p>
+            <a:pPr marL="0" indent="0">
+              <a:buNone/>
+            </a:pPr>
+            <a:r>
+              <a:rPr lang="es-ES" sz="4000" dirty="0" smtClean="0"/>
+              <a:t>Debe </a:t>
+            </a:r>
+            <a:r>
+              <a:rPr lang="es-ES" sz="4000" dirty="0"/>
+              <a:t>existir un usuario Gerencial que pueda generar otros usuario Administradores, estos </a:t>
+            </a:r>
+            <a:r>
+              <a:rPr lang="es-ES" sz="4000" dirty="0" err="1"/>
+              <a:t>podran</a:t>
+            </a:r>
+            <a:r>
+              <a:rPr lang="es-ES" sz="4000" dirty="0"/>
+              <a:t> administrar a los clientes. Debe poder crear usuarios Choferes y asistentes</a:t>
+            </a:r>
+            <a:endParaRPr lang="es-ES" sz="3200" dirty="0"/>
+          </a:p>
+        </p:txBody>
+      </p:sp>
+      <p:sp>
+        <p:nvSpPr>
+          <p:cNvPr id="4" name="Marcador de contenido 2"/>
+          <p:cNvSpPr txBox="1">
+            <a:spLocks/>
+          </p:cNvSpPr>
+          <p:nvPr/>
+        </p:nvSpPr>
+        <p:spPr>
+          <a:xfrm>
+            <a:off x="641929" y="2009993"/>
+            <a:ext cx="4401127" cy="396730"/>
+          </a:xfrm>
+          <a:prstGeom prst="rect">
+            <a:avLst/>
+          </a:prstGeom>
+        </p:spPr>
+        <p:txBody>
+          <a:bodyPr vert="horz" lIns="91440" tIns="45720" rIns="91440" bIns="45720" rtlCol="0">
+            <a:noAutofit/>
+          </a:bodyPr>
+          <a:lstStyle>
+            <a:lvl1pPr marL="228600" indent="-228600" algn="l" defTabSz="914400" rtl="0" eaLnBrk="1" latinLnBrk="0" hangingPunct="1">
+              <a:lnSpc>
+                <a:spcPct val="90000"/>
+              </a:lnSpc>
+              <a:spcBef>
+                <a:spcPts val="1000"/>
+              </a:spcBef>
+              <a:buFont typeface="Arial" panose="020B0604020202020204" pitchFamily="34" charset="0"/>
+              <a:buChar char="•"/>
+              <a:defRPr sz="2800" kern="1200">
+                <a:solidFill>
+                  <a:schemeClr val="tx1"/>
+                </a:solidFill>
+                <a:latin typeface="+mn-lt"/>
+                <a:ea typeface="+mn-ea"/>
+                <a:cs typeface="+mn-cs"/>
+              </a:defRPr>
+            </a:lvl1pPr>
+            <a:lvl2pPr marL="685800" indent="-228600" algn="l" defTabSz="914400" rtl="0" eaLnBrk="1" latinLnBrk="0" hangingPunct="1">
+              <a:lnSpc>
+                <a:spcPct val="90000"/>
+              </a:lnSpc>
+              <a:spcBef>
+                <a:spcPts val="500"/>
+              </a:spcBef>
+              <a:buFont typeface="Arial" panose="020B0604020202020204" pitchFamily="34" charset="0"/>
+              <a:buChar char="•"/>
+              <a:defRPr sz="2400" kern="1200">
+                <a:solidFill>
+                  <a:schemeClr val="tx1"/>
+                </a:solidFill>
+                <a:latin typeface="+mn-lt"/>
+                <a:ea typeface="+mn-ea"/>
+                <a:cs typeface="+mn-cs"/>
+              </a:defRPr>
+            </a:lvl2pPr>
+            <a:lvl3pPr marL="1143000" indent="-228600" algn="l" defTabSz="914400" rtl="0" eaLnBrk="1" latinLnBrk="0" hangingPunct="1">
+              <a:lnSpc>
+                <a:spcPct val="90000"/>
+              </a:lnSpc>
+              <a:spcBef>
+                <a:spcPts val="500"/>
+              </a:spcBef>
+              <a:buFont typeface="Arial" panose="020B0604020202020204" pitchFamily="34" charset="0"/>
+              <a:buChar char="•"/>
+              <a:defRPr sz="2000" kern="1200">
+                <a:solidFill>
+                  <a:schemeClr val="tx1"/>
+                </a:solidFill>
+                <a:latin typeface="+mn-lt"/>
+                <a:ea typeface="+mn-ea"/>
+                <a:cs typeface="+mn-cs"/>
+              </a:defRPr>
+            </a:lvl3pPr>
+            <a:lvl4pPr marL="1600200" indent="-228600" algn="l" defTabSz="914400" rtl="0" eaLnBrk="1" latinLnBrk="0" hangingPunct="1">
+              <a:lnSpc>
+                <a:spcPct val="90000"/>
+              </a:lnSpc>
+              <a:spcBef>
+                <a:spcPts val="500"/>
+              </a:spcBef>
+              <a:buFont typeface="Arial" panose="020B0604020202020204" pitchFamily="34" charset="0"/>
+              <a:buChar char="•"/>
+              <a:defRPr sz="1800" kern="1200">
+                <a:solidFill>
+                  <a:schemeClr val="tx1"/>
+                </a:solidFill>
+                <a:latin typeface="+mn-lt"/>
+                <a:ea typeface="+mn-ea"/>
+                <a:cs typeface="+mn-cs"/>
+              </a:defRPr>
+            </a:lvl4pPr>
+            <a:lvl5pPr marL="2057400" indent="-228600" algn="l" defTabSz="914400" rtl="0" eaLnBrk="1" latinLnBrk="0" hangingPunct="1">
+              <a:lnSpc>
+                <a:spcPct val="90000"/>
+              </a:lnSpc>
+              <a:spcBef>
+                <a:spcPts val="500"/>
+              </a:spcBef>
+              <a:buFont typeface="Arial" panose="020B0604020202020204" pitchFamily="34" charset="0"/>
+              <a:buChar char="•"/>
+              <a:defRPr sz="1800" kern="1200">
+                <a:solidFill>
+                  <a:schemeClr val="tx1"/>
+                </a:solidFill>
+                <a:latin typeface="+mn-lt"/>
+                <a:ea typeface="+mn-ea"/>
+                <a:cs typeface="+mn-cs"/>
+              </a:defRPr>
+            </a:lvl5pPr>
+            <a:lvl6pPr marL="2514600" indent="-228600" algn="l" defTabSz="914400" rtl="0" eaLnBrk="1" latinLnBrk="0" hangingPunct="1">
+              <a:lnSpc>
+                <a:spcPct val="90000"/>
+              </a:lnSpc>
+              <a:spcBef>
+                <a:spcPts val="500"/>
+              </a:spcBef>
+              <a:buFont typeface="Arial" panose="020B0604020202020204" pitchFamily="34" charset="0"/>
+              <a:buChar char="•"/>
+              <a:defRPr sz="1800" kern="1200">
+                <a:solidFill>
+                  <a:schemeClr val="tx1"/>
+                </a:solidFill>
+                <a:latin typeface="+mn-lt"/>
+                <a:ea typeface="+mn-ea"/>
+                <a:cs typeface="+mn-cs"/>
+              </a:defRPr>
+            </a:lvl6pPr>
+            <a:lvl7pPr marL="2971800" indent="-228600" algn="l" defTabSz="914400" rtl="0" eaLnBrk="1" latinLnBrk="0" hangingPunct="1">
+              <a:lnSpc>
+                <a:spcPct val="90000"/>
+              </a:lnSpc>
+              <a:spcBef>
+                <a:spcPts val="500"/>
+              </a:spcBef>
+              <a:buFont typeface="Arial" panose="020B0604020202020204" pitchFamily="34" charset="0"/>
+              <a:buChar char="•"/>
+              <a:defRPr sz="1800" kern="1200">
+                <a:solidFill>
+                  <a:schemeClr val="tx1"/>
+                </a:solidFill>
+                <a:latin typeface="+mn-lt"/>
+                <a:ea typeface="+mn-ea"/>
+                <a:cs typeface="+mn-cs"/>
+              </a:defRPr>
+            </a:lvl7pPr>
+            <a:lvl8pPr marL="3429000" indent="-228600" algn="l" defTabSz="914400" rtl="0" eaLnBrk="1" latinLnBrk="0" hangingPunct="1">
+              <a:lnSpc>
+                <a:spcPct val="90000"/>
+              </a:lnSpc>
+              <a:spcBef>
+                <a:spcPts val="500"/>
+              </a:spcBef>
+              <a:buFont typeface="Arial" panose="020B0604020202020204" pitchFamily="34" charset="0"/>
+              <a:buChar char="•"/>
+              <a:defRPr sz="1800" kern="1200">
+                <a:solidFill>
+                  <a:schemeClr val="tx1"/>
+                </a:solidFill>
+                <a:latin typeface="+mn-lt"/>
+                <a:ea typeface="+mn-ea"/>
+                <a:cs typeface="+mn-cs"/>
+              </a:defRPr>
+            </a:lvl8pPr>
+            <a:lvl9pPr marL="3886200" indent="-228600" algn="l" defTabSz="914400" rtl="0" eaLnBrk="1" latinLnBrk="0" hangingPunct="1">
+              <a:lnSpc>
+                <a:spcPct val="90000"/>
+              </a:lnSpc>
+              <a:spcBef>
+                <a:spcPts val="500"/>
+              </a:spcBef>
+              <a:buFont typeface="Arial" panose="020B0604020202020204" pitchFamily="34" charset="0"/>
+              <a:buChar char="•"/>
+              <a:defRPr sz="1800" kern="1200">
+                <a:solidFill>
+                  <a:schemeClr val="tx1"/>
+                </a:solidFill>
+                <a:latin typeface="+mn-lt"/>
+                <a:ea typeface="+mn-ea"/>
+                <a:cs typeface="+mn-cs"/>
+              </a:defRPr>
+            </a:lvl9pPr>
+          </a:lstStyle>
+          <a:p>
+            <a:pPr marL="0" indent="0">
+              <a:buNone/>
+            </a:pPr>
+            <a:r>
+              <a:rPr lang="es-PE" sz="2000" b="1" dirty="0">
+                <a:solidFill>
+                  <a:schemeClr val="bg1"/>
+                </a:solidFill>
+              </a:rPr>
+              <a:t>Funciones </a:t>
+            </a:r>
+            <a:r>
+              <a:rPr lang="es-PE" sz="2000" b="1" dirty="0" smtClean="0">
+                <a:solidFill>
+                  <a:schemeClr val="bg1"/>
+                </a:solidFill>
+              </a:rPr>
+              <a:t>administrativas </a:t>
+            </a:r>
+            <a:r>
+              <a:rPr lang="es-PE" sz="2000" b="1" dirty="0">
+                <a:solidFill>
+                  <a:schemeClr val="bg1"/>
+                </a:solidFill>
+              </a:rPr>
+              <a:t>Gerenciales</a:t>
+            </a:r>
+            <a:endParaRPr lang="es-ES" sz="1600" dirty="0">
+              <a:solidFill>
+                <a:schemeClr val="bg1"/>
+              </a:solidFill>
+            </a:endParaRPr>
+          </a:p>
+        </p:txBody>
+      </p:sp>
+      <p:sp>
+        <p:nvSpPr>
+          <p:cNvPr id="7" name="Rectángulo 6"/>
+          <p:cNvSpPr/>
+          <p:nvPr/>
+        </p:nvSpPr>
+        <p:spPr>
+          <a:xfrm>
+            <a:off x="5043055" y="2989118"/>
+            <a:ext cx="6770253" cy="1431779"/>
+          </a:xfrm>
+          <a:prstGeom prst="rect">
+            <a:avLst/>
+          </a:prstGeom>
+          <a:ln>
+            <a:noFill/>
+          </a:ln>
+        </p:spPr>
+        <p:style>
+          <a:lnRef idx="2">
+            <a:schemeClr val="accent4">
+              <a:shade val="50000"/>
+            </a:schemeClr>
+          </a:lnRef>
+          <a:fillRef idx="1">
+            <a:schemeClr val="accent4"/>
+          </a:fillRef>
+          <a:effectRef idx="0">
+            <a:schemeClr val="accent4"/>
+          </a:effectRef>
+          <a:fontRef idx="minor">
+            <a:schemeClr val="lt1"/>
+          </a:fontRef>
+        </p:style>
+        <p:txBody>
+          <a:bodyPr rtlCol="0" anchor="ctr"/>
+          <a:lstStyle/>
+          <a:p>
+            <a:pPr algn="ctr"/>
+            <a:endParaRPr lang="es-ES"/>
+          </a:p>
+        </p:txBody>
+      </p:sp>
+      <p:sp>
+        <p:nvSpPr>
+          <p:cNvPr id="8" name="Rectángulo 7"/>
+          <p:cNvSpPr/>
+          <p:nvPr/>
+        </p:nvSpPr>
+        <p:spPr>
+          <a:xfrm>
+            <a:off x="572655" y="3268085"/>
+            <a:ext cx="4470401" cy="794327"/>
+          </a:xfrm>
+          <a:prstGeom prst="rect">
+            <a:avLst/>
+          </a:prstGeom>
+          <a:ln>
+            <a:noFill/>
+          </a:ln>
+        </p:spPr>
+        <p:style>
+          <a:lnRef idx="2">
+            <a:schemeClr val="accent1">
+              <a:shade val="50000"/>
+            </a:schemeClr>
+          </a:lnRef>
+          <a:fillRef idx="1">
+            <a:schemeClr val="accent1"/>
+          </a:fillRef>
+          <a:effectRef idx="0">
+            <a:schemeClr val="accent1"/>
+          </a:effectRef>
+          <a:fontRef idx="minor">
+            <a:schemeClr val="lt1"/>
+          </a:fontRef>
+        </p:style>
+        <p:txBody>
+          <a:bodyPr rtlCol="0" anchor="ctr"/>
+          <a:lstStyle/>
+          <a:p>
+            <a:pPr algn="ctr"/>
+            <a:endParaRPr lang="es-ES"/>
+          </a:p>
+        </p:txBody>
+      </p:sp>
+      <p:sp>
+        <p:nvSpPr>
+          <p:cNvPr id="9" name="Marcador de contenido 2"/>
+          <p:cNvSpPr txBox="1">
+            <a:spLocks/>
+          </p:cNvSpPr>
+          <p:nvPr/>
+        </p:nvSpPr>
+        <p:spPr>
+          <a:xfrm>
+            <a:off x="5430982" y="3073765"/>
+            <a:ext cx="5922818" cy="1449676"/>
+          </a:xfrm>
+          <a:prstGeom prst="rect">
+            <a:avLst/>
+          </a:prstGeom>
+        </p:spPr>
+        <p:txBody>
+          <a:bodyPr vert="horz" lIns="91440" tIns="45720" rIns="91440" bIns="45720" rtlCol="0">
+            <a:normAutofit/>
+          </a:bodyPr>
+          <a:lstStyle>
+            <a:lvl1pPr marL="228600" indent="-228600" algn="l" defTabSz="914400" rtl="0" eaLnBrk="1" latinLnBrk="0" hangingPunct="1">
+              <a:lnSpc>
+                <a:spcPct val="90000"/>
+              </a:lnSpc>
+              <a:spcBef>
+                <a:spcPts val="1000"/>
+              </a:spcBef>
+              <a:buFont typeface="Arial" panose="020B0604020202020204" pitchFamily="34" charset="0"/>
+              <a:buChar char="•"/>
+              <a:defRPr sz="2800" kern="1200">
+                <a:solidFill>
+                  <a:schemeClr val="tx1"/>
+                </a:solidFill>
+                <a:latin typeface="+mn-lt"/>
+                <a:ea typeface="+mn-ea"/>
+                <a:cs typeface="+mn-cs"/>
+              </a:defRPr>
+            </a:lvl1pPr>
+            <a:lvl2pPr marL="685800" indent="-228600" algn="l" defTabSz="914400" rtl="0" eaLnBrk="1" latinLnBrk="0" hangingPunct="1">
+              <a:lnSpc>
+                <a:spcPct val="90000"/>
+              </a:lnSpc>
+              <a:spcBef>
+                <a:spcPts val="500"/>
+              </a:spcBef>
+              <a:buFont typeface="Arial" panose="020B0604020202020204" pitchFamily="34" charset="0"/>
+              <a:buChar char="•"/>
+              <a:defRPr sz="2400" kern="1200">
+                <a:solidFill>
+                  <a:schemeClr val="tx1"/>
+                </a:solidFill>
+                <a:latin typeface="+mn-lt"/>
+                <a:ea typeface="+mn-ea"/>
+                <a:cs typeface="+mn-cs"/>
+              </a:defRPr>
+            </a:lvl2pPr>
+            <a:lvl3pPr marL="1143000" indent="-228600" algn="l" defTabSz="914400" rtl="0" eaLnBrk="1" latinLnBrk="0" hangingPunct="1">
+              <a:lnSpc>
+                <a:spcPct val="90000"/>
+              </a:lnSpc>
+              <a:spcBef>
+                <a:spcPts val="500"/>
+              </a:spcBef>
+              <a:buFont typeface="Arial" panose="020B0604020202020204" pitchFamily="34" charset="0"/>
+              <a:buChar char="•"/>
+              <a:defRPr sz="2000" kern="1200">
+                <a:solidFill>
+                  <a:schemeClr val="tx1"/>
+                </a:solidFill>
+                <a:latin typeface="+mn-lt"/>
+                <a:ea typeface="+mn-ea"/>
+                <a:cs typeface="+mn-cs"/>
+              </a:defRPr>
+            </a:lvl3pPr>
+            <a:lvl4pPr marL="1600200" indent="-228600" algn="l" defTabSz="914400" rtl="0" eaLnBrk="1" latinLnBrk="0" hangingPunct="1">
+              <a:lnSpc>
+                <a:spcPct val="90000"/>
+              </a:lnSpc>
+              <a:spcBef>
+                <a:spcPts val="500"/>
+              </a:spcBef>
+              <a:buFont typeface="Arial" panose="020B0604020202020204" pitchFamily="34" charset="0"/>
+              <a:buChar char="•"/>
+              <a:defRPr sz="1800" kern="1200">
+                <a:solidFill>
+                  <a:schemeClr val="tx1"/>
+                </a:solidFill>
+                <a:latin typeface="+mn-lt"/>
+                <a:ea typeface="+mn-ea"/>
+                <a:cs typeface="+mn-cs"/>
+              </a:defRPr>
+            </a:lvl4pPr>
+            <a:lvl5pPr marL="2057400" indent="-228600" algn="l" defTabSz="914400" rtl="0" eaLnBrk="1" latinLnBrk="0" hangingPunct="1">
+              <a:lnSpc>
+                <a:spcPct val="90000"/>
+              </a:lnSpc>
+              <a:spcBef>
+                <a:spcPts val="500"/>
+              </a:spcBef>
+              <a:buFont typeface="Arial" panose="020B0604020202020204" pitchFamily="34" charset="0"/>
+              <a:buChar char="•"/>
+              <a:defRPr sz="1800" kern="1200">
+                <a:solidFill>
+                  <a:schemeClr val="tx1"/>
+                </a:solidFill>
+                <a:latin typeface="+mn-lt"/>
+                <a:ea typeface="+mn-ea"/>
+                <a:cs typeface="+mn-cs"/>
+              </a:defRPr>
+            </a:lvl5pPr>
+            <a:lvl6pPr marL="2514600" indent="-228600" algn="l" defTabSz="914400" rtl="0" eaLnBrk="1" latinLnBrk="0" hangingPunct="1">
+              <a:lnSpc>
+                <a:spcPct val="90000"/>
+              </a:lnSpc>
+              <a:spcBef>
+                <a:spcPts val="500"/>
+              </a:spcBef>
+              <a:buFont typeface="Arial" panose="020B0604020202020204" pitchFamily="34" charset="0"/>
+              <a:buChar char="•"/>
+              <a:defRPr sz="1800" kern="1200">
+                <a:solidFill>
+                  <a:schemeClr val="tx1"/>
+                </a:solidFill>
+                <a:latin typeface="+mn-lt"/>
+                <a:ea typeface="+mn-ea"/>
+                <a:cs typeface="+mn-cs"/>
+              </a:defRPr>
+            </a:lvl6pPr>
+            <a:lvl7pPr marL="2971800" indent="-228600" algn="l" defTabSz="914400" rtl="0" eaLnBrk="1" latinLnBrk="0" hangingPunct="1">
+              <a:lnSpc>
+                <a:spcPct val="90000"/>
+              </a:lnSpc>
+              <a:spcBef>
+                <a:spcPts val="500"/>
+              </a:spcBef>
+              <a:buFont typeface="Arial" panose="020B0604020202020204" pitchFamily="34" charset="0"/>
+              <a:buChar char="•"/>
+              <a:defRPr sz="1800" kern="1200">
+                <a:solidFill>
+                  <a:schemeClr val="tx1"/>
+                </a:solidFill>
+                <a:latin typeface="+mn-lt"/>
+                <a:ea typeface="+mn-ea"/>
+                <a:cs typeface="+mn-cs"/>
+              </a:defRPr>
+            </a:lvl7pPr>
+            <a:lvl8pPr marL="3429000" indent="-228600" algn="l" defTabSz="914400" rtl="0" eaLnBrk="1" latinLnBrk="0" hangingPunct="1">
+              <a:lnSpc>
+                <a:spcPct val="90000"/>
+              </a:lnSpc>
+              <a:spcBef>
+                <a:spcPts val="500"/>
+              </a:spcBef>
+              <a:buFont typeface="Arial" panose="020B0604020202020204" pitchFamily="34" charset="0"/>
+              <a:buChar char="•"/>
+              <a:defRPr sz="1800" kern="1200">
+                <a:solidFill>
+                  <a:schemeClr val="tx1"/>
+                </a:solidFill>
+                <a:latin typeface="+mn-lt"/>
+                <a:ea typeface="+mn-ea"/>
+                <a:cs typeface="+mn-cs"/>
+              </a:defRPr>
+            </a:lvl8pPr>
+            <a:lvl9pPr marL="3886200" indent="-228600" algn="l" defTabSz="914400" rtl="0" eaLnBrk="1" latinLnBrk="0" hangingPunct="1">
+              <a:lnSpc>
+                <a:spcPct val="90000"/>
+              </a:lnSpc>
+              <a:spcBef>
+                <a:spcPts val="500"/>
+              </a:spcBef>
+              <a:buFont typeface="Arial" panose="020B0604020202020204" pitchFamily="34" charset="0"/>
+              <a:buChar char="•"/>
+              <a:defRPr sz="1800" kern="1200">
+                <a:solidFill>
+                  <a:schemeClr val="tx1"/>
+                </a:solidFill>
+                <a:latin typeface="+mn-lt"/>
+                <a:ea typeface="+mn-ea"/>
+                <a:cs typeface="+mn-cs"/>
+              </a:defRPr>
+            </a:lvl9pPr>
+          </a:lstStyle>
+          <a:p>
+            <a:pPr marL="0" indent="0" algn="ctr">
+              <a:buNone/>
+            </a:pPr>
+            <a:r>
+              <a:rPr lang="es-ES" sz="2200" b="1" dirty="0"/>
+              <a:t>Usuario Administrador- Mantenimiento completo de clientes:  </a:t>
+            </a:r>
+            <a:r>
+              <a:rPr lang="es-ES" sz="2200" dirty="0"/>
+              <a:t>EL usuario administrador </a:t>
+            </a:r>
+            <a:r>
+              <a:rPr lang="es-ES" sz="2200" dirty="0" err="1"/>
+              <a:t>podra</a:t>
+            </a:r>
+            <a:r>
+              <a:rPr lang="es-ES" sz="2200" dirty="0"/>
+              <a:t> generar y asignar tarjetas de tren a los clientes que deseen </a:t>
+            </a:r>
+            <a:r>
+              <a:rPr lang="es-ES" sz="2200" dirty="0" smtClean="0"/>
+              <a:t>adquirirlo.</a:t>
+            </a:r>
+            <a:endParaRPr lang="es-ES" sz="2200" dirty="0"/>
+          </a:p>
+        </p:txBody>
+      </p:sp>
+      <p:sp>
+        <p:nvSpPr>
+          <p:cNvPr id="10" name="Marcador de contenido 2"/>
+          <p:cNvSpPr txBox="1">
+            <a:spLocks/>
+          </p:cNvSpPr>
+          <p:nvPr/>
+        </p:nvSpPr>
+        <p:spPr>
+          <a:xfrm>
+            <a:off x="641929" y="3366367"/>
+            <a:ext cx="4401127" cy="396730"/>
+          </a:xfrm>
+          <a:prstGeom prst="rect">
+            <a:avLst/>
+          </a:prstGeom>
+        </p:spPr>
+        <p:txBody>
+          <a:bodyPr vert="horz" lIns="91440" tIns="45720" rIns="91440" bIns="45720" rtlCol="0">
+            <a:noAutofit/>
+          </a:bodyPr>
+          <a:lstStyle>
+            <a:lvl1pPr marL="228600" indent="-228600" algn="l" defTabSz="914400" rtl="0" eaLnBrk="1" latinLnBrk="0" hangingPunct="1">
+              <a:lnSpc>
+                <a:spcPct val="90000"/>
+              </a:lnSpc>
+              <a:spcBef>
+                <a:spcPts val="1000"/>
+              </a:spcBef>
+              <a:buFont typeface="Arial" panose="020B0604020202020204" pitchFamily="34" charset="0"/>
+              <a:buChar char="•"/>
+              <a:defRPr sz="2800" kern="1200">
+                <a:solidFill>
+                  <a:schemeClr val="tx1"/>
+                </a:solidFill>
+                <a:latin typeface="+mn-lt"/>
+                <a:ea typeface="+mn-ea"/>
+                <a:cs typeface="+mn-cs"/>
+              </a:defRPr>
+            </a:lvl1pPr>
+            <a:lvl2pPr marL="685800" indent="-228600" algn="l" defTabSz="914400" rtl="0" eaLnBrk="1" latinLnBrk="0" hangingPunct="1">
+              <a:lnSpc>
+                <a:spcPct val="90000"/>
+              </a:lnSpc>
+              <a:spcBef>
+                <a:spcPts val="500"/>
+              </a:spcBef>
+              <a:buFont typeface="Arial" panose="020B0604020202020204" pitchFamily="34" charset="0"/>
+              <a:buChar char="•"/>
+              <a:defRPr sz="2400" kern="1200">
+                <a:solidFill>
+                  <a:schemeClr val="tx1"/>
+                </a:solidFill>
+                <a:latin typeface="+mn-lt"/>
+                <a:ea typeface="+mn-ea"/>
+                <a:cs typeface="+mn-cs"/>
+              </a:defRPr>
+            </a:lvl2pPr>
+            <a:lvl3pPr marL="1143000" indent="-228600" algn="l" defTabSz="914400" rtl="0" eaLnBrk="1" latinLnBrk="0" hangingPunct="1">
+              <a:lnSpc>
+                <a:spcPct val="90000"/>
+              </a:lnSpc>
+              <a:spcBef>
+                <a:spcPts val="500"/>
+              </a:spcBef>
+              <a:buFont typeface="Arial" panose="020B0604020202020204" pitchFamily="34" charset="0"/>
+              <a:buChar char="•"/>
+              <a:defRPr sz="2000" kern="1200">
+                <a:solidFill>
+                  <a:schemeClr val="tx1"/>
+                </a:solidFill>
+                <a:latin typeface="+mn-lt"/>
+                <a:ea typeface="+mn-ea"/>
+                <a:cs typeface="+mn-cs"/>
+              </a:defRPr>
+            </a:lvl3pPr>
+            <a:lvl4pPr marL="1600200" indent="-228600" algn="l" defTabSz="914400" rtl="0" eaLnBrk="1" latinLnBrk="0" hangingPunct="1">
+              <a:lnSpc>
+                <a:spcPct val="90000"/>
+              </a:lnSpc>
+              <a:spcBef>
+                <a:spcPts val="500"/>
+              </a:spcBef>
+              <a:buFont typeface="Arial" panose="020B0604020202020204" pitchFamily="34" charset="0"/>
+              <a:buChar char="•"/>
+              <a:defRPr sz="1800" kern="1200">
+                <a:solidFill>
+                  <a:schemeClr val="tx1"/>
+                </a:solidFill>
+                <a:latin typeface="+mn-lt"/>
+                <a:ea typeface="+mn-ea"/>
+                <a:cs typeface="+mn-cs"/>
+              </a:defRPr>
+            </a:lvl4pPr>
+            <a:lvl5pPr marL="2057400" indent="-228600" algn="l" defTabSz="914400" rtl="0" eaLnBrk="1" latinLnBrk="0" hangingPunct="1">
+              <a:lnSpc>
+                <a:spcPct val="90000"/>
+              </a:lnSpc>
+              <a:spcBef>
+                <a:spcPts val="500"/>
+              </a:spcBef>
+              <a:buFont typeface="Arial" panose="020B0604020202020204" pitchFamily="34" charset="0"/>
+              <a:buChar char="•"/>
+              <a:defRPr sz="1800" kern="1200">
+                <a:solidFill>
+                  <a:schemeClr val="tx1"/>
+                </a:solidFill>
+                <a:latin typeface="+mn-lt"/>
+                <a:ea typeface="+mn-ea"/>
+                <a:cs typeface="+mn-cs"/>
+              </a:defRPr>
+            </a:lvl5pPr>
+            <a:lvl6pPr marL="2514600" indent="-228600" algn="l" defTabSz="914400" rtl="0" eaLnBrk="1" latinLnBrk="0" hangingPunct="1">
+              <a:lnSpc>
+                <a:spcPct val="90000"/>
+              </a:lnSpc>
+              <a:spcBef>
+                <a:spcPts val="500"/>
+              </a:spcBef>
+              <a:buFont typeface="Arial" panose="020B0604020202020204" pitchFamily="34" charset="0"/>
+              <a:buChar char="•"/>
+              <a:defRPr sz="1800" kern="1200">
+                <a:solidFill>
+                  <a:schemeClr val="tx1"/>
+                </a:solidFill>
+                <a:latin typeface="+mn-lt"/>
+                <a:ea typeface="+mn-ea"/>
+                <a:cs typeface="+mn-cs"/>
+              </a:defRPr>
+            </a:lvl6pPr>
+            <a:lvl7pPr marL="2971800" indent="-228600" algn="l" defTabSz="914400" rtl="0" eaLnBrk="1" latinLnBrk="0" hangingPunct="1">
+              <a:lnSpc>
+                <a:spcPct val="90000"/>
+              </a:lnSpc>
+              <a:spcBef>
+                <a:spcPts val="500"/>
+              </a:spcBef>
+              <a:buFont typeface="Arial" panose="020B0604020202020204" pitchFamily="34" charset="0"/>
+              <a:buChar char="•"/>
+              <a:defRPr sz="1800" kern="1200">
+                <a:solidFill>
+                  <a:schemeClr val="tx1"/>
+                </a:solidFill>
+                <a:latin typeface="+mn-lt"/>
+                <a:ea typeface="+mn-ea"/>
+                <a:cs typeface="+mn-cs"/>
+              </a:defRPr>
+            </a:lvl7pPr>
+            <a:lvl8pPr marL="3429000" indent="-228600" algn="l" defTabSz="914400" rtl="0" eaLnBrk="1" latinLnBrk="0" hangingPunct="1">
+              <a:lnSpc>
+                <a:spcPct val="90000"/>
+              </a:lnSpc>
+              <a:spcBef>
+                <a:spcPts val="500"/>
+              </a:spcBef>
+              <a:buFont typeface="Arial" panose="020B0604020202020204" pitchFamily="34" charset="0"/>
+              <a:buChar char="•"/>
+              <a:defRPr sz="1800" kern="1200">
+                <a:solidFill>
+                  <a:schemeClr val="tx1"/>
+                </a:solidFill>
+                <a:latin typeface="+mn-lt"/>
+                <a:ea typeface="+mn-ea"/>
+                <a:cs typeface="+mn-cs"/>
+              </a:defRPr>
+            </a:lvl8pPr>
+            <a:lvl9pPr marL="3886200" indent="-228600" algn="l" defTabSz="914400" rtl="0" eaLnBrk="1" latinLnBrk="0" hangingPunct="1">
+              <a:lnSpc>
+                <a:spcPct val="90000"/>
+              </a:lnSpc>
+              <a:spcBef>
+                <a:spcPts val="500"/>
+              </a:spcBef>
+              <a:buFont typeface="Arial" panose="020B0604020202020204" pitchFamily="34" charset="0"/>
+              <a:buChar char="•"/>
+              <a:defRPr sz="1800" kern="1200">
+                <a:solidFill>
+                  <a:schemeClr val="tx1"/>
+                </a:solidFill>
+                <a:latin typeface="+mn-lt"/>
+                <a:ea typeface="+mn-ea"/>
+                <a:cs typeface="+mn-cs"/>
+              </a:defRPr>
+            </a:lvl9pPr>
+          </a:lstStyle>
+          <a:p>
+            <a:pPr marL="0" indent="0" algn="ctr">
+              <a:buNone/>
+            </a:pPr>
+            <a:r>
+              <a:rPr lang="es-PE" sz="2000" b="1" dirty="0">
+                <a:solidFill>
+                  <a:schemeClr val="bg1"/>
+                </a:solidFill>
+              </a:rPr>
+              <a:t>Administrador General de clientes - Funciones comerciales</a:t>
+            </a:r>
+            <a:endParaRPr lang="es-ES" sz="1600" dirty="0">
+              <a:solidFill>
+                <a:schemeClr val="bg1"/>
+              </a:solidFill>
+            </a:endParaRPr>
+          </a:p>
+        </p:txBody>
+      </p:sp>
+      <p:sp>
+        <p:nvSpPr>
+          <p:cNvPr id="11" name="Rectángulo 10"/>
+          <p:cNvSpPr/>
+          <p:nvPr/>
+        </p:nvSpPr>
+        <p:spPr>
+          <a:xfrm>
+            <a:off x="5043055" y="4560175"/>
+            <a:ext cx="6770253" cy="1332625"/>
+          </a:xfrm>
+          <a:prstGeom prst="rect">
+            <a:avLst/>
+          </a:prstGeom>
+          <a:ln>
+            <a:noFill/>
+          </a:ln>
+        </p:spPr>
+        <p:style>
+          <a:lnRef idx="2">
+            <a:schemeClr val="accent4">
+              <a:shade val="50000"/>
+            </a:schemeClr>
+          </a:lnRef>
+          <a:fillRef idx="1">
+            <a:schemeClr val="accent4"/>
+          </a:fillRef>
+          <a:effectRef idx="0">
+            <a:schemeClr val="accent4"/>
+          </a:effectRef>
+          <a:fontRef idx="minor">
+            <a:schemeClr val="lt1"/>
+          </a:fontRef>
+        </p:style>
+        <p:txBody>
+          <a:bodyPr rtlCol="0" anchor="ctr"/>
+          <a:lstStyle/>
+          <a:p>
+            <a:pPr algn="ctr"/>
+            <a:endParaRPr lang="es-ES"/>
+          </a:p>
+        </p:txBody>
+      </p:sp>
+      <p:sp>
+        <p:nvSpPr>
+          <p:cNvPr id="12" name="Rectángulo 11"/>
+          <p:cNvSpPr/>
+          <p:nvPr/>
+        </p:nvSpPr>
+        <p:spPr>
+          <a:xfrm>
+            <a:off x="572655" y="4782492"/>
+            <a:ext cx="4470401" cy="794327"/>
+          </a:xfrm>
+          <a:prstGeom prst="rect">
+            <a:avLst/>
+          </a:prstGeom>
+          <a:ln>
+            <a:noFill/>
+          </a:ln>
+        </p:spPr>
+        <p:style>
+          <a:lnRef idx="2">
+            <a:schemeClr val="accent1">
+              <a:shade val="50000"/>
+            </a:schemeClr>
+          </a:lnRef>
+          <a:fillRef idx="1">
+            <a:schemeClr val="accent1"/>
+          </a:fillRef>
+          <a:effectRef idx="0">
+            <a:schemeClr val="accent1"/>
+          </a:effectRef>
+          <a:fontRef idx="minor">
+            <a:schemeClr val="lt1"/>
+          </a:fontRef>
+        </p:style>
+        <p:txBody>
+          <a:bodyPr rtlCol="0" anchor="ctr"/>
+          <a:lstStyle/>
+          <a:p>
+            <a:pPr algn="ctr"/>
+            <a:endParaRPr lang="es-ES"/>
+          </a:p>
+        </p:txBody>
+      </p:sp>
+      <p:sp>
+        <p:nvSpPr>
+          <p:cNvPr id="13" name="Marcador de contenido 2"/>
+          <p:cNvSpPr txBox="1">
+            <a:spLocks/>
+          </p:cNvSpPr>
+          <p:nvPr/>
+        </p:nvSpPr>
+        <p:spPr>
+          <a:xfrm>
+            <a:off x="5430982" y="4720221"/>
+            <a:ext cx="5922818" cy="1449676"/>
+          </a:xfrm>
+          <a:prstGeom prst="rect">
+            <a:avLst/>
+          </a:prstGeom>
+        </p:spPr>
+        <p:txBody>
+          <a:bodyPr vert="horz" lIns="91440" tIns="45720" rIns="91440" bIns="45720" rtlCol="0">
+            <a:normAutofit/>
+          </a:bodyPr>
+          <a:lstStyle>
+            <a:lvl1pPr marL="228600" indent="-228600" algn="l" defTabSz="914400" rtl="0" eaLnBrk="1" latinLnBrk="0" hangingPunct="1">
+              <a:lnSpc>
+                <a:spcPct val="90000"/>
+              </a:lnSpc>
+              <a:spcBef>
+                <a:spcPts val="1000"/>
+              </a:spcBef>
+              <a:buFont typeface="Arial" panose="020B0604020202020204" pitchFamily="34" charset="0"/>
+              <a:buChar char="•"/>
+              <a:defRPr sz="2800" kern="1200">
+                <a:solidFill>
+                  <a:schemeClr val="tx1"/>
+                </a:solidFill>
+                <a:latin typeface="+mn-lt"/>
+                <a:ea typeface="+mn-ea"/>
+                <a:cs typeface="+mn-cs"/>
+              </a:defRPr>
+            </a:lvl1pPr>
+            <a:lvl2pPr marL="685800" indent="-228600" algn="l" defTabSz="914400" rtl="0" eaLnBrk="1" latinLnBrk="0" hangingPunct="1">
+              <a:lnSpc>
+                <a:spcPct val="90000"/>
+              </a:lnSpc>
+              <a:spcBef>
+                <a:spcPts val="500"/>
+              </a:spcBef>
+              <a:buFont typeface="Arial" panose="020B0604020202020204" pitchFamily="34" charset="0"/>
+              <a:buChar char="•"/>
+              <a:defRPr sz="2400" kern="1200">
+                <a:solidFill>
+                  <a:schemeClr val="tx1"/>
+                </a:solidFill>
+                <a:latin typeface="+mn-lt"/>
+                <a:ea typeface="+mn-ea"/>
+                <a:cs typeface="+mn-cs"/>
+              </a:defRPr>
+            </a:lvl2pPr>
+            <a:lvl3pPr marL="1143000" indent="-228600" algn="l" defTabSz="914400" rtl="0" eaLnBrk="1" latinLnBrk="0" hangingPunct="1">
+              <a:lnSpc>
+                <a:spcPct val="90000"/>
+              </a:lnSpc>
+              <a:spcBef>
+                <a:spcPts val="500"/>
+              </a:spcBef>
+              <a:buFont typeface="Arial" panose="020B0604020202020204" pitchFamily="34" charset="0"/>
+              <a:buChar char="•"/>
+              <a:defRPr sz="2000" kern="1200">
+                <a:solidFill>
+                  <a:schemeClr val="tx1"/>
+                </a:solidFill>
+                <a:latin typeface="+mn-lt"/>
+                <a:ea typeface="+mn-ea"/>
+                <a:cs typeface="+mn-cs"/>
+              </a:defRPr>
+            </a:lvl3pPr>
+            <a:lvl4pPr marL="1600200" indent="-228600" algn="l" defTabSz="914400" rtl="0" eaLnBrk="1" latinLnBrk="0" hangingPunct="1">
+              <a:lnSpc>
+                <a:spcPct val="90000"/>
+              </a:lnSpc>
+              <a:spcBef>
+                <a:spcPts val="500"/>
+              </a:spcBef>
+              <a:buFont typeface="Arial" panose="020B0604020202020204" pitchFamily="34" charset="0"/>
+              <a:buChar char="•"/>
+              <a:defRPr sz="1800" kern="1200">
+                <a:solidFill>
+                  <a:schemeClr val="tx1"/>
+                </a:solidFill>
+                <a:latin typeface="+mn-lt"/>
+                <a:ea typeface="+mn-ea"/>
+                <a:cs typeface="+mn-cs"/>
+              </a:defRPr>
+            </a:lvl4pPr>
+            <a:lvl5pPr marL="2057400" indent="-228600" algn="l" defTabSz="914400" rtl="0" eaLnBrk="1" latinLnBrk="0" hangingPunct="1">
+              <a:lnSpc>
+                <a:spcPct val="90000"/>
+              </a:lnSpc>
+              <a:spcBef>
+                <a:spcPts val="500"/>
+              </a:spcBef>
+              <a:buFont typeface="Arial" panose="020B0604020202020204" pitchFamily="34" charset="0"/>
+              <a:buChar char="•"/>
+              <a:defRPr sz="1800" kern="1200">
+                <a:solidFill>
+                  <a:schemeClr val="tx1"/>
+                </a:solidFill>
+                <a:latin typeface="+mn-lt"/>
+                <a:ea typeface="+mn-ea"/>
+                <a:cs typeface="+mn-cs"/>
+              </a:defRPr>
+            </a:lvl5pPr>
+            <a:lvl6pPr marL="2514600" indent="-228600" algn="l" defTabSz="914400" rtl="0" eaLnBrk="1" latinLnBrk="0" hangingPunct="1">
+              <a:lnSpc>
+                <a:spcPct val="90000"/>
+              </a:lnSpc>
+              <a:spcBef>
+                <a:spcPts val="500"/>
+              </a:spcBef>
+              <a:buFont typeface="Arial" panose="020B0604020202020204" pitchFamily="34" charset="0"/>
+              <a:buChar char="•"/>
+              <a:defRPr sz="1800" kern="1200">
+                <a:solidFill>
+                  <a:schemeClr val="tx1"/>
+                </a:solidFill>
+                <a:latin typeface="+mn-lt"/>
+                <a:ea typeface="+mn-ea"/>
+                <a:cs typeface="+mn-cs"/>
+              </a:defRPr>
+            </a:lvl6pPr>
+            <a:lvl7pPr marL="2971800" indent="-228600" algn="l" defTabSz="914400" rtl="0" eaLnBrk="1" latinLnBrk="0" hangingPunct="1">
+              <a:lnSpc>
+                <a:spcPct val="90000"/>
+              </a:lnSpc>
+              <a:spcBef>
+                <a:spcPts val="500"/>
+              </a:spcBef>
+              <a:buFont typeface="Arial" panose="020B0604020202020204" pitchFamily="34" charset="0"/>
+              <a:buChar char="•"/>
+              <a:defRPr sz="1800" kern="1200">
+                <a:solidFill>
+                  <a:schemeClr val="tx1"/>
+                </a:solidFill>
+                <a:latin typeface="+mn-lt"/>
+                <a:ea typeface="+mn-ea"/>
+                <a:cs typeface="+mn-cs"/>
+              </a:defRPr>
+            </a:lvl7pPr>
+            <a:lvl8pPr marL="3429000" indent="-228600" algn="l" defTabSz="914400" rtl="0" eaLnBrk="1" latinLnBrk="0" hangingPunct="1">
+              <a:lnSpc>
+                <a:spcPct val="90000"/>
+              </a:lnSpc>
+              <a:spcBef>
+                <a:spcPts val="500"/>
+              </a:spcBef>
+              <a:buFont typeface="Arial" panose="020B0604020202020204" pitchFamily="34" charset="0"/>
+              <a:buChar char="•"/>
+              <a:defRPr sz="1800" kern="1200">
+                <a:solidFill>
+                  <a:schemeClr val="tx1"/>
+                </a:solidFill>
+                <a:latin typeface="+mn-lt"/>
+                <a:ea typeface="+mn-ea"/>
+                <a:cs typeface="+mn-cs"/>
+              </a:defRPr>
+            </a:lvl8pPr>
+            <a:lvl9pPr marL="3886200" indent="-228600" algn="l" defTabSz="914400" rtl="0" eaLnBrk="1" latinLnBrk="0" hangingPunct="1">
+              <a:lnSpc>
+                <a:spcPct val="90000"/>
+              </a:lnSpc>
+              <a:spcBef>
+                <a:spcPts val="500"/>
+              </a:spcBef>
+              <a:buFont typeface="Arial" panose="020B0604020202020204" pitchFamily="34" charset="0"/>
+              <a:buChar char="•"/>
+              <a:defRPr sz="1800" kern="1200">
+                <a:solidFill>
+                  <a:schemeClr val="tx1"/>
+                </a:solidFill>
+                <a:latin typeface="+mn-lt"/>
+                <a:ea typeface="+mn-ea"/>
+                <a:cs typeface="+mn-cs"/>
+              </a:defRPr>
+            </a:lvl9pPr>
+          </a:lstStyle>
+          <a:p>
+            <a:pPr marL="0" indent="0" algn="ctr">
+              <a:buNone/>
+            </a:pPr>
+            <a:r>
+              <a:rPr lang="es-ES" sz="2200" b="1" dirty="0"/>
+              <a:t>Consulta de horarios de partida y llegada: </a:t>
+            </a:r>
+            <a:r>
+              <a:rPr lang="es-ES" sz="2200" dirty="0"/>
+              <a:t>El usuario administrador debe poder visualizar el horario de partida y llegada de cada tren.</a:t>
+            </a:r>
+          </a:p>
+        </p:txBody>
+      </p:sp>
+      <p:sp>
+        <p:nvSpPr>
+          <p:cNvPr id="14" name="Marcador de contenido 2"/>
+          <p:cNvSpPr txBox="1">
+            <a:spLocks/>
+          </p:cNvSpPr>
+          <p:nvPr/>
+        </p:nvSpPr>
+        <p:spPr>
+          <a:xfrm>
+            <a:off x="641929" y="4918660"/>
+            <a:ext cx="4401127" cy="396730"/>
+          </a:xfrm>
+          <a:prstGeom prst="rect">
+            <a:avLst/>
+          </a:prstGeom>
+        </p:spPr>
+        <p:txBody>
+          <a:bodyPr vert="horz" lIns="91440" tIns="45720" rIns="91440" bIns="45720" rtlCol="0">
+            <a:noAutofit/>
+          </a:bodyPr>
+          <a:lstStyle>
+            <a:lvl1pPr marL="228600" indent="-228600" algn="l" defTabSz="914400" rtl="0" eaLnBrk="1" latinLnBrk="0" hangingPunct="1">
+              <a:lnSpc>
+                <a:spcPct val="90000"/>
+              </a:lnSpc>
+              <a:spcBef>
+                <a:spcPts val="1000"/>
+              </a:spcBef>
+              <a:buFont typeface="Arial" panose="020B0604020202020204" pitchFamily="34" charset="0"/>
+              <a:buChar char="•"/>
+              <a:defRPr sz="2800" kern="1200">
+                <a:solidFill>
+                  <a:schemeClr val="tx1"/>
+                </a:solidFill>
+                <a:latin typeface="+mn-lt"/>
+                <a:ea typeface="+mn-ea"/>
+                <a:cs typeface="+mn-cs"/>
+              </a:defRPr>
+            </a:lvl1pPr>
+            <a:lvl2pPr marL="685800" indent="-228600" algn="l" defTabSz="914400" rtl="0" eaLnBrk="1" latinLnBrk="0" hangingPunct="1">
+              <a:lnSpc>
+                <a:spcPct val="90000"/>
+              </a:lnSpc>
+              <a:spcBef>
+                <a:spcPts val="500"/>
+              </a:spcBef>
+              <a:buFont typeface="Arial" panose="020B0604020202020204" pitchFamily="34" charset="0"/>
+              <a:buChar char="•"/>
+              <a:defRPr sz="2400" kern="1200">
+                <a:solidFill>
+                  <a:schemeClr val="tx1"/>
+                </a:solidFill>
+                <a:latin typeface="+mn-lt"/>
+                <a:ea typeface="+mn-ea"/>
+                <a:cs typeface="+mn-cs"/>
+              </a:defRPr>
+            </a:lvl2pPr>
+            <a:lvl3pPr marL="1143000" indent="-228600" algn="l" defTabSz="914400" rtl="0" eaLnBrk="1" latinLnBrk="0" hangingPunct="1">
+              <a:lnSpc>
+                <a:spcPct val="90000"/>
+              </a:lnSpc>
+              <a:spcBef>
+                <a:spcPts val="500"/>
+              </a:spcBef>
+              <a:buFont typeface="Arial" panose="020B0604020202020204" pitchFamily="34" charset="0"/>
+              <a:buChar char="•"/>
+              <a:defRPr sz="2000" kern="1200">
+                <a:solidFill>
+                  <a:schemeClr val="tx1"/>
+                </a:solidFill>
+                <a:latin typeface="+mn-lt"/>
+                <a:ea typeface="+mn-ea"/>
+                <a:cs typeface="+mn-cs"/>
+              </a:defRPr>
+            </a:lvl3pPr>
+            <a:lvl4pPr marL="1600200" indent="-228600" algn="l" defTabSz="914400" rtl="0" eaLnBrk="1" latinLnBrk="0" hangingPunct="1">
+              <a:lnSpc>
+                <a:spcPct val="90000"/>
+              </a:lnSpc>
+              <a:spcBef>
+                <a:spcPts val="500"/>
+              </a:spcBef>
+              <a:buFont typeface="Arial" panose="020B0604020202020204" pitchFamily="34" charset="0"/>
+              <a:buChar char="•"/>
+              <a:defRPr sz="1800" kern="1200">
+                <a:solidFill>
+                  <a:schemeClr val="tx1"/>
+                </a:solidFill>
+                <a:latin typeface="+mn-lt"/>
+                <a:ea typeface="+mn-ea"/>
+                <a:cs typeface="+mn-cs"/>
+              </a:defRPr>
+            </a:lvl4pPr>
+            <a:lvl5pPr marL="2057400" indent="-228600" algn="l" defTabSz="914400" rtl="0" eaLnBrk="1" latinLnBrk="0" hangingPunct="1">
+              <a:lnSpc>
+                <a:spcPct val="90000"/>
+              </a:lnSpc>
+              <a:spcBef>
+                <a:spcPts val="500"/>
+              </a:spcBef>
+              <a:buFont typeface="Arial" panose="020B0604020202020204" pitchFamily="34" charset="0"/>
+              <a:buChar char="•"/>
+              <a:defRPr sz="1800" kern="1200">
+                <a:solidFill>
+                  <a:schemeClr val="tx1"/>
+                </a:solidFill>
+                <a:latin typeface="+mn-lt"/>
+                <a:ea typeface="+mn-ea"/>
+                <a:cs typeface="+mn-cs"/>
+              </a:defRPr>
+            </a:lvl5pPr>
+            <a:lvl6pPr marL="2514600" indent="-228600" algn="l" defTabSz="914400" rtl="0" eaLnBrk="1" latinLnBrk="0" hangingPunct="1">
+              <a:lnSpc>
+                <a:spcPct val="90000"/>
+              </a:lnSpc>
+              <a:spcBef>
+                <a:spcPts val="500"/>
+              </a:spcBef>
+              <a:buFont typeface="Arial" panose="020B0604020202020204" pitchFamily="34" charset="0"/>
+              <a:buChar char="•"/>
+              <a:defRPr sz="1800" kern="1200">
+                <a:solidFill>
+                  <a:schemeClr val="tx1"/>
+                </a:solidFill>
+                <a:latin typeface="+mn-lt"/>
+                <a:ea typeface="+mn-ea"/>
+                <a:cs typeface="+mn-cs"/>
+              </a:defRPr>
+            </a:lvl6pPr>
+            <a:lvl7pPr marL="2971800" indent="-228600" algn="l" defTabSz="914400" rtl="0" eaLnBrk="1" latinLnBrk="0" hangingPunct="1">
+              <a:lnSpc>
+                <a:spcPct val="90000"/>
+              </a:lnSpc>
+              <a:spcBef>
+                <a:spcPts val="500"/>
+              </a:spcBef>
+              <a:buFont typeface="Arial" panose="020B0604020202020204" pitchFamily="34" charset="0"/>
+              <a:buChar char="•"/>
+              <a:defRPr sz="1800" kern="1200">
+                <a:solidFill>
+                  <a:schemeClr val="tx1"/>
+                </a:solidFill>
+                <a:latin typeface="+mn-lt"/>
+                <a:ea typeface="+mn-ea"/>
+                <a:cs typeface="+mn-cs"/>
+              </a:defRPr>
+            </a:lvl7pPr>
+            <a:lvl8pPr marL="3429000" indent="-228600" algn="l" defTabSz="914400" rtl="0" eaLnBrk="1" latinLnBrk="0" hangingPunct="1">
+              <a:lnSpc>
+                <a:spcPct val="90000"/>
+              </a:lnSpc>
+              <a:spcBef>
+                <a:spcPts val="500"/>
+              </a:spcBef>
+              <a:buFont typeface="Arial" panose="020B0604020202020204" pitchFamily="34" charset="0"/>
+              <a:buChar char="•"/>
+              <a:defRPr sz="1800" kern="1200">
+                <a:solidFill>
+                  <a:schemeClr val="tx1"/>
+                </a:solidFill>
+                <a:latin typeface="+mn-lt"/>
+                <a:ea typeface="+mn-ea"/>
+                <a:cs typeface="+mn-cs"/>
+              </a:defRPr>
+            </a:lvl8pPr>
+            <a:lvl9pPr marL="3886200" indent="-228600" algn="l" defTabSz="914400" rtl="0" eaLnBrk="1" latinLnBrk="0" hangingPunct="1">
+              <a:lnSpc>
+                <a:spcPct val="90000"/>
+              </a:lnSpc>
+              <a:spcBef>
+                <a:spcPts val="500"/>
+              </a:spcBef>
+              <a:buFont typeface="Arial" panose="020B0604020202020204" pitchFamily="34" charset="0"/>
+              <a:buChar char="•"/>
+              <a:defRPr sz="1800" kern="1200">
+                <a:solidFill>
+                  <a:schemeClr val="tx1"/>
+                </a:solidFill>
+                <a:latin typeface="+mn-lt"/>
+                <a:ea typeface="+mn-ea"/>
+                <a:cs typeface="+mn-cs"/>
+              </a:defRPr>
+            </a:lvl9pPr>
+          </a:lstStyle>
+          <a:p>
+            <a:pPr marL="0" indent="0" algn="ctr">
+              <a:buNone/>
+            </a:pPr>
+            <a:r>
+              <a:rPr lang="es-PE" sz="2000" b="1" dirty="0" smtClean="0">
+                <a:solidFill>
+                  <a:schemeClr val="bg1"/>
+                </a:solidFill>
+              </a:rPr>
+              <a:t>Función de seguridad</a:t>
+            </a:r>
+            <a:endParaRPr lang="es-ES" sz="1600" dirty="0">
+              <a:solidFill>
+                <a:schemeClr val="bg1"/>
+              </a:solidFill>
+            </a:endParaRPr>
+          </a:p>
+        </p:txBody>
+      </p:sp>
+    </p:spTree>
+    <p:extLst>
+      <p:ext uri="{BB962C8B-B14F-4D97-AF65-F5344CB8AC3E}">
+        <p14:creationId xmlns:p14="http://schemas.microsoft.com/office/powerpoint/2010/main" val="3222981627"/>
+      </p:ext>
+    </p:extLst>
+  </p:cSld>
+  <p:clrMapOvr>
+    <a:masterClrMapping/>
+  </p:clrMapOvr>
+  <p:timing>
+    <p:tnLst>
+      <p:par>
+        <p:cTn id="1" dur="indefinite" restart="never" nodeType="tmRoot"/>
+      </p:par>
+    </p:tnLst>
+  </p:timing>
+</p:sld>
+</file>
+
+<file path=ppt/slides/slide4.xml><?xml version="1.0" encoding="utf-8"?>
+<p:sld xmlns:a="http://schemas.openxmlformats.org/drawingml/2006/main" xmlns:r="http://schemas.openxmlformats.org/officeDocument/2006/relationships" xmlns:p="http://schemas.openxmlformats.org/presentationml/2006/main">
+  <p:cSld>
+    <p:spTree>
+      <p:nvGrpSpPr>
+        <p:cNvPr id="1" name=""/>
+        <p:cNvGrpSpPr/>
+        <p:nvPr/>
+      </p:nvGrpSpPr>
+      <p:grpSpPr>
+        <a:xfrm>
+          <a:off x="0" y="0"/>
+          <a:ext cx="0" cy="0"/>
+          <a:chOff x="0" y="0"/>
+          <a:chExt cx="0" cy="0"/>
+        </a:xfrm>
+      </p:grpSpPr>
+      <p:sp>
+        <p:nvSpPr>
+          <p:cNvPr id="2" name="Título 1"/>
+          <p:cNvSpPr>
+            <a:spLocks noGrp="1"/>
+          </p:cNvSpPr>
+          <p:nvPr>
+            <p:ph type="title"/>
+          </p:nvPr>
+        </p:nvSpPr>
+        <p:spPr>
+          <a:xfrm>
+            <a:off x="4107873" y="-189057"/>
+            <a:ext cx="10515600" cy="1325563"/>
+          </a:xfrm>
+        </p:spPr>
+        <p:txBody>
+          <a:bodyPr/>
+          <a:lstStyle/>
+          <a:p>
+            <a:r>
+              <a:rPr lang="es-PE" b="1" dirty="0" smtClean="0">
+                <a:solidFill>
+                  <a:srgbClr val="C00000"/>
+                </a:solidFill>
+              </a:rPr>
+              <a:t>DEMO</a:t>
+            </a:r>
+            <a:endParaRPr lang="es-ES" b="1" dirty="0">
+              <a:solidFill>
+                <a:srgbClr val="C00000"/>
+              </a:solidFill>
+            </a:endParaRPr>
+          </a:p>
+        </p:txBody>
+      </p:sp>
+      <p:pic>
+        <p:nvPicPr>
+          <p:cNvPr id="4" name="Imagen 3"/>
+          <p:cNvPicPr>
+            <a:picLocks noChangeAspect="1"/>
+          </p:cNvPicPr>
+          <p:nvPr/>
+        </p:nvPicPr>
+        <p:blipFill>
+          <a:blip r:embed="rId2"/>
+          <a:stretch>
+            <a:fillRect/>
+          </a:stretch>
+        </p:blipFill>
+        <p:spPr>
+          <a:xfrm>
+            <a:off x="591126" y="673774"/>
+            <a:ext cx="10612583" cy="5537682"/>
+          </a:xfrm>
+          <a:prstGeom prst="rect">
+            <a:avLst/>
+          </a:prstGeom>
+        </p:spPr>
+      </p:pic>
+    </p:spTree>
+    <p:extLst>
+      <p:ext uri="{BB962C8B-B14F-4D97-AF65-F5344CB8AC3E}">
+        <p14:creationId xmlns:p14="http://schemas.microsoft.com/office/powerpoint/2010/main" val="3180144397"/>
+      </p:ext>
+    </p:extLst>
+  </p:cSld>
+  <p:clrMapOvr>
+    <a:masterClrMapping/>
+  </p:clrMapOvr>
+  <p:timing>
+    <p:tnLst>
+      <p:par>
+        <p:cTn id="1" dur="indefinite" restart="never" nodeType="tmRoot"/>
+      </p:par>
+    </p:tnLst>
+  </p:timing>
+</p:sld>
+</file>
+
+<file path=ppt/slides/slide5.xml><?xml version="1.0" encoding="utf-8"?>
+<p:sld xmlns:a="http://schemas.openxmlformats.org/drawingml/2006/main" xmlns:r="http://schemas.openxmlformats.org/officeDocument/2006/relationships" xmlns:p="http://schemas.openxmlformats.org/presentationml/2006/main">
+  <p:cSld>
+    <p:spTree>
+      <p:nvGrpSpPr>
+        <p:cNvPr id="1" name=""/>
+        <p:cNvGrpSpPr/>
+        <p:nvPr/>
+      </p:nvGrpSpPr>
+      <p:grpSpPr>
+        <a:xfrm>
+          <a:off x="0" y="0"/>
+          <a:ext cx="0" cy="0"/>
+          <a:chOff x="0" y="0"/>
+          <a:chExt cx="0" cy="0"/>
+        </a:xfrm>
+      </p:grpSpPr>
+      <p:sp>
+        <p:nvSpPr>
+          <p:cNvPr id="2" name="Título 1"/>
+          <p:cNvSpPr>
+            <a:spLocks noGrp="1"/>
+          </p:cNvSpPr>
+          <p:nvPr>
+            <p:ph type="title"/>
+          </p:nvPr>
+        </p:nvSpPr>
+        <p:spPr>
+          <a:xfrm>
+            <a:off x="3553691" y="0"/>
+            <a:ext cx="10515600" cy="1325563"/>
+          </a:xfrm>
+        </p:spPr>
+        <p:txBody>
+          <a:bodyPr/>
+          <a:lstStyle/>
+          <a:p>
+            <a:r>
+              <a:rPr lang="es-PE" b="1" dirty="0" smtClean="0">
+                <a:solidFill>
+                  <a:srgbClr val="C00000"/>
+                </a:solidFill>
+              </a:rPr>
+              <a:t>DEMO</a:t>
+            </a:r>
+            <a:endParaRPr lang="es-ES" b="1" dirty="0">
+              <a:solidFill>
+                <a:srgbClr val="C00000"/>
+              </a:solidFill>
+            </a:endParaRPr>
+          </a:p>
+        </p:txBody>
+      </p:sp>
+      <p:pic>
+        <p:nvPicPr>
+          <p:cNvPr id="5" name="Imagen 4"/>
+          <p:cNvPicPr>
+            <a:picLocks noChangeAspect="1"/>
+          </p:cNvPicPr>
+          <p:nvPr/>
+        </p:nvPicPr>
+        <p:blipFill>
+          <a:blip r:embed="rId2"/>
+          <a:stretch>
+            <a:fillRect/>
+          </a:stretch>
+        </p:blipFill>
+        <p:spPr>
+          <a:xfrm>
+            <a:off x="584872" y="1057542"/>
+            <a:ext cx="2538639" cy="5098493"/>
+          </a:xfrm>
+          <a:prstGeom prst="rect">
+            <a:avLst/>
+          </a:prstGeom>
+        </p:spPr>
+      </p:pic>
+      <p:pic>
+        <p:nvPicPr>
+          <p:cNvPr id="6" name="Imagen 5"/>
+          <p:cNvPicPr>
+            <a:picLocks noChangeAspect="1"/>
+          </p:cNvPicPr>
+          <p:nvPr/>
+        </p:nvPicPr>
+        <p:blipFill>
+          <a:blip r:embed="rId3"/>
+          <a:stretch>
+            <a:fillRect/>
+          </a:stretch>
+        </p:blipFill>
+        <p:spPr>
+          <a:xfrm>
+            <a:off x="3346023" y="1057542"/>
+            <a:ext cx="2585051" cy="5098493"/>
+          </a:xfrm>
+          <a:prstGeom prst="rect">
+            <a:avLst/>
+          </a:prstGeom>
+        </p:spPr>
+      </p:pic>
+      <p:pic>
+        <p:nvPicPr>
+          <p:cNvPr id="7" name="Imagen 6"/>
+          <p:cNvPicPr>
+            <a:picLocks noChangeAspect="1"/>
+          </p:cNvPicPr>
+          <p:nvPr/>
+        </p:nvPicPr>
+        <p:blipFill>
+          <a:blip r:embed="rId4"/>
+          <a:stretch>
+            <a:fillRect/>
+          </a:stretch>
+        </p:blipFill>
+        <p:spPr>
+          <a:xfrm>
+            <a:off x="6376097" y="1097024"/>
+            <a:ext cx="2534288" cy="5082813"/>
+          </a:xfrm>
+          <a:prstGeom prst="rect">
+            <a:avLst/>
+          </a:prstGeom>
+        </p:spPr>
+      </p:pic>
+      <p:pic>
+        <p:nvPicPr>
+          <p:cNvPr id="8" name="Imagen 7"/>
+          <p:cNvPicPr>
+            <a:picLocks noChangeAspect="1"/>
+          </p:cNvPicPr>
+          <p:nvPr/>
+        </p:nvPicPr>
+        <p:blipFill>
+          <a:blip r:embed="rId5"/>
+          <a:stretch>
+            <a:fillRect/>
+          </a:stretch>
+        </p:blipFill>
+        <p:spPr>
+          <a:xfrm>
+            <a:off x="9212406" y="1057542"/>
+            <a:ext cx="2537862" cy="5082813"/>
+          </a:xfrm>
+          <a:prstGeom prst="rect">
+            <a:avLst/>
+          </a:prstGeom>
+        </p:spPr>
+      </p:pic>
+    </p:spTree>
+    <p:extLst>
+      <p:ext uri="{BB962C8B-B14F-4D97-AF65-F5344CB8AC3E}">
+        <p14:creationId xmlns:p14="http://schemas.microsoft.com/office/powerpoint/2010/main" val="235248119"/>
+      </p:ext>
+    </p:extLst>
+  </p:cSld>
+  <p:clrMapOvr>
+    <a:masterClrMapping/>
+  </p:clrMapOvr>
+  <p:timing>
+    <p:tnLst>
+      <p:par>
+        <p:cTn id="1" dur="indefinite" restart="never" nodeType="tmRoot"/>
+      </p:par>
+    </p:tnLst>
+  </p:timing>
+</p:sld>
+</file>
+
+<file path=ppt/slides/slide6.xml><?xml version="1.0" encoding="utf-8"?>
+<p:sld xmlns:a="http://schemas.openxmlformats.org/drawingml/2006/main" xmlns:r="http://schemas.openxmlformats.org/officeDocument/2006/relationships" xmlns:p="http://schemas.openxmlformats.org/presentationml/2006/main">
+  <p:cSld>
+    <p:spTree>
+      <p:nvGrpSpPr>
+        <p:cNvPr id="1" name=""/>
+        <p:cNvGrpSpPr/>
+        <p:nvPr/>
+      </p:nvGrpSpPr>
+      <p:grpSpPr>
+        <a:xfrm>
+          <a:off x="0" y="0"/>
+          <a:ext cx="0" cy="0"/>
+          <a:chOff x="0" y="0"/>
+          <a:chExt cx="0" cy="0"/>
+        </a:xfrm>
+      </p:grpSpPr>
+      <p:sp>
+        <p:nvSpPr>
+          <p:cNvPr id="3" name="Marcador de contenido 2"/>
+          <p:cNvSpPr>
+            <a:spLocks noGrp="1"/>
+          </p:cNvSpPr>
+          <p:nvPr>
+            <p:ph idx="1"/>
+          </p:nvPr>
+        </p:nvSpPr>
+        <p:spPr>
+          <a:xfrm>
+            <a:off x="598056" y="2124363"/>
+            <a:ext cx="10515600" cy="2260744"/>
+          </a:xfrm>
+        </p:spPr>
+        <p:txBody>
+          <a:bodyPr>
+            <a:normAutofit/>
+          </a:bodyPr>
+          <a:lstStyle/>
+          <a:p>
+            <a:pPr marL="0" indent="0" algn="ctr">
+              <a:buNone/>
+            </a:pPr>
+            <a:r>
+              <a:rPr lang="es-PE" sz="6000" b="1" dirty="0" smtClean="0">
+                <a:solidFill>
+                  <a:srgbClr val="C00000"/>
+                </a:solidFill>
+              </a:rPr>
+              <a:t>GRACIAS</a:t>
+            </a:r>
+            <a:endParaRPr lang="es-ES" sz="6000" b="1" dirty="0">
+              <a:solidFill>
+                <a:srgbClr val="C00000"/>
+              </a:solidFill>
+            </a:endParaRPr>
+          </a:p>
+        </p:txBody>
+      </p:sp>
+      <p:pic>
+        <p:nvPicPr>
+          <p:cNvPr id="4" name="Imagen 3"/>
+          <p:cNvPicPr>
+            <a:picLocks noChangeAspect="1"/>
+          </p:cNvPicPr>
+          <p:nvPr/>
+        </p:nvPicPr>
+        <p:blipFill>
+          <a:blip r:embed="rId2" cstate="print">
+            <a:extLst>
+              <a:ext uri="{28A0092B-C50C-407E-A947-70E740481C1C}">
+                <a14:useLocalDpi xmlns:a14="http://schemas.microsoft.com/office/drawing/2010/main" val="0"/>
+              </a:ext>
+            </a:extLst>
+          </a:blip>
+          <a:stretch>
+            <a:fillRect/>
+          </a:stretch>
+        </p:blipFill>
+        <p:spPr>
+          <a:xfrm>
+            <a:off x="2306587" y="4385107"/>
+            <a:ext cx="6421776" cy="1038617"/>
+          </a:xfrm>
+          <a:prstGeom prst="rect">
+            <a:avLst/>
+          </a:prstGeom>
+        </p:spPr>
+      </p:pic>
+    </p:spTree>
+    <p:extLst>
+      <p:ext uri="{BB962C8B-B14F-4D97-AF65-F5344CB8AC3E}">
+        <p14:creationId xmlns:p14="http://schemas.microsoft.com/office/powerpoint/2010/main" val="2488998528"/>
+      </p:ext>
+    </p:extLst>
+  </p:cSld>
+  <p:clrMapOvr>
+    <a:masterClrMapping/>
+  </p:clrMapOvr>
+  <p:timing>
+    <p:tnLst>
+      <p:par>
+        <p:cTn id="1" dur="indefinite" restart="never" nodeType="tmRoot"/>
+      </p:par>
+    </p:tnLst>
+  </p:timing>
 </p:sld>
 </file>
 

</xml_diff>

<commit_message>
Agregue los contenidos que serán utilizados en el PPT y PDF
</commit_message>
<xml_diff>
--- a/PrimerAvance/APFP-FirstDraft.pptx
+++ b/PrimerAvance/APFP-FirstDraft.pptx
@@ -10,7 +10,8 @@
     <p:sldId id="257" r:id="rId4"/>
     <p:sldId id="259" r:id="rId5"/>
     <p:sldId id="260" r:id="rId6"/>
-    <p:sldId id="261" r:id="rId7"/>
+    <p:sldId id="262" r:id="rId7"/>
+    <p:sldId id="261" r:id="rId8"/>
   </p:sldIdLst>
   <p:sldSz cx="12192000" cy="6858000"/>
   <p:notesSz cx="6858000" cy="9144000"/>
@@ -3188,7 +3189,6 @@
               <a:rPr lang="es-ES" sz="3200" dirty="0"/>
               <a:t>los horarios del sistema, el saldo que tienen en sus tarjetas afiliadas, mantenerse informados en tiempo real sobre novedades e incidencias en el servicio, entre otros beneficios.</a:t>
             </a:r>
-            <a:endParaRPr lang="es-ES" sz="3200" dirty="0"/>
           </a:p>
         </p:txBody>
       </p:sp>
@@ -4773,6 +4773,203 @@
           </a:prstGeom>
         </p:spPr>
       </p:pic>
+      <p:cxnSp>
+        <p:nvCxnSpPr>
+          <p:cNvPr id="5" name="Conector recto de flecha 4">
+            <a:extLst>
+              <a:ext uri="{FF2B5EF4-FFF2-40B4-BE49-F238E27FC236}">
+                <a16:creationId xmlns:a16="http://schemas.microsoft.com/office/drawing/2014/main" id="{C26B9D47-B88F-4F53-AC52-02F54B951DD2}"/>
+              </a:ext>
+            </a:extLst>
+          </p:cNvPr>
+          <p:cNvCxnSpPr>
+            <a:cxnSpLocks/>
+            <a:endCxn id="6" idx="0"/>
+          </p:cNvCxnSpPr>
+          <p:nvPr/>
+        </p:nvCxnSpPr>
+        <p:spPr>
+          <a:xfrm>
+            <a:off x="8075360" y="1867452"/>
+            <a:ext cx="520148" cy="1278835"/>
+          </a:xfrm>
+          <a:prstGeom prst="straightConnector1">
+            <a:avLst/>
+          </a:prstGeom>
+          <a:ln>
+            <a:solidFill>
+              <a:srgbClr val="FF0000"/>
+            </a:solidFill>
+            <a:tailEnd type="triangle"/>
+          </a:ln>
+        </p:spPr>
+        <p:style>
+          <a:lnRef idx="3">
+            <a:schemeClr val="accent2"/>
+          </a:lnRef>
+          <a:fillRef idx="0">
+            <a:schemeClr val="accent2"/>
+          </a:fillRef>
+          <a:effectRef idx="2">
+            <a:schemeClr val="accent2"/>
+          </a:effectRef>
+          <a:fontRef idx="minor">
+            <a:schemeClr val="tx1"/>
+          </a:fontRef>
+        </p:style>
+      </p:cxnSp>
+      <p:sp>
+        <p:nvSpPr>
+          <p:cNvPr id="6" name="Rectángulo 5">
+            <a:extLst>
+              <a:ext uri="{FF2B5EF4-FFF2-40B4-BE49-F238E27FC236}">
+                <a16:creationId xmlns:a16="http://schemas.microsoft.com/office/drawing/2014/main" id="{4CD2051E-4555-4AD3-958B-B22F88A17FB8}"/>
+              </a:ext>
+            </a:extLst>
+          </p:cNvPr>
+          <p:cNvSpPr/>
+          <p:nvPr/>
+        </p:nvSpPr>
+        <p:spPr>
+          <a:xfrm>
+            <a:off x="8138308" y="3146287"/>
+            <a:ext cx="914400" cy="433283"/>
+          </a:xfrm>
+          <a:prstGeom prst="rect">
+            <a:avLst/>
+          </a:prstGeom>
+          <a:solidFill>
+            <a:srgbClr val="FFFF00"/>
+          </a:solidFill>
+        </p:spPr>
+        <p:style>
+          <a:lnRef idx="2">
+            <a:schemeClr val="accent3"/>
+          </a:lnRef>
+          <a:fillRef idx="1">
+            <a:schemeClr val="lt1"/>
+          </a:fillRef>
+          <a:effectRef idx="0">
+            <a:schemeClr val="accent3"/>
+          </a:effectRef>
+          <a:fontRef idx="minor">
+            <a:schemeClr val="dk1"/>
+          </a:fontRef>
+        </p:style>
+        <p:txBody>
+          <a:bodyPr rtlCol="0" anchor="ctr"/>
+          <a:lstStyle/>
+          <a:p>
+            <a:pPr algn="ctr"/>
+            <a:r>
+              <a:rPr lang="es-PE" b="1" dirty="0"/>
+              <a:t>Vistas </a:t>
+            </a:r>
+          </a:p>
+        </p:txBody>
+      </p:sp>
+      <p:sp>
+        <p:nvSpPr>
+          <p:cNvPr id="7" name="Rectángulo 6">
+            <a:extLst>
+              <a:ext uri="{FF2B5EF4-FFF2-40B4-BE49-F238E27FC236}">
+                <a16:creationId xmlns:a16="http://schemas.microsoft.com/office/drawing/2014/main" id="{F8CBCAD6-0C6E-477D-9578-C5109764AE1F}"/>
+              </a:ext>
+            </a:extLst>
+          </p:cNvPr>
+          <p:cNvSpPr/>
+          <p:nvPr/>
+        </p:nvSpPr>
+        <p:spPr>
+          <a:xfrm>
+            <a:off x="7783812" y="5680513"/>
+            <a:ext cx="1775792" cy="498390"/>
+          </a:xfrm>
+          <a:prstGeom prst="rect">
+            <a:avLst/>
+          </a:prstGeom>
+          <a:solidFill>
+            <a:srgbClr val="FFFF00"/>
+          </a:solidFill>
+        </p:spPr>
+        <p:style>
+          <a:lnRef idx="2">
+            <a:schemeClr val="accent3"/>
+          </a:lnRef>
+          <a:fillRef idx="1">
+            <a:schemeClr val="lt1"/>
+          </a:fillRef>
+          <a:effectRef idx="0">
+            <a:schemeClr val="accent3"/>
+          </a:effectRef>
+          <a:fontRef idx="minor">
+            <a:schemeClr val="dk1"/>
+          </a:fontRef>
+        </p:style>
+        <p:txBody>
+          <a:bodyPr rtlCol="0" anchor="ctr"/>
+          <a:lstStyle/>
+          <a:p>
+            <a:pPr algn="ctr"/>
+            <a:r>
+              <a:rPr lang="es-PE" b="1" dirty="0" err="1"/>
+              <a:t>footer</a:t>
+            </a:r>
+            <a:endParaRPr lang="es-PE" b="1" dirty="0"/>
+          </a:p>
+        </p:txBody>
+      </p:sp>
+      <p:sp>
+        <p:nvSpPr>
+          <p:cNvPr id="8" name="Rectángulo 7">
+            <a:extLst>
+              <a:ext uri="{FF2B5EF4-FFF2-40B4-BE49-F238E27FC236}">
+                <a16:creationId xmlns:a16="http://schemas.microsoft.com/office/drawing/2014/main" id="{3C207052-A985-4B17-828A-41874475EA50}"/>
+              </a:ext>
+            </a:extLst>
+          </p:cNvPr>
+          <p:cNvSpPr/>
+          <p:nvPr/>
+        </p:nvSpPr>
+        <p:spPr>
+          <a:xfrm>
+            <a:off x="591126" y="1136506"/>
+            <a:ext cx="914400" cy="410818"/>
+          </a:xfrm>
+          <a:prstGeom prst="rect">
+            <a:avLst/>
+          </a:prstGeom>
+          <a:solidFill>
+            <a:srgbClr val="FFFF00"/>
+          </a:solidFill>
+        </p:spPr>
+        <p:style>
+          <a:lnRef idx="2">
+            <a:schemeClr val="accent3"/>
+          </a:lnRef>
+          <a:fillRef idx="1">
+            <a:schemeClr val="lt1"/>
+          </a:fillRef>
+          <a:effectRef idx="0">
+            <a:schemeClr val="accent3"/>
+          </a:effectRef>
+          <a:fontRef idx="minor">
+            <a:schemeClr val="dk1"/>
+          </a:fontRef>
+        </p:style>
+        <p:txBody>
+          <a:bodyPr rtlCol="0" anchor="ctr"/>
+          <a:lstStyle/>
+          <a:p>
+            <a:pPr algn="ctr"/>
+            <a:r>
+              <a:rPr lang="es-PE" sz="1400" b="1" dirty="0" err="1"/>
+              <a:t>header</a:t>
+            </a:r>
+            <a:endParaRPr lang="es-PE" sz="1400" b="1" dirty="0"/>
+          </a:p>
+        </p:txBody>
+      </p:sp>
     </p:spTree>
     <p:extLst>
       <p:ext uri="{BB962C8B-B14F-4D97-AF65-F5344CB8AC3E}">
@@ -4963,6 +5160,389 @@
 </file>
 
 <file path=ppt/slides/slide6.xml><?xml version="1.0" encoding="utf-8"?>
+<p:sld xmlns:a="http://schemas.openxmlformats.org/drawingml/2006/main" xmlns:r="http://schemas.openxmlformats.org/officeDocument/2006/relationships" xmlns:p="http://schemas.openxmlformats.org/presentationml/2006/main">
+  <p:cSld>
+    <p:spTree>
+      <p:nvGrpSpPr>
+        <p:cNvPr id="1" name=""/>
+        <p:cNvGrpSpPr/>
+        <p:nvPr/>
+      </p:nvGrpSpPr>
+      <p:grpSpPr>
+        <a:xfrm>
+          <a:off x="0" y="0"/>
+          <a:ext cx="0" cy="0"/>
+          <a:chOff x="0" y="0"/>
+          <a:chExt cx="0" cy="0"/>
+        </a:xfrm>
+      </p:grpSpPr>
+      <p:sp>
+        <p:nvSpPr>
+          <p:cNvPr id="3" name="Marcador de contenido 2"/>
+          <p:cNvSpPr>
+            <a:spLocks noGrp="1"/>
+          </p:cNvSpPr>
+          <p:nvPr>
+            <p:ph idx="1"/>
+          </p:nvPr>
+        </p:nvSpPr>
+        <p:spPr/>
+        <p:txBody>
+          <a:bodyPr>
+            <a:normAutofit fontScale="47500" lnSpcReduction="20000"/>
+          </a:bodyPr>
+          <a:lstStyle/>
+          <a:p>
+            <a:pPr algn="just">
+              <a:lnSpc>
+                <a:spcPct val="150000"/>
+              </a:lnSpc>
+            </a:pPr>
+            <a:r>
+              <a:rPr lang="es-PE" dirty="0" smtClean="0">
+                <a:latin typeface="Arial" panose="020B0604020202020204" pitchFamily="34" charset="0"/>
+                <a:cs typeface="Arial" panose="020B0604020202020204" pitchFamily="34" charset="0"/>
+              </a:rPr>
+              <a:t>El </a:t>
+            </a:r>
+            <a:r>
+              <a:rPr lang="es-PE" dirty="0">
+                <a:latin typeface="Arial" panose="020B0604020202020204" pitchFamily="34" charset="0"/>
+                <a:cs typeface="Arial" panose="020B0604020202020204" pitchFamily="34" charset="0"/>
+              </a:rPr>
+              <a:t>proyecto será un </a:t>
+            </a:r>
+            <a:r>
+              <a:rPr lang="es-PE" dirty="0" err="1">
+                <a:latin typeface="Arial" panose="020B0604020202020204" pitchFamily="34" charset="0"/>
+                <a:cs typeface="Arial" panose="020B0604020202020204" pitchFamily="34" charset="0"/>
+              </a:rPr>
+              <a:t>Dynamic</a:t>
+            </a:r>
+            <a:r>
+              <a:rPr lang="es-PE" dirty="0">
+                <a:latin typeface="Arial" panose="020B0604020202020204" pitchFamily="34" charset="0"/>
+                <a:cs typeface="Arial" panose="020B0604020202020204" pitchFamily="34" charset="0"/>
+              </a:rPr>
+              <a:t> web </a:t>
+            </a:r>
+            <a:r>
+              <a:rPr lang="es-PE" dirty="0" err="1">
+                <a:latin typeface="Arial" panose="020B0604020202020204" pitchFamily="34" charset="0"/>
+                <a:cs typeface="Arial" panose="020B0604020202020204" pitchFamily="34" charset="0"/>
+              </a:rPr>
+              <a:t>project</a:t>
+            </a:r>
+            <a:r>
+              <a:rPr lang="es-PE" dirty="0">
+                <a:latin typeface="Arial" panose="020B0604020202020204" pitchFamily="34" charset="0"/>
+                <a:cs typeface="Arial" panose="020B0604020202020204" pitchFamily="34" charset="0"/>
+              </a:rPr>
+              <a:t> implementado con la arquitectura MVC(Modelo Vista Controlador), las herramientas que utilizaremos para realizar dicha tarea son Eclipse, el servidor Apache </a:t>
+            </a:r>
+            <a:r>
+              <a:rPr lang="es-PE" dirty="0" err="1">
+                <a:latin typeface="Arial" panose="020B0604020202020204" pitchFamily="34" charset="0"/>
+                <a:cs typeface="Arial" panose="020B0604020202020204" pitchFamily="34" charset="0"/>
+              </a:rPr>
+              <a:t>Tomcat</a:t>
+            </a:r>
+            <a:r>
+              <a:rPr lang="es-PE" dirty="0">
+                <a:latin typeface="Arial" panose="020B0604020202020204" pitchFamily="34" charset="0"/>
+                <a:cs typeface="Arial" panose="020B0604020202020204" pitchFamily="34" charset="0"/>
+              </a:rPr>
+              <a:t>, XAMPP y el sistema de manejo de base de datos que utilizaremos es el MYSQL. Los contenidos que tendrá el trabajo son las siguientes:</a:t>
+            </a:r>
+          </a:p>
+          <a:p>
+            <a:pPr algn="just">
+              <a:lnSpc>
+                <a:spcPct val="150000"/>
+              </a:lnSpc>
+              <a:buFont typeface="Wingdings" panose="05000000000000000000" pitchFamily="2" charset="2"/>
+              <a:buChar char="Ø"/>
+            </a:pPr>
+            <a:r>
+              <a:rPr lang="es-PE" dirty="0">
+                <a:latin typeface="Arial" panose="020B0604020202020204" pitchFamily="34" charset="0"/>
+                <a:cs typeface="Arial" panose="020B0604020202020204" pitchFamily="34" charset="0"/>
+              </a:rPr>
+              <a:t>En un paquete de nombre </a:t>
+            </a:r>
+            <a:r>
+              <a:rPr lang="es-PE" dirty="0" err="1">
+                <a:latin typeface="Arial" panose="020B0604020202020204" pitchFamily="34" charset="0"/>
+                <a:cs typeface="Arial" panose="020B0604020202020204" pitchFamily="34" charset="0"/>
+              </a:rPr>
+              <a:t>WebContent</a:t>
+            </a:r>
+            <a:r>
+              <a:rPr lang="es-PE" dirty="0">
+                <a:latin typeface="Arial" panose="020B0604020202020204" pitchFamily="34" charset="0"/>
+                <a:cs typeface="Arial" panose="020B0604020202020204" pitchFamily="34" charset="0"/>
+              </a:rPr>
+              <a:t> estarán todas las vistas </a:t>
+            </a:r>
+            <a:r>
+              <a:rPr lang="es-PE" dirty="0" err="1">
+                <a:latin typeface="Arial" panose="020B0604020202020204" pitchFamily="34" charset="0"/>
+                <a:cs typeface="Arial" panose="020B0604020202020204" pitchFamily="34" charset="0"/>
+              </a:rPr>
+              <a:t>jsp</a:t>
+            </a:r>
+            <a:r>
+              <a:rPr lang="es-PE" dirty="0">
+                <a:latin typeface="Arial" panose="020B0604020202020204" pitchFamily="34" charset="0"/>
+                <a:cs typeface="Arial" panose="020B0604020202020204" pitchFamily="34" charset="0"/>
+              </a:rPr>
+              <a:t>(Formularios con código HTML y JavaScript). La cual serán las interfaces de los usuarios, con estilos CSS. Para que sea más presentable.</a:t>
+            </a:r>
+          </a:p>
+          <a:p>
+            <a:pPr algn="just">
+              <a:lnSpc>
+                <a:spcPct val="150000"/>
+              </a:lnSpc>
+              <a:buFont typeface="Wingdings" panose="05000000000000000000" pitchFamily="2" charset="2"/>
+              <a:buChar char="Ø"/>
+            </a:pPr>
+            <a:r>
+              <a:rPr lang="es-PE" dirty="0">
+                <a:latin typeface="Arial" panose="020B0604020202020204" pitchFamily="34" charset="0"/>
+                <a:cs typeface="Arial" panose="020B0604020202020204" pitchFamily="34" charset="0"/>
+              </a:rPr>
+              <a:t>En “java </a:t>
+            </a:r>
+            <a:r>
+              <a:rPr lang="es-PE" dirty="0" err="1">
+                <a:latin typeface="Arial" panose="020B0604020202020204" pitchFamily="34" charset="0"/>
+                <a:cs typeface="Arial" panose="020B0604020202020204" pitchFamily="34" charset="0"/>
+              </a:rPr>
+              <a:t>Resources</a:t>
+            </a:r>
+            <a:r>
+              <a:rPr lang="es-PE" dirty="0">
+                <a:latin typeface="Arial" panose="020B0604020202020204" pitchFamily="34" charset="0"/>
+                <a:cs typeface="Arial" panose="020B0604020202020204" pitchFamily="34" charset="0"/>
+              </a:rPr>
+              <a:t>” crearemos un paquete de nombre “</a:t>
+            </a:r>
+            <a:r>
+              <a:rPr lang="es-PE" dirty="0" err="1">
+                <a:latin typeface="Arial" panose="020B0604020202020204" pitchFamily="34" charset="0"/>
+                <a:cs typeface="Arial" panose="020B0604020202020204" pitchFamily="34" charset="0"/>
+              </a:rPr>
+              <a:t>Src</a:t>
+            </a:r>
+            <a:r>
+              <a:rPr lang="es-PE" dirty="0">
+                <a:latin typeface="Arial" panose="020B0604020202020204" pitchFamily="34" charset="0"/>
+                <a:cs typeface="Arial" panose="020B0604020202020204" pitchFamily="34" charset="0"/>
+              </a:rPr>
+              <a:t>” en la cual encontraremos el controlador la cual Responde a eventos y invoca peticiones al ‘Modelo’ como por ejemplo eliminar, actualizar y agregar. También encontraremos el Modelo la cual genera la lógica de negocio y las consultas que realizaremos. Por otro lado, encontramos a la entidad los cual representas los campos de la base de datos y cada uno de los atributos están con métodos </a:t>
+            </a:r>
+            <a:r>
+              <a:rPr lang="es-PE" dirty="0" err="1">
+                <a:latin typeface="Arial" panose="020B0604020202020204" pitchFamily="34" charset="0"/>
+                <a:cs typeface="Arial" panose="020B0604020202020204" pitchFamily="34" charset="0"/>
+              </a:rPr>
+              <a:t>get</a:t>
+            </a:r>
+            <a:r>
+              <a:rPr lang="es-PE" dirty="0">
+                <a:latin typeface="Arial" panose="020B0604020202020204" pitchFamily="34" charset="0"/>
+                <a:cs typeface="Arial" panose="020B0604020202020204" pitchFamily="34" charset="0"/>
+              </a:rPr>
+              <a:t> y set.</a:t>
+            </a:r>
+          </a:p>
+          <a:p>
+            <a:pPr algn="just">
+              <a:lnSpc>
+                <a:spcPct val="150000"/>
+              </a:lnSpc>
+              <a:buFont typeface="Wingdings" panose="05000000000000000000" pitchFamily="2" charset="2"/>
+              <a:buChar char="Ø"/>
+            </a:pPr>
+            <a:r>
+              <a:rPr lang="es-PE" dirty="0">
+                <a:latin typeface="Arial" panose="020B0604020202020204" pitchFamily="34" charset="0"/>
+                <a:cs typeface="Arial" panose="020B0604020202020204" pitchFamily="34" charset="0"/>
+              </a:rPr>
+              <a:t>En el paquete Meta-</a:t>
+            </a:r>
+            <a:r>
+              <a:rPr lang="es-PE" dirty="0" err="1">
+                <a:latin typeface="Arial" panose="020B0604020202020204" pitchFamily="34" charset="0"/>
+                <a:cs typeface="Arial" panose="020B0604020202020204" pitchFamily="34" charset="0"/>
+              </a:rPr>
+              <a:t>inf</a:t>
+            </a:r>
+            <a:r>
+              <a:rPr lang="es-PE" dirty="0">
+                <a:latin typeface="Arial" panose="020B0604020202020204" pitchFamily="34" charset="0"/>
+                <a:cs typeface="Arial" panose="020B0604020202020204" pitchFamily="34" charset="0"/>
+              </a:rPr>
+              <a:t> crearemos un archivo XML para crear la conexión a la base de datos.</a:t>
+            </a:r>
+          </a:p>
+          <a:p>
+            <a:pPr algn="just">
+              <a:lnSpc>
+                <a:spcPct val="150000"/>
+              </a:lnSpc>
+              <a:buFont typeface="Wingdings" panose="05000000000000000000" pitchFamily="2" charset="2"/>
+              <a:buChar char="Ø"/>
+            </a:pPr>
+            <a:r>
+              <a:rPr lang="es-PE" dirty="0">
+                <a:latin typeface="Arial" panose="020B0604020202020204" pitchFamily="34" charset="0"/>
+                <a:cs typeface="Arial" panose="020B0604020202020204" pitchFamily="34" charset="0"/>
+              </a:rPr>
+              <a:t>En el MYSQL crearemos una base de datos con el comando créate </a:t>
+            </a:r>
+            <a:r>
+              <a:rPr lang="es-PE" dirty="0" err="1">
+                <a:latin typeface="Arial" panose="020B0604020202020204" pitchFamily="34" charset="0"/>
+                <a:cs typeface="Arial" panose="020B0604020202020204" pitchFamily="34" charset="0"/>
+              </a:rPr>
+              <a:t>database</a:t>
+            </a:r>
+            <a:r>
+              <a:rPr lang="es-PE" dirty="0">
+                <a:latin typeface="Arial" panose="020B0604020202020204" pitchFamily="34" charset="0"/>
+                <a:cs typeface="Arial" panose="020B0604020202020204" pitchFamily="34" charset="0"/>
+              </a:rPr>
+              <a:t> “el nombre”, luego crearemos los campos con la instrucción créate </a:t>
+            </a:r>
+            <a:r>
+              <a:rPr lang="es-PE" dirty="0" err="1">
+                <a:latin typeface="Arial" panose="020B0604020202020204" pitchFamily="34" charset="0"/>
+                <a:cs typeface="Arial" panose="020B0604020202020204" pitchFamily="34" charset="0"/>
+              </a:rPr>
+              <a:t>table</a:t>
+            </a:r>
+            <a:r>
+              <a:rPr lang="es-PE" dirty="0">
+                <a:latin typeface="Arial" panose="020B0604020202020204" pitchFamily="34" charset="0"/>
+                <a:cs typeface="Arial" panose="020B0604020202020204" pitchFamily="34" charset="0"/>
+              </a:rPr>
+              <a:t> “El _nombre de la tabla”(“dentro de esto los atributos con sus respectivos valores </a:t>
+            </a:r>
+            <a:r>
+              <a:rPr lang="es-PE" dirty="0" err="1">
+                <a:latin typeface="Arial" panose="020B0604020202020204" pitchFamily="34" charset="0"/>
+                <a:cs typeface="Arial" panose="020B0604020202020204" pitchFamily="34" charset="0"/>
+              </a:rPr>
+              <a:t>int</a:t>
+            </a:r>
+            <a:r>
+              <a:rPr lang="es-PE" dirty="0">
+                <a:latin typeface="Arial" panose="020B0604020202020204" pitchFamily="34" charset="0"/>
+                <a:cs typeface="Arial" panose="020B0604020202020204" pitchFamily="34" charset="0"/>
+              </a:rPr>
+              <a:t>, </a:t>
+            </a:r>
+            <a:r>
+              <a:rPr lang="es-PE" dirty="0" err="1">
+                <a:latin typeface="Arial" panose="020B0604020202020204" pitchFamily="34" charset="0"/>
+                <a:cs typeface="Arial" panose="020B0604020202020204" pitchFamily="34" charset="0"/>
+              </a:rPr>
+              <a:t>varchar</a:t>
+            </a:r>
+            <a:r>
+              <a:rPr lang="es-PE" dirty="0">
+                <a:latin typeface="Arial" panose="020B0604020202020204" pitchFamily="34" charset="0"/>
+                <a:cs typeface="Arial" panose="020B0604020202020204" pitchFamily="34" charset="0"/>
+              </a:rPr>
+              <a:t> , etc.”)</a:t>
+            </a:r>
+            <a:endParaRPr lang="es-PE" dirty="0"/>
+          </a:p>
+        </p:txBody>
+      </p:sp>
+      <p:sp>
+        <p:nvSpPr>
+          <p:cNvPr id="4" name="Rectángulo 3"/>
+          <p:cNvSpPr/>
+          <p:nvPr/>
+        </p:nvSpPr>
+        <p:spPr>
+          <a:xfrm>
+            <a:off x="2038646" y="566241"/>
+            <a:ext cx="6901056" cy="923330"/>
+          </a:xfrm>
+          <a:prstGeom prst="rect">
+            <a:avLst/>
+          </a:prstGeom>
+          <a:noFill/>
+        </p:spPr>
+        <p:txBody>
+          <a:bodyPr wrap="none" lIns="91440" tIns="45720" rIns="91440" bIns="45720">
+            <a:spAutoFit/>
+          </a:bodyPr>
+          <a:lstStyle/>
+          <a:p>
+            <a:pPr algn="ctr"/>
+            <a:r>
+              <a:rPr lang="es-ES" sz="5400" b="1" dirty="0" smtClean="0">
+                <a:ln w="9525">
+                  <a:solidFill>
+                    <a:schemeClr val="bg1"/>
+                  </a:solidFill>
+                  <a:prstDash val="solid"/>
+                </a:ln>
+                <a:solidFill>
+                  <a:schemeClr val="accent5"/>
+                </a:solidFill>
+                <a:effectLst>
+                  <a:outerShdw blurRad="12700" dist="38100" dir="2700000" algn="tl" rotWithShape="0">
+                    <a:schemeClr val="accent5">
+                      <a:lumMod val="60000"/>
+                      <a:lumOff val="40000"/>
+                    </a:schemeClr>
+                  </a:outerShdw>
+                </a:effectLst>
+              </a:rPr>
+              <a:t>Contenido del proyecto</a:t>
+            </a:r>
+            <a:endParaRPr lang="es-ES" sz="5400" b="1" cap="none" spc="0" dirty="0">
+              <a:ln w="9525">
+                <a:solidFill>
+                  <a:schemeClr val="bg1"/>
+                </a:solidFill>
+                <a:prstDash val="solid"/>
+              </a:ln>
+              <a:solidFill>
+                <a:schemeClr val="accent5"/>
+              </a:solidFill>
+              <a:effectLst>
+                <a:outerShdw blurRad="12700" dist="38100" dir="2700000" algn="tl" rotWithShape="0">
+                  <a:schemeClr val="accent5">
+                    <a:lumMod val="60000"/>
+                    <a:lumOff val="40000"/>
+                  </a:schemeClr>
+                </a:outerShdw>
+              </a:effectLst>
+            </a:endParaRPr>
+          </a:p>
+        </p:txBody>
+      </p:sp>
+    </p:spTree>
+    <p:extLst>
+      <p:ext uri="{BB962C8B-B14F-4D97-AF65-F5344CB8AC3E}">
+        <p14:creationId xmlns:p14="http://schemas.microsoft.com/office/powerpoint/2010/main" val="2992608996"/>
+      </p:ext>
+    </p:extLst>
+  </p:cSld>
+  <p:clrMapOvr>
+    <a:masterClrMapping/>
+  </p:clrMapOvr>
+</p:sld>
+</file>
+
+<file path=ppt/slides/slide7.xml><?xml version="1.0" encoding="utf-8"?>
 <p:sld xmlns:a="http://schemas.openxmlformats.org/drawingml/2006/main" xmlns:r="http://schemas.openxmlformats.org/officeDocument/2006/relationships" xmlns:p="http://schemas.openxmlformats.org/presentationml/2006/main">
   <p:cSld>
     <p:spTree>

</xml_diff>

<commit_message>
Agregué la diapositiva que explica el contenido del proyecto
</commit_message>
<xml_diff>
--- a/PrimerAvance/APFP-FirstDraft.pptx
+++ b/PrimerAvance/APFP-FirstDraft.pptx
@@ -5494,7 +5494,10 @@
                   <a:prstDash val="solid"/>
                 </a:ln>
                 <a:solidFill>
-                  <a:schemeClr val="accent5"/>
+                  <a:schemeClr val="tx1">
+                    <a:lumMod val="95000"/>
+                    <a:lumOff val="5000"/>
+                  </a:schemeClr>
                 </a:solidFill>
                 <a:effectLst>
                   <a:outerShdw blurRad="12700" dist="38100" dir="2700000" algn="tl" rotWithShape="0">
@@ -5515,7 +5518,10 @@
                 <a:prstDash val="solid"/>
               </a:ln>
               <a:solidFill>
-                <a:schemeClr val="accent5"/>
+                <a:schemeClr val="tx1">
+                  <a:lumMod val="95000"/>
+                  <a:lumOff val="5000"/>
+                </a:schemeClr>
               </a:solidFill>
               <a:effectLst>
                 <a:outerShdw blurRad="12700" dist="38100" dir="2700000" algn="tl" rotWithShape="0">

</xml_diff>

<commit_message>
ingrese la problematica y aplicacion
</commit_message>
<xml_diff>
--- a/PrimerAvance/APFP-FirstDraft.pptx
+++ b/PrimerAvance/APFP-FirstDraft.pptx
@@ -4,8 +4,18 @@
   <p:sldMasterIdLst>
     <p:sldMasterId id="2147483648" r:id="rId1"/>
   </p:sldMasterIdLst>
+  <p:notesMasterIdLst>
+    <p:notesMasterId r:id="rId10"/>
+  </p:notesMasterIdLst>
   <p:sldIdLst>
-    <p:sldId id="256" r:id="rId2"/>
+    <p:sldId id="263" r:id="rId2"/>
+    <p:sldId id="264" r:id="rId3"/>
+    <p:sldId id="258" r:id="rId4"/>
+    <p:sldId id="257" r:id="rId5"/>
+    <p:sldId id="259" r:id="rId6"/>
+    <p:sldId id="260" r:id="rId7"/>
+    <p:sldId id="262" r:id="rId8"/>
+    <p:sldId id="261" r:id="rId9"/>
   </p:sldIdLst>
   <p:sldSz cx="12192000" cy="6858000"/>
   <p:notesSz cx="6858000" cy="9144000"/>
@@ -112,6 +122,542 @@
 </p:presentation>
 </file>
 
+<file path=ppt/notesMasters/notesMaster1.xml><?xml version="1.0" encoding="utf-8"?>
+<p:notesMaster xmlns:a="http://schemas.openxmlformats.org/drawingml/2006/main" xmlns:r="http://schemas.openxmlformats.org/officeDocument/2006/relationships" xmlns:p="http://schemas.openxmlformats.org/presentationml/2006/main">
+  <p:cSld>
+    <p:bg>
+      <p:bgRef idx="1001">
+        <a:schemeClr val="bg1"/>
+      </p:bgRef>
+    </p:bg>
+    <p:spTree>
+      <p:nvGrpSpPr>
+        <p:cNvPr id="1" name=""/>
+        <p:cNvGrpSpPr/>
+        <p:nvPr/>
+      </p:nvGrpSpPr>
+      <p:grpSpPr>
+        <a:xfrm>
+          <a:off x="0" y="0"/>
+          <a:ext cx="0" cy="0"/>
+          <a:chOff x="0" y="0"/>
+          <a:chExt cx="0" cy="0"/>
+        </a:xfrm>
+      </p:grpSpPr>
+      <p:sp>
+        <p:nvSpPr>
+          <p:cNvPr id="2" name="Marcador de encabezado 1"/>
+          <p:cNvSpPr>
+            <a:spLocks noGrp="1"/>
+          </p:cNvSpPr>
+          <p:nvPr>
+            <p:ph type="hdr" sz="quarter"/>
+          </p:nvPr>
+        </p:nvSpPr>
+        <p:spPr>
+          <a:xfrm>
+            <a:off x="0" y="0"/>
+            <a:ext cx="2971800" cy="458788"/>
+          </a:xfrm>
+          <a:prstGeom prst="rect">
+            <a:avLst/>
+          </a:prstGeom>
+        </p:spPr>
+        <p:txBody>
+          <a:bodyPr vert="horz" lIns="91440" tIns="45720" rIns="91440" bIns="45720" rtlCol="0"/>
+          <a:lstStyle>
+            <a:lvl1pPr algn="l">
+              <a:defRPr sz="1200"/>
+            </a:lvl1pPr>
+          </a:lstStyle>
+          <a:p>
+            <a:endParaRPr lang="es-PE"/>
+          </a:p>
+        </p:txBody>
+      </p:sp>
+      <p:sp>
+        <p:nvSpPr>
+          <p:cNvPr id="3" name="Marcador de fecha 2"/>
+          <p:cNvSpPr>
+            <a:spLocks noGrp="1"/>
+          </p:cNvSpPr>
+          <p:nvPr>
+            <p:ph type="dt" idx="1"/>
+          </p:nvPr>
+        </p:nvSpPr>
+        <p:spPr>
+          <a:xfrm>
+            <a:off x="3884613" y="0"/>
+            <a:ext cx="2971800" cy="458788"/>
+          </a:xfrm>
+          <a:prstGeom prst="rect">
+            <a:avLst/>
+          </a:prstGeom>
+        </p:spPr>
+        <p:txBody>
+          <a:bodyPr vert="horz" lIns="91440" tIns="45720" rIns="91440" bIns="45720" rtlCol="0"/>
+          <a:lstStyle>
+            <a:lvl1pPr algn="r">
+              <a:defRPr sz="1200"/>
+            </a:lvl1pPr>
+          </a:lstStyle>
+          <a:p>
+            <a:fld id="{85195CE5-45E9-42A8-8CAC-48AE9C4232EC}" type="datetimeFigureOut">
+              <a:rPr lang="es-PE" smtClean="0"/>
+              <a:t>26/06/2019</a:t>
+            </a:fld>
+            <a:endParaRPr lang="es-PE"/>
+          </a:p>
+        </p:txBody>
+      </p:sp>
+      <p:sp>
+        <p:nvSpPr>
+          <p:cNvPr id="4" name="Marcador de imagen de diapositiva 3"/>
+          <p:cNvSpPr>
+            <a:spLocks noGrp="1" noRot="1" noChangeAspect="1"/>
+          </p:cNvSpPr>
+          <p:nvPr>
+            <p:ph type="sldImg" idx="2"/>
+          </p:nvPr>
+        </p:nvSpPr>
+        <p:spPr>
+          <a:xfrm>
+            <a:off x="685800" y="1143000"/>
+            <a:ext cx="5486400" cy="3086100"/>
+          </a:xfrm>
+          <a:prstGeom prst="rect">
+            <a:avLst/>
+          </a:prstGeom>
+          <a:noFill/>
+          <a:ln w="12700">
+            <a:solidFill>
+              <a:prstClr val="black"/>
+            </a:solidFill>
+          </a:ln>
+        </p:spPr>
+        <p:txBody>
+          <a:bodyPr vert="horz" lIns="91440" tIns="45720" rIns="91440" bIns="45720" rtlCol="0" anchor="ctr"/>
+          <a:lstStyle/>
+          <a:p>
+            <a:endParaRPr lang="es-PE"/>
+          </a:p>
+        </p:txBody>
+      </p:sp>
+      <p:sp>
+        <p:nvSpPr>
+          <p:cNvPr id="5" name="Marcador de notas 4"/>
+          <p:cNvSpPr>
+            <a:spLocks noGrp="1"/>
+          </p:cNvSpPr>
+          <p:nvPr>
+            <p:ph type="body" sz="quarter" idx="3"/>
+          </p:nvPr>
+        </p:nvSpPr>
+        <p:spPr>
+          <a:xfrm>
+            <a:off x="685800" y="4400550"/>
+            <a:ext cx="5486400" cy="3600450"/>
+          </a:xfrm>
+          <a:prstGeom prst="rect">
+            <a:avLst/>
+          </a:prstGeom>
+        </p:spPr>
+        <p:txBody>
+          <a:bodyPr vert="horz" lIns="91440" tIns="45720" rIns="91440" bIns="45720" rtlCol="0"/>
+          <a:lstStyle/>
+          <a:p>
+            <a:pPr lvl="0"/>
+            <a:r>
+              <a:rPr lang="es-ES" smtClean="0"/>
+              <a:t>Haga clic para modificar el estilo de texto del patrón</a:t>
+            </a:r>
+          </a:p>
+          <a:p>
+            <a:pPr lvl="1"/>
+            <a:r>
+              <a:rPr lang="es-ES" smtClean="0"/>
+              <a:t>Segundo nivel</a:t>
+            </a:r>
+          </a:p>
+          <a:p>
+            <a:pPr lvl="2"/>
+            <a:r>
+              <a:rPr lang="es-ES" smtClean="0"/>
+              <a:t>Tercer nivel</a:t>
+            </a:r>
+          </a:p>
+          <a:p>
+            <a:pPr lvl="3"/>
+            <a:r>
+              <a:rPr lang="es-ES" smtClean="0"/>
+              <a:t>Cuarto nivel</a:t>
+            </a:r>
+          </a:p>
+          <a:p>
+            <a:pPr lvl="4"/>
+            <a:r>
+              <a:rPr lang="es-ES" smtClean="0"/>
+              <a:t>Quinto nivel</a:t>
+            </a:r>
+            <a:endParaRPr lang="es-PE"/>
+          </a:p>
+        </p:txBody>
+      </p:sp>
+      <p:sp>
+        <p:nvSpPr>
+          <p:cNvPr id="6" name="Marcador de pie de página 5"/>
+          <p:cNvSpPr>
+            <a:spLocks noGrp="1"/>
+          </p:cNvSpPr>
+          <p:nvPr>
+            <p:ph type="ftr" sz="quarter" idx="4"/>
+          </p:nvPr>
+        </p:nvSpPr>
+        <p:spPr>
+          <a:xfrm>
+            <a:off x="0" y="8685213"/>
+            <a:ext cx="2971800" cy="458787"/>
+          </a:xfrm>
+          <a:prstGeom prst="rect">
+            <a:avLst/>
+          </a:prstGeom>
+        </p:spPr>
+        <p:txBody>
+          <a:bodyPr vert="horz" lIns="91440" tIns="45720" rIns="91440" bIns="45720" rtlCol="0" anchor="b"/>
+          <a:lstStyle>
+            <a:lvl1pPr algn="l">
+              <a:defRPr sz="1200"/>
+            </a:lvl1pPr>
+          </a:lstStyle>
+          <a:p>
+            <a:endParaRPr lang="es-PE"/>
+          </a:p>
+        </p:txBody>
+      </p:sp>
+      <p:sp>
+        <p:nvSpPr>
+          <p:cNvPr id="7" name="Marcador de número de diapositiva 6"/>
+          <p:cNvSpPr>
+            <a:spLocks noGrp="1"/>
+          </p:cNvSpPr>
+          <p:nvPr>
+            <p:ph type="sldNum" sz="quarter" idx="5"/>
+          </p:nvPr>
+        </p:nvSpPr>
+        <p:spPr>
+          <a:xfrm>
+            <a:off x="3884613" y="8685213"/>
+            <a:ext cx="2971800" cy="458787"/>
+          </a:xfrm>
+          <a:prstGeom prst="rect">
+            <a:avLst/>
+          </a:prstGeom>
+        </p:spPr>
+        <p:txBody>
+          <a:bodyPr vert="horz" lIns="91440" tIns="45720" rIns="91440" bIns="45720" rtlCol="0" anchor="b"/>
+          <a:lstStyle>
+            <a:lvl1pPr algn="r">
+              <a:defRPr sz="1200"/>
+            </a:lvl1pPr>
+          </a:lstStyle>
+          <a:p>
+            <a:fld id="{0109054F-2807-4723-8968-7D7BDD2D73E9}" type="slidenum">
+              <a:rPr lang="es-PE" smtClean="0"/>
+              <a:t>‹Nº›</a:t>
+            </a:fld>
+            <a:endParaRPr lang="es-PE"/>
+          </a:p>
+        </p:txBody>
+      </p:sp>
+    </p:spTree>
+    <p:extLst>
+      <p:ext uri="{BB962C8B-B14F-4D97-AF65-F5344CB8AC3E}">
+        <p14:creationId xmlns:p14="http://schemas.microsoft.com/office/powerpoint/2010/main" val="3801968678"/>
+      </p:ext>
+    </p:extLst>
+  </p:cSld>
+  <p:clrMap bg1="lt1" tx1="dk1" bg2="lt2" tx2="dk2" accent1="accent1" accent2="accent2" accent3="accent3" accent4="accent4" accent5="accent5" accent6="accent6" hlink="hlink" folHlink="folHlink"/>
+  <p:notesStyle>
+    <a:lvl1pPr marL="0" algn="l" defTabSz="914400" rtl="0" eaLnBrk="1" latinLnBrk="0" hangingPunct="1">
+      <a:defRPr sz="1200" kern="1200">
+        <a:solidFill>
+          <a:schemeClr val="tx1"/>
+        </a:solidFill>
+        <a:latin typeface="+mn-lt"/>
+        <a:ea typeface="+mn-ea"/>
+        <a:cs typeface="+mn-cs"/>
+      </a:defRPr>
+    </a:lvl1pPr>
+    <a:lvl2pPr marL="457200" algn="l" defTabSz="914400" rtl="0" eaLnBrk="1" latinLnBrk="0" hangingPunct="1">
+      <a:defRPr sz="1200" kern="1200">
+        <a:solidFill>
+          <a:schemeClr val="tx1"/>
+        </a:solidFill>
+        <a:latin typeface="+mn-lt"/>
+        <a:ea typeface="+mn-ea"/>
+        <a:cs typeface="+mn-cs"/>
+      </a:defRPr>
+    </a:lvl2pPr>
+    <a:lvl3pPr marL="914400" algn="l" defTabSz="914400" rtl="0" eaLnBrk="1" latinLnBrk="0" hangingPunct="1">
+      <a:defRPr sz="1200" kern="1200">
+        <a:solidFill>
+          <a:schemeClr val="tx1"/>
+        </a:solidFill>
+        <a:latin typeface="+mn-lt"/>
+        <a:ea typeface="+mn-ea"/>
+        <a:cs typeface="+mn-cs"/>
+      </a:defRPr>
+    </a:lvl3pPr>
+    <a:lvl4pPr marL="1371600" algn="l" defTabSz="914400" rtl="0" eaLnBrk="1" latinLnBrk="0" hangingPunct="1">
+      <a:defRPr sz="1200" kern="1200">
+        <a:solidFill>
+          <a:schemeClr val="tx1"/>
+        </a:solidFill>
+        <a:latin typeface="+mn-lt"/>
+        <a:ea typeface="+mn-ea"/>
+        <a:cs typeface="+mn-cs"/>
+      </a:defRPr>
+    </a:lvl4pPr>
+    <a:lvl5pPr marL="1828800" algn="l" defTabSz="914400" rtl="0" eaLnBrk="1" latinLnBrk="0" hangingPunct="1">
+      <a:defRPr sz="1200" kern="1200">
+        <a:solidFill>
+          <a:schemeClr val="tx1"/>
+        </a:solidFill>
+        <a:latin typeface="+mn-lt"/>
+        <a:ea typeface="+mn-ea"/>
+        <a:cs typeface="+mn-cs"/>
+      </a:defRPr>
+    </a:lvl5pPr>
+    <a:lvl6pPr marL="2286000" algn="l" defTabSz="914400" rtl="0" eaLnBrk="1" latinLnBrk="0" hangingPunct="1">
+      <a:defRPr sz="1200" kern="1200">
+        <a:solidFill>
+          <a:schemeClr val="tx1"/>
+        </a:solidFill>
+        <a:latin typeface="+mn-lt"/>
+        <a:ea typeface="+mn-ea"/>
+        <a:cs typeface="+mn-cs"/>
+      </a:defRPr>
+    </a:lvl6pPr>
+    <a:lvl7pPr marL="2743200" algn="l" defTabSz="914400" rtl="0" eaLnBrk="1" latinLnBrk="0" hangingPunct="1">
+      <a:defRPr sz="1200" kern="1200">
+        <a:solidFill>
+          <a:schemeClr val="tx1"/>
+        </a:solidFill>
+        <a:latin typeface="+mn-lt"/>
+        <a:ea typeface="+mn-ea"/>
+        <a:cs typeface="+mn-cs"/>
+      </a:defRPr>
+    </a:lvl7pPr>
+    <a:lvl8pPr marL="3200400" algn="l" defTabSz="914400" rtl="0" eaLnBrk="1" latinLnBrk="0" hangingPunct="1">
+      <a:defRPr sz="1200" kern="1200">
+        <a:solidFill>
+          <a:schemeClr val="tx1"/>
+        </a:solidFill>
+        <a:latin typeface="+mn-lt"/>
+        <a:ea typeface="+mn-ea"/>
+        <a:cs typeface="+mn-cs"/>
+      </a:defRPr>
+    </a:lvl8pPr>
+    <a:lvl9pPr marL="3657600" algn="l" defTabSz="914400" rtl="0" eaLnBrk="1" latinLnBrk="0" hangingPunct="1">
+      <a:defRPr sz="1200" kern="1200">
+        <a:solidFill>
+          <a:schemeClr val="tx1"/>
+        </a:solidFill>
+        <a:latin typeface="+mn-lt"/>
+        <a:ea typeface="+mn-ea"/>
+        <a:cs typeface="+mn-cs"/>
+      </a:defRPr>
+    </a:lvl9pPr>
+  </p:notesStyle>
+</p:notesMaster>
+</file>
+
+<file path=ppt/notesSlides/notesSlide1.xml><?xml version="1.0" encoding="utf-8"?>
+<p:notes xmlns:a="http://schemas.openxmlformats.org/drawingml/2006/main" xmlns:r="http://schemas.openxmlformats.org/officeDocument/2006/relationships" xmlns:p="http://schemas.openxmlformats.org/presentationml/2006/main">
+  <p:cSld>
+    <p:spTree>
+      <p:nvGrpSpPr>
+        <p:cNvPr id="1" name=""/>
+        <p:cNvGrpSpPr/>
+        <p:nvPr/>
+      </p:nvGrpSpPr>
+      <p:grpSpPr>
+        <a:xfrm>
+          <a:off x="0" y="0"/>
+          <a:ext cx="0" cy="0"/>
+          <a:chOff x="0" y="0"/>
+          <a:chExt cx="0" cy="0"/>
+        </a:xfrm>
+      </p:grpSpPr>
+      <p:sp>
+        <p:nvSpPr>
+          <p:cNvPr id="2" name="Marcador de imagen de diapositiva 1"/>
+          <p:cNvSpPr>
+            <a:spLocks noGrp="1" noRot="1" noChangeAspect="1"/>
+          </p:cNvSpPr>
+          <p:nvPr>
+            <p:ph type="sldImg"/>
+          </p:nvPr>
+        </p:nvSpPr>
+        <p:spPr/>
+      </p:sp>
+      <p:sp>
+        <p:nvSpPr>
+          <p:cNvPr id="3" name="Marcador de notas 2"/>
+          <p:cNvSpPr>
+            <a:spLocks noGrp="1"/>
+          </p:cNvSpPr>
+          <p:nvPr>
+            <p:ph type="body" idx="1"/>
+          </p:nvPr>
+        </p:nvSpPr>
+        <p:spPr/>
+        <p:txBody>
+          <a:bodyPr/>
+          <a:lstStyle/>
+          <a:p>
+            <a:endParaRPr lang="es-ES_tradnl" dirty="0"/>
+          </a:p>
+        </p:txBody>
+      </p:sp>
+      <p:sp>
+        <p:nvSpPr>
+          <p:cNvPr id="4" name="Marcador de número de diapositiva 3"/>
+          <p:cNvSpPr>
+            <a:spLocks noGrp="1"/>
+          </p:cNvSpPr>
+          <p:nvPr>
+            <p:ph type="sldNum" sz="quarter" idx="10"/>
+          </p:nvPr>
+        </p:nvSpPr>
+        <p:spPr/>
+        <p:txBody>
+          <a:bodyPr/>
+          <a:lstStyle/>
+          <a:p>
+            <a:fld id="{1FD03CC5-EDC5-4C42-A901-E8A0D222A386}" type="slidenum">
+              <a:rPr lang="es-ES_tradnl" smtClean="0">
+                <a:solidFill>
+                  <a:prstClr val="black"/>
+                </a:solidFill>
+              </a:rPr>
+              <a:pPr/>
+              <a:t>1</a:t>
+            </a:fld>
+            <a:endParaRPr lang="es-ES_tradnl">
+              <a:solidFill>
+                <a:prstClr val="black"/>
+              </a:solidFill>
+            </a:endParaRPr>
+          </a:p>
+        </p:txBody>
+      </p:sp>
+    </p:spTree>
+    <p:extLst>
+      <p:ext uri="{BB962C8B-B14F-4D97-AF65-F5344CB8AC3E}">
+        <p14:creationId xmlns:p14="http://schemas.microsoft.com/office/powerpoint/2010/main" val="2458646707"/>
+      </p:ext>
+    </p:extLst>
+  </p:cSld>
+  <p:clrMapOvr>
+    <a:masterClrMapping/>
+  </p:clrMapOvr>
+</p:notes>
+</file>
+
+<file path=ppt/notesSlides/notesSlide2.xml><?xml version="1.0" encoding="utf-8"?>
+<p:notes xmlns:a="http://schemas.openxmlformats.org/drawingml/2006/main" xmlns:r="http://schemas.openxmlformats.org/officeDocument/2006/relationships" xmlns:p="http://schemas.openxmlformats.org/presentationml/2006/main">
+  <p:cSld>
+    <p:spTree>
+      <p:nvGrpSpPr>
+        <p:cNvPr id="1" name=""/>
+        <p:cNvGrpSpPr/>
+        <p:nvPr/>
+      </p:nvGrpSpPr>
+      <p:grpSpPr>
+        <a:xfrm>
+          <a:off x="0" y="0"/>
+          <a:ext cx="0" cy="0"/>
+          <a:chOff x="0" y="0"/>
+          <a:chExt cx="0" cy="0"/>
+        </a:xfrm>
+      </p:grpSpPr>
+      <p:sp>
+        <p:nvSpPr>
+          <p:cNvPr id="2" name="Marcador de imagen de diapositiva 1"/>
+          <p:cNvSpPr>
+            <a:spLocks noGrp="1" noRot="1" noChangeAspect="1"/>
+          </p:cNvSpPr>
+          <p:nvPr>
+            <p:ph type="sldImg"/>
+          </p:nvPr>
+        </p:nvSpPr>
+        <p:spPr/>
+      </p:sp>
+      <p:sp>
+        <p:nvSpPr>
+          <p:cNvPr id="3" name="Marcador de notas 2"/>
+          <p:cNvSpPr>
+            <a:spLocks noGrp="1"/>
+          </p:cNvSpPr>
+          <p:nvPr>
+            <p:ph type="body" idx="1"/>
+          </p:nvPr>
+        </p:nvSpPr>
+        <p:spPr/>
+        <p:txBody>
+          <a:bodyPr/>
+          <a:lstStyle/>
+          <a:p>
+            <a:endParaRPr lang="es-ES_tradnl" dirty="0"/>
+          </a:p>
+        </p:txBody>
+      </p:sp>
+      <p:sp>
+        <p:nvSpPr>
+          <p:cNvPr id="4" name="Marcador de número de diapositiva 3"/>
+          <p:cNvSpPr>
+            <a:spLocks noGrp="1"/>
+          </p:cNvSpPr>
+          <p:nvPr>
+            <p:ph type="sldNum" sz="quarter" idx="10"/>
+          </p:nvPr>
+        </p:nvSpPr>
+        <p:spPr/>
+        <p:txBody>
+          <a:bodyPr/>
+          <a:lstStyle/>
+          <a:p>
+            <a:fld id="{1FD03CC5-EDC5-4C42-A901-E8A0D222A386}" type="slidenum">
+              <a:rPr lang="es-ES_tradnl" smtClean="0">
+                <a:solidFill>
+                  <a:prstClr val="black"/>
+                </a:solidFill>
+              </a:rPr>
+              <a:pPr/>
+              <a:t>2</a:t>
+            </a:fld>
+            <a:endParaRPr lang="es-ES_tradnl">
+              <a:solidFill>
+                <a:prstClr val="black"/>
+              </a:solidFill>
+            </a:endParaRPr>
+          </a:p>
+        </p:txBody>
+      </p:sp>
+    </p:spTree>
+    <p:extLst>
+      <p:ext uri="{BB962C8B-B14F-4D97-AF65-F5344CB8AC3E}">
+        <p14:creationId xmlns:p14="http://schemas.microsoft.com/office/powerpoint/2010/main" val="4225625796"/>
+      </p:ext>
+    </p:extLst>
+  </p:cSld>
+  <p:clrMapOvr>
+    <a:masterClrMapping/>
+  </p:clrMapOvr>
+</p:notes>
+</file>
+
 <file path=ppt/slideLayouts/slideLayout1.xml><?xml version="1.0" encoding="utf-8"?>
 <p:sldLayout xmlns:a="http://schemas.openxmlformats.org/drawingml/2006/main" xmlns:r="http://schemas.openxmlformats.org/officeDocument/2006/relationships" xmlns:p="http://schemas.openxmlformats.org/presentationml/2006/main" type="title" preserve="1">
   <p:cSld name="Diapositiva de título">
@@ -243,7 +789,7 @@
           <a:p>
             <a:fld id="{68AF8111-4F1B-4764-B218-CEDF602AB2D0}" type="datetimeFigureOut">
               <a:rPr lang="es-ES" smtClean="0"/>
-              <a:t>25/06/2019</a:t>
+              <a:t>26/06/2019</a:t>
             </a:fld>
             <a:endParaRPr lang="es-ES"/>
           </a:p>
@@ -413,7 +959,7 @@
           <a:p>
             <a:fld id="{68AF8111-4F1B-4764-B218-CEDF602AB2D0}" type="datetimeFigureOut">
               <a:rPr lang="es-ES" smtClean="0"/>
-              <a:t>25/06/2019</a:t>
+              <a:t>26/06/2019</a:t>
             </a:fld>
             <a:endParaRPr lang="es-ES"/>
           </a:p>
@@ -593,7 +1139,7 @@
           <a:p>
             <a:fld id="{68AF8111-4F1B-4764-B218-CEDF602AB2D0}" type="datetimeFigureOut">
               <a:rPr lang="es-ES" smtClean="0"/>
-              <a:t>25/06/2019</a:t>
+              <a:t>26/06/2019</a:t>
             </a:fld>
             <a:endParaRPr lang="es-ES"/>
           </a:p>
@@ -763,7 +1309,7 @@
           <a:p>
             <a:fld id="{68AF8111-4F1B-4764-B218-CEDF602AB2D0}" type="datetimeFigureOut">
               <a:rPr lang="es-ES" smtClean="0"/>
-              <a:t>25/06/2019</a:t>
+              <a:t>26/06/2019</a:t>
             </a:fld>
             <a:endParaRPr lang="es-ES"/>
           </a:p>
@@ -1009,7 +1555,7 @@
           <a:p>
             <a:fld id="{68AF8111-4F1B-4764-B218-CEDF602AB2D0}" type="datetimeFigureOut">
               <a:rPr lang="es-ES" smtClean="0"/>
-              <a:t>25/06/2019</a:t>
+              <a:t>26/06/2019</a:t>
             </a:fld>
             <a:endParaRPr lang="es-ES"/>
           </a:p>
@@ -1241,7 +1787,7 @@
           <a:p>
             <a:fld id="{68AF8111-4F1B-4764-B218-CEDF602AB2D0}" type="datetimeFigureOut">
               <a:rPr lang="es-ES" smtClean="0"/>
-              <a:t>25/06/2019</a:t>
+              <a:t>26/06/2019</a:t>
             </a:fld>
             <a:endParaRPr lang="es-ES"/>
           </a:p>
@@ -1608,7 +2154,7 @@
           <a:p>
             <a:fld id="{68AF8111-4F1B-4764-B218-CEDF602AB2D0}" type="datetimeFigureOut">
               <a:rPr lang="es-ES" smtClean="0"/>
-              <a:t>25/06/2019</a:t>
+              <a:t>26/06/2019</a:t>
             </a:fld>
             <a:endParaRPr lang="es-ES"/>
           </a:p>
@@ -1726,7 +2272,7 @@
           <a:p>
             <a:fld id="{68AF8111-4F1B-4764-B218-CEDF602AB2D0}" type="datetimeFigureOut">
               <a:rPr lang="es-ES" smtClean="0"/>
-              <a:t>25/06/2019</a:t>
+              <a:t>26/06/2019</a:t>
             </a:fld>
             <a:endParaRPr lang="es-ES"/>
           </a:p>
@@ -1821,7 +2367,7 @@
           <a:p>
             <a:fld id="{68AF8111-4F1B-4764-B218-CEDF602AB2D0}" type="datetimeFigureOut">
               <a:rPr lang="es-ES" smtClean="0"/>
-              <a:t>25/06/2019</a:t>
+              <a:t>26/06/2019</a:t>
             </a:fld>
             <a:endParaRPr lang="es-ES"/>
           </a:p>
@@ -2098,7 +2644,7 @@
           <a:p>
             <a:fld id="{68AF8111-4F1B-4764-B218-CEDF602AB2D0}" type="datetimeFigureOut">
               <a:rPr lang="es-ES" smtClean="0"/>
-              <a:t>25/06/2019</a:t>
+              <a:t>26/06/2019</a:t>
             </a:fld>
             <a:endParaRPr lang="es-ES"/>
           </a:p>
@@ -2351,7 +2897,7 @@
           <a:p>
             <a:fld id="{68AF8111-4F1B-4764-B218-CEDF602AB2D0}" type="datetimeFigureOut">
               <a:rPr lang="es-ES" smtClean="0"/>
-              <a:t>25/06/2019</a:t>
+              <a:t>26/06/2019</a:t>
             </a:fld>
             <a:endParaRPr lang="es-ES"/>
           </a:p>
@@ -2416,9 +2962,18 @@
 <p:sldMaster xmlns:a="http://schemas.openxmlformats.org/drawingml/2006/main" xmlns:r="http://schemas.openxmlformats.org/officeDocument/2006/relationships" xmlns:p="http://schemas.openxmlformats.org/presentationml/2006/main">
   <p:cSld>
     <p:bg>
-      <p:bgRef idx="1001">
-        <a:schemeClr val="bg1"/>
-      </p:bgRef>
+      <p:bgPr>
+        <a:blipFill dpi="0" rotWithShape="1">
+          <a:blip r:embed="rId13">
+            <a:lum/>
+          </a:blip>
+          <a:srcRect/>
+          <a:stretch>
+            <a:fillRect/>
+          </a:stretch>
+        </a:blipFill>
+        <a:effectLst/>
+      </p:bgPr>
     </p:bg>
     <p:spTree>
       <p:nvGrpSpPr>
@@ -2564,7 +3119,7 @@
           <a:p>
             <a:fld id="{68AF8111-4F1B-4764-B218-CEDF602AB2D0}" type="datetimeFigureOut">
               <a:rPr lang="es-ES" smtClean="0"/>
-              <a:t>25/06/2019</a:t>
+              <a:t>26/06/2019</a:t>
             </a:fld>
             <a:endParaRPr lang="es-ES"/>
           </a:p>
@@ -2971,39 +3526,3179 @@
       </p:grpSpPr>
       <p:sp>
         <p:nvSpPr>
+          <p:cNvPr id="3" name="2 CuadroTexto"/>
+          <p:cNvSpPr txBox="1"/>
+          <p:nvPr/>
+        </p:nvSpPr>
+        <p:spPr>
+          <a:xfrm>
+            <a:off x="1863783" y="483900"/>
+            <a:ext cx="8701356" cy="707886"/>
+          </a:xfrm>
+          <a:prstGeom prst="rect">
+            <a:avLst/>
+          </a:prstGeom>
+          <a:noFill/>
+        </p:spPr>
+        <p:txBody>
+          <a:bodyPr wrap="none" rtlCol="0">
+            <a:spAutoFit/>
+            <a:scene3d>
+              <a:camera prst="orthographicFront"/>
+              <a:lightRig rig="flat" dir="tl">
+                <a:rot lat="0" lon="0" rev="6600000"/>
+              </a:lightRig>
+            </a:scene3d>
+            <a:sp3d extrusionH="25400" contourW="8890">
+              <a:bevelT w="38100" h="31750"/>
+              <a:contourClr>
+                <a:schemeClr val="accent2">
+                  <a:shade val="75000"/>
+                </a:schemeClr>
+              </a:contourClr>
+            </a:sp3d>
+          </a:bodyPr>
+          <a:lstStyle/>
+          <a:p>
+            <a:r>
+              <a:rPr lang="es-PE" sz="4000" dirty="0"/>
+              <a:t>Sistema de Gestión para el tren Eléctrico </a:t>
+            </a:r>
+            <a:endParaRPr lang="es-ES" sz="4000" b="1" dirty="0" smtClean="0">
+              <a:ln w="11430"/>
+              <a:gradFill>
+                <a:gsLst>
+                  <a:gs pos="0">
+                    <a:schemeClr val="accent2">
+                      <a:tint val="70000"/>
+                      <a:satMod val="245000"/>
+                    </a:schemeClr>
+                  </a:gs>
+                  <a:gs pos="75000">
+                    <a:schemeClr val="accent2">
+                      <a:tint val="90000"/>
+                      <a:shade val="60000"/>
+                      <a:satMod val="240000"/>
+                    </a:schemeClr>
+                  </a:gs>
+                  <a:gs pos="100000">
+                    <a:schemeClr val="accent2">
+                      <a:tint val="100000"/>
+                      <a:shade val="50000"/>
+                      <a:satMod val="240000"/>
+                    </a:schemeClr>
+                  </a:gs>
+                </a:gsLst>
+                <a:lin ang="5400000"/>
+              </a:gradFill>
+              <a:effectLst>
+                <a:outerShdw blurRad="50800" dist="39000" dir="5460000" algn="tl">
+                  <a:srgbClr val="000000">
+                    <a:alpha val="38000"/>
+                  </a:srgbClr>
+                </a:outerShdw>
+              </a:effectLst>
+              <a:latin typeface="Arial" panose="020B0604020202020204" pitchFamily="34" charset="0"/>
+              <a:cs typeface="Arial" panose="020B0604020202020204" pitchFamily="34" charset="0"/>
+            </a:endParaRPr>
+          </a:p>
+        </p:txBody>
+      </p:sp>
+      <p:pic>
+        <p:nvPicPr>
+          <p:cNvPr id="1026" name="Picture 2" descr="Resultado de imagen para tren electrico linea 1"/>
+          <p:cNvPicPr>
+            <a:picLocks noChangeAspect="1" noChangeArrowheads="1"/>
+          </p:cNvPicPr>
+          <p:nvPr/>
+        </p:nvPicPr>
+        <p:blipFill>
+          <a:blip r:embed="rId3">
+            <a:extLst>
+              <a:ext uri="{28A0092B-C50C-407E-A947-70E740481C1C}">
+                <a14:useLocalDpi xmlns:a14="http://schemas.microsoft.com/office/drawing/2010/main" val="0"/>
+              </a:ext>
+            </a:extLst>
+          </a:blip>
+          <a:srcRect/>
+          <a:stretch>
+            <a:fillRect/>
+          </a:stretch>
+        </p:blipFill>
+        <p:spPr bwMode="auto">
+          <a:xfrm>
+            <a:off x="5531617" y="1347895"/>
+            <a:ext cx="5753100" cy="3838576"/>
+          </a:xfrm>
+          <a:prstGeom prst="ellipse">
+            <a:avLst/>
+          </a:prstGeom>
+          <a:ln w="63500" cap="rnd">
+            <a:solidFill>
+              <a:srgbClr val="333333"/>
+            </a:solidFill>
+          </a:ln>
+          <a:effectLst>
+            <a:outerShdw blurRad="381000" dist="292100" dir="5400000" sx="-80000" sy="-18000" rotWithShape="0">
+              <a:srgbClr val="000000">
+                <a:alpha val="22000"/>
+              </a:srgbClr>
+            </a:outerShdw>
+          </a:effectLst>
+          <a:scene3d>
+            <a:camera prst="orthographicFront"/>
+            <a:lightRig rig="contrasting" dir="t">
+              <a:rot lat="0" lon="0" rev="3000000"/>
+            </a:lightRig>
+          </a:scene3d>
+          <a:sp3d contourW="7620">
+            <a:bevelT w="95250" h="31750"/>
+            <a:contourClr>
+              <a:srgbClr val="333333"/>
+            </a:contourClr>
+          </a:sp3d>
+          <a:extLst>
+            <a:ext uri="{909E8E84-426E-40DD-AFC4-6F175D3DCCD1}">
+              <a14:hiddenFill xmlns:a14="http://schemas.microsoft.com/office/drawing/2010/main">
+                <a:solidFill>
+                  <a:srgbClr val="FFFFFF"/>
+                </a:solidFill>
+              </a14:hiddenFill>
+            </a:ext>
+          </a:extLst>
+        </p:spPr>
+      </p:pic>
+      <p:sp>
+        <p:nvSpPr>
+          <p:cNvPr id="6" name="CuadroTexto 5"/>
+          <p:cNvSpPr txBox="1"/>
+          <p:nvPr/>
+        </p:nvSpPr>
+        <p:spPr>
+          <a:xfrm>
+            <a:off x="709447" y="3026979"/>
+            <a:ext cx="4619297" cy="1785104"/>
+          </a:xfrm>
+          <a:prstGeom prst="rect">
+            <a:avLst/>
+          </a:prstGeom>
+          <a:noFill/>
+        </p:spPr>
+        <p:txBody>
+          <a:bodyPr wrap="square" rtlCol="0">
+            <a:spAutoFit/>
+          </a:bodyPr>
+          <a:lstStyle/>
+          <a:p>
+            <a:r>
+              <a:rPr lang="es-PE" sz="2000" b="1" dirty="0" smtClean="0"/>
+              <a:t>INTEGRANTES:</a:t>
+            </a:r>
+          </a:p>
+          <a:p>
+            <a:pPr marL="285750" indent="-285750">
+              <a:buFont typeface="Arial" panose="020B0604020202020204" pitchFamily="34" charset="0"/>
+              <a:buChar char="•"/>
+            </a:pPr>
+            <a:r>
+              <a:rPr lang="es-PE" dirty="0" smtClean="0"/>
+              <a:t>CASA VERA JUAN CARLOS</a:t>
+            </a:r>
+          </a:p>
+          <a:p>
+            <a:pPr marL="285750" indent="-285750">
+              <a:buFont typeface="Arial" panose="020B0604020202020204" pitchFamily="34" charset="0"/>
+              <a:buChar char="•"/>
+            </a:pPr>
+            <a:r>
+              <a:rPr lang="es-PE" dirty="0" smtClean="0"/>
+              <a:t>CASAVERDE CAMASITA EDWARD ALFONSO</a:t>
+            </a:r>
+          </a:p>
+          <a:p>
+            <a:pPr marL="285750" indent="-285750">
+              <a:buFont typeface="Arial" panose="020B0604020202020204" pitchFamily="34" charset="0"/>
+              <a:buChar char="•"/>
+            </a:pPr>
+            <a:r>
+              <a:rPr lang="es-PE" dirty="0" smtClean="0"/>
+              <a:t>DAZA MONTEIRO JULIO ABEL</a:t>
+            </a:r>
+          </a:p>
+          <a:p>
+            <a:pPr marL="285750" indent="-285750">
+              <a:buFont typeface="Arial" panose="020B0604020202020204" pitchFamily="34" charset="0"/>
+              <a:buChar char="•"/>
+            </a:pPr>
+            <a:r>
+              <a:rPr lang="es-PE" dirty="0" smtClean="0"/>
+              <a:t>GONZALES RUEDA </a:t>
+            </a:r>
+            <a:r>
+              <a:rPr lang="es-PE" dirty="0" smtClean="0"/>
+              <a:t>ALEXANDRA PATRICIA </a:t>
+            </a:r>
+          </a:p>
+          <a:p>
+            <a:pPr marL="285750" indent="-285750">
+              <a:buFont typeface="Arial" panose="020B0604020202020204" pitchFamily="34" charset="0"/>
+              <a:buChar char="•"/>
+            </a:pPr>
+            <a:r>
+              <a:rPr lang="es-PE" dirty="0" smtClean="0"/>
+              <a:t>MARTINEZ NORIEGA GARY EDUARDO</a:t>
+            </a:r>
+            <a:endParaRPr lang="es-PE" dirty="0" smtClean="0"/>
+          </a:p>
+        </p:txBody>
+      </p:sp>
+    </p:spTree>
+    <p:extLst>
+      <p:ext uri="{BB962C8B-B14F-4D97-AF65-F5344CB8AC3E}">
+        <p14:creationId xmlns:p14="http://schemas.microsoft.com/office/powerpoint/2010/main" val="4172595138"/>
+      </p:ext>
+    </p:extLst>
+  </p:cSld>
+  <p:clrMapOvr>
+    <a:masterClrMapping/>
+  </p:clrMapOvr>
+  <p:transition spd="slow">
+    <p:wipe dir="d"/>
+  </p:transition>
+  <p:timing>
+    <p:tnLst>
+      <p:par>
+        <p:cTn id="1" dur="indefinite" restart="never" nodeType="tmRoot"/>
+      </p:par>
+    </p:tnLst>
+  </p:timing>
+</p:sld>
+</file>
+
+<file path=ppt/slides/slide2.xml><?xml version="1.0" encoding="utf-8"?>
+<p:sld xmlns:a="http://schemas.openxmlformats.org/drawingml/2006/main" xmlns:r="http://schemas.openxmlformats.org/officeDocument/2006/relationships" xmlns:p="http://schemas.openxmlformats.org/presentationml/2006/main">
+  <p:cSld>
+    <p:spTree>
+      <p:nvGrpSpPr>
+        <p:cNvPr id="1" name=""/>
+        <p:cNvGrpSpPr/>
+        <p:nvPr/>
+      </p:nvGrpSpPr>
+      <p:grpSpPr>
+        <a:xfrm>
+          <a:off x="0" y="0"/>
+          <a:ext cx="0" cy="0"/>
+          <a:chOff x="0" y="0"/>
+          <a:chExt cx="0" cy="0"/>
+        </a:xfrm>
+      </p:grpSpPr>
+      <p:sp>
+        <p:nvSpPr>
+          <p:cNvPr id="2" name="Rectángulo 1"/>
+          <p:cNvSpPr/>
+          <p:nvPr/>
+        </p:nvSpPr>
+        <p:spPr>
+          <a:xfrm>
+            <a:off x="4824248" y="4400687"/>
+            <a:ext cx="6096000" cy="383823"/>
+          </a:xfrm>
+          <a:prstGeom prst="rect">
+            <a:avLst/>
+          </a:prstGeom>
+        </p:spPr>
+        <p:txBody>
+          <a:bodyPr>
+            <a:spAutoFit/>
+          </a:bodyPr>
+          <a:lstStyle/>
+          <a:p>
+            <a:pPr lvl="0">
+              <a:lnSpc>
+                <a:spcPct val="115000"/>
+              </a:lnSpc>
+              <a:spcAft>
+                <a:spcPts val="0"/>
+              </a:spcAft>
+            </a:pPr>
+            <a:endParaRPr lang="es-PE" u="none" strike="noStrike" dirty="0">
+              <a:effectLst/>
+              <a:latin typeface="Arial" panose="020B0604020202020204" pitchFamily="34" charset="0"/>
+              <a:ea typeface="Arial" panose="020B0604020202020204" pitchFamily="34" charset="0"/>
+            </a:endParaRPr>
+          </a:p>
+        </p:txBody>
+      </p:sp>
+      <p:sp>
+        <p:nvSpPr>
+          <p:cNvPr id="4" name="Rectángulo 3"/>
+          <p:cNvSpPr/>
+          <p:nvPr/>
+        </p:nvSpPr>
+        <p:spPr>
+          <a:xfrm>
+            <a:off x="5249917" y="446385"/>
+            <a:ext cx="4256690" cy="2031325"/>
+          </a:xfrm>
+          <a:prstGeom prst="rect">
+            <a:avLst/>
+          </a:prstGeom>
+        </p:spPr>
+        <p:txBody>
+          <a:bodyPr wrap="square">
+            <a:spAutoFit/>
+          </a:bodyPr>
+          <a:lstStyle/>
+          <a:p>
+            <a:r>
+              <a:rPr lang="es-PE" dirty="0">
+                <a:solidFill>
+                  <a:srgbClr val="333333"/>
+                </a:solidFill>
+                <a:latin typeface="Judson"/>
+              </a:rPr>
+              <a:t>¿Cansado de las largas colas para recargar la tarjeta </a:t>
+            </a:r>
+            <a:r>
+              <a:rPr lang="es-PE" dirty="0" smtClean="0">
+                <a:solidFill>
+                  <a:srgbClr val="333333"/>
+                </a:solidFill>
+                <a:latin typeface="Judson"/>
+              </a:rPr>
+              <a:t>de la </a:t>
+            </a:r>
+            <a:r>
+              <a:rPr lang="it-IT" dirty="0">
+                <a:solidFill>
+                  <a:srgbClr val="333333"/>
+                </a:solidFill>
+                <a:latin typeface="Judson"/>
+              </a:rPr>
+              <a:t>linea 1 metro de lima</a:t>
+            </a:r>
+            <a:r>
+              <a:rPr lang="es-PE" dirty="0" smtClean="0">
+                <a:solidFill>
+                  <a:srgbClr val="333333"/>
+                </a:solidFill>
+                <a:latin typeface="Judson"/>
+              </a:rPr>
+              <a:t>? </a:t>
+            </a:r>
+            <a:r>
+              <a:rPr lang="es-PE" dirty="0">
+                <a:solidFill>
+                  <a:srgbClr val="333333"/>
+                </a:solidFill>
+                <a:latin typeface="Judson"/>
+              </a:rPr>
+              <a:t>La solución puede estar a la vuelta de la esquina, vía web, sin moverse de su casa.</a:t>
+            </a:r>
+          </a:p>
+          <a:p>
+            <a:r>
+              <a:rPr lang="es-PE" dirty="0"/>
+              <a:t/>
+            </a:r>
+            <a:br>
+              <a:rPr lang="es-PE" dirty="0"/>
+            </a:br>
+            <a:endParaRPr lang="es-PE" dirty="0"/>
+          </a:p>
+        </p:txBody>
+      </p:sp>
+      <p:sp>
+        <p:nvSpPr>
+          <p:cNvPr id="5" name="Rectángulo 4"/>
+          <p:cNvSpPr/>
+          <p:nvPr/>
+        </p:nvSpPr>
+        <p:spPr>
+          <a:xfrm>
+            <a:off x="4431596" y="3190547"/>
+            <a:ext cx="55370850" cy="369332"/>
+          </a:xfrm>
+          <a:prstGeom prst="rect">
+            <a:avLst/>
+          </a:prstGeom>
+        </p:spPr>
+        <p:txBody>
+          <a:bodyPr wrap="square">
+            <a:spAutoFit/>
+          </a:bodyPr>
+          <a:lstStyle/>
+          <a:p>
+            <a:r>
+              <a:rPr lang="es-PE" dirty="0">
+                <a:solidFill>
+                  <a:srgbClr val="333333"/>
+                </a:solidFill>
+                <a:latin typeface="Judson"/>
+              </a:rPr>
+              <a:t>se puede recargar la tarjeta </a:t>
+            </a:r>
+            <a:r>
+              <a:rPr lang="es-PE" dirty="0" smtClean="0">
+                <a:solidFill>
+                  <a:srgbClr val="333333"/>
+                </a:solidFill>
+                <a:latin typeface="Judson"/>
+              </a:rPr>
+              <a:t>de </a:t>
+            </a:r>
+            <a:r>
+              <a:rPr lang="es-PE" dirty="0">
+                <a:solidFill>
+                  <a:srgbClr val="333333"/>
+                </a:solidFill>
+                <a:latin typeface="Judson"/>
+              </a:rPr>
+              <a:t>la </a:t>
+            </a:r>
+            <a:r>
+              <a:rPr lang="it-IT" dirty="0">
+                <a:solidFill>
+                  <a:srgbClr val="333333"/>
+                </a:solidFill>
+                <a:latin typeface="Judson"/>
+              </a:rPr>
+              <a:t>linea 1 metro de lima</a:t>
+            </a:r>
+            <a:r>
+              <a:rPr lang="es-PE" dirty="0" smtClean="0">
+                <a:solidFill>
+                  <a:srgbClr val="333333"/>
+                </a:solidFill>
+                <a:latin typeface="Judson"/>
+              </a:rPr>
+              <a:t> ''</a:t>
+            </a:r>
+            <a:r>
+              <a:rPr lang="es-PE" dirty="0">
+                <a:solidFill>
+                  <a:srgbClr val="333333"/>
+                </a:solidFill>
+                <a:latin typeface="Judson"/>
+              </a:rPr>
+              <a:t> </a:t>
+            </a:r>
+            <a:r>
+              <a:rPr lang="es-PE" b="1" dirty="0">
+                <a:solidFill>
+                  <a:srgbClr val="333333"/>
+                </a:solidFill>
+                <a:latin typeface="Judson"/>
+              </a:rPr>
+              <a:t>solo con la app</a:t>
+            </a:r>
+            <a:r>
+              <a:rPr lang="es-PE" dirty="0">
+                <a:solidFill>
+                  <a:srgbClr val="333333"/>
+                </a:solidFill>
+                <a:latin typeface="Judson"/>
+              </a:rPr>
+              <a:t>"</a:t>
+            </a:r>
+            <a:endParaRPr lang="es-PE" dirty="0"/>
+          </a:p>
+        </p:txBody>
+      </p:sp>
+      <p:pic>
+        <p:nvPicPr>
+          <p:cNvPr id="6" name="Picture 2" descr="Resultado de imagen para CANSADO DE HACER COLAS PARA PAGAR"/>
+          <p:cNvPicPr>
+            <a:picLocks noChangeAspect="1" noChangeArrowheads="1"/>
+          </p:cNvPicPr>
+          <p:nvPr/>
+        </p:nvPicPr>
+        <p:blipFill>
+          <a:blip r:embed="rId3">
+            <a:extLst>
+              <a:ext uri="{28A0092B-C50C-407E-A947-70E740481C1C}">
+                <a14:useLocalDpi xmlns:a14="http://schemas.microsoft.com/office/drawing/2010/main" val="0"/>
+              </a:ext>
+            </a:extLst>
+          </a:blip>
+          <a:srcRect/>
+          <a:stretch>
+            <a:fillRect/>
+          </a:stretch>
+        </p:blipFill>
+        <p:spPr bwMode="auto">
+          <a:xfrm>
+            <a:off x="9394169" y="260698"/>
+            <a:ext cx="2382672" cy="2382673"/>
+          </a:xfrm>
+          <a:prstGeom prst="ellipse">
+            <a:avLst/>
+          </a:prstGeom>
+          <a:ln w="63500" cap="rnd">
+            <a:solidFill>
+              <a:srgbClr val="333333"/>
+            </a:solidFill>
+          </a:ln>
+          <a:effectLst>
+            <a:outerShdw blurRad="381000" dist="292100" dir="5400000" sx="-80000" sy="-18000" rotWithShape="0">
+              <a:srgbClr val="000000">
+                <a:alpha val="22000"/>
+              </a:srgbClr>
+            </a:outerShdw>
+          </a:effectLst>
+          <a:scene3d>
+            <a:camera prst="orthographicFront"/>
+            <a:lightRig rig="contrasting" dir="t">
+              <a:rot lat="0" lon="0" rev="3000000"/>
+            </a:lightRig>
+          </a:scene3d>
+          <a:sp3d contourW="7620">
+            <a:bevelT w="95250" h="31750"/>
+            <a:contourClr>
+              <a:srgbClr val="333333"/>
+            </a:contourClr>
+          </a:sp3d>
+          <a:extLst>
+            <a:ext uri="{909E8E84-426E-40DD-AFC4-6F175D3DCCD1}">
+              <a14:hiddenFill xmlns:a14="http://schemas.microsoft.com/office/drawing/2010/main">
+                <a:solidFill>
+                  <a:srgbClr val="FFFFFF"/>
+                </a:solidFill>
+              </a14:hiddenFill>
+            </a:ext>
+          </a:extLst>
+        </p:spPr>
+      </p:pic>
+      <p:sp>
+        <p:nvSpPr>
+          <p:cNvPr id="7" name="AutoShape 4" descr="https://lh3.ggpht.com/pM09wBVQloGYfkCX2vlGzDpgrr2Gm8RVAj_q7Ed-BK_eirwLPyZKy8bSesfV6QAhEQ=h900-rw"/>
+          <p:cNvSpPr>
+            <a:spLocks noChangeAspect="1" noChangeArrowheads="1"/>
+          </p:cNvSpPr>
+          <p:nvPr/>
+        </p:nvSpPr>
+        <p:spPr bwMode="auto">
+          <a:xfrm>
+            <a:off x="155575" y="-144463"/>
+            <a:ext cx="2461986" cy="2461994"/>
+          </a:xfrm>
+          <a:prstGeom prst="rect">
+            <a:avLst/>
+          </a:prstGeom>
+          <a:noFill/>
+          <a:extLst>
+            <a:ext uri="{909E8E84-426E-40DD-AFC4-6F175D3DCCD1}">
+              <a14:hiddenFill xmlns:a14="http://schemas.microsoft.com/office/drawing/2010/main">
+                <a:solidFill>
+                  <a:srgbClr val="FFFFFF"/>
+                </a:solidFill>
+              </a14:hiddenFill>
+            </a:ext>
+          </a:extLst>
+        </p:spPr>
+        <p:txBody>
+          <a:bodyPr vert="horz" wrap="square" lIns="91440" tIns="45720" rIns="91440" bIns="45720" numCol="1" anchor="t" anchorCtr="0" compatLnSpc="1">
+            <a:prstTxWarp prst="textNoShape">
+              <a:avLst/>
+            </a:prstTxWarp>
+          </a:bodyPr>
+          <a:lstStyle/>
+          <a:p>
+            <a:endParaRPr lang="es-PE"/>
+          </a:p>
+        </p:txBody>
+      </p:sp>
+      <p:pic>
+        <p:nvPicPr>
+          <p:cNvPr id="10" name="Imagen 9"/>
+          <p:cNvPicPr>
+            <a:picLocks noChangeAspect="1"/>
+          </p:cNvPicPr>
+          <p:nvPr/>
+        </p:nvPicPr>
+        <p:blipFill>
+          <a:blip r:embed="rId4"/>
+          <a:stretch>
+            <a:fillRect/>
+          </a:stretch>
+        </p:blipFill>
+        <p:spPr>
+          <a:xfrm>
+            <a:off x="437446" y="260699"/>
+            <a:ext cx="3712279" cy="5178404"/>
+          </a:xfrm>
+          <a:prstGeom prst="roundRect">
+            <a:avLst>
+              <a:gd name="adj" fmla="val 8594"/>
+            </a:avLst>
+          </a:prstGeom>
+          <a:solidFill>
+            <a:srgbClr val="FFFFFF">
+              <a:shade val="85000"/>
+            </a:srgbClr>
+          </a:solidFill>
+          <a:ln>
+            <a:noFill/>
+          </a:ln>
+          <a:effectLst>
+            <a:reflection blurRad="12700" stA="38000" endPos="28000" dist="5000" dir="5400000" sy="-100000" algn="bl" rotWithShape="0"/>
+          </a:effectLst>
+        </p:spPr>
+      </p:pic>
+    </p:spTree>
+    <p:extLst>
+      <p:ext uri="{BB962C8B-B14F-4D97-AF65-F5344CB8AC3E}">
+        <p14:creationId xmlns:p14="http://schemas.microsoft.com/office/powerpoint/2010/main" val="2070633298"/>
+      </p:ext>
+    </p:extLst>
+  </p:cSld>
+  <p:clrMapOvr>
+    <a:masterClrMapping/>
+  </p:clrMapOvr>
+  <p:transition spd="slow">
+    <p:wipe dir="d"/>
+  </p:transition>
+  <p:timing>
+    <p:tnLst>
+      <p:par>
+        <p:cTn id="1" dur="indefinite" restart="never" nodeType="tmRoot"/>
+      </p:par>
+    </p:tnLst>
+  </p:timing>
+</p:sld>
+</file>
+
+<file path=ppt/slides/slide3.xml><?xml version="1.0" encoding="utf-8"?>
+<p:sld xmlns:a="http://schemas.openxmlformats.org/drawingml/2006/main" xmlns:r="http://schemas.openxmlformats.org/officeDocument/2006/relationships" xmlns:p="http://schemas.openxmlformats.org/presentationml/2006/main">
+  <p:cSld>
+    <p:spTree>
+      <p:nvGrpSpPr>
+        <p:cNvPr id="1" name=""/>
+        <p:cNvGrpSpPr/>
+        <p:nvPr/>
+      </p:nvGrpSpPr>
+      <p:grpSpPr>
+        <a:xfrm>
+          <a:off x="0" y="0"/>
+          <a:ext cx="0" cy="0"/>
+          <a:chOff x="0" y="0"/>
+          <a:chExt cx="0" cy="0"/>
+        </a:xfrm>
+      </p:grpSpPr>
+      <p:sp>
+        <p:nvSpPr>
           <p:cNvPr id="2" name="Título 1"/>
           <p:cNvSpPr>
             <a:spLocks noGrp="1"/>
           </p:cNvSpPr>
           <p:nvPr>
-            <p:ph type="ctrTitle"/>
+            <p:ph type="title"/>
           </p:nvPr>
         </p:nvSpPr>
         <p:spPr/>
         <p:txBody>
+          <a:bodyPr>
+            <a:normAutofit/>
+          </a:bodyPr>
+          <a:lstStyle/>
+          <a:p>
+            <a:r>
+              <a:rPr lang="es-PE" sz="4800" b="1" dirty="0" smtClean="0">
+                <a:solidFill>
+                  <a:schemeClr val="accent2">
+                    <a:lumMod val="50000"/>
+                  </a:schemeClr>
+                </a:solidFill>
+              </a:rPr>
+              <a:t>DESCRIPCIÓN DEL APLICATIVO</a:t>
+            </a:r>
+            <a:endParaRPr lang="es-ES" sz="4800" b="1" dirty="0">
+              <a:solidFill>
+                <a:schemeClr val="accent2">
+                  <a:lumMod val="50000"/>
+                </a:schemeClr>
+              </a:solidFill>
+            </a:endParaRPr>
+          </a:p>
+        </p:txBody>
+      </p:sp>
+      <p:sp>
+        <p:nvSpPr>
+          <p:cNvPr id="3" name="Marcador de contenido 2"/>
+          <p:cNvSpPr>
+            <a:spLocks noGrp="1"/>
+          </p:cNvSpPr>
+          <p:nvPr>
+            <p:ph idx="1"/>
+          </p:nvPr>
+        </p:nvSpPr>
+        <p:spPr>
+          <a:xfrm>
+            <a:off x="838200" y="2193059"/>
+            <a:ext cx="10515600" cy="4351338"/>
+          </a:xfrm>
+        </p:spPr>
+        <p:txBody>
+          <a:bodyPr>
+            <a:normAutofit/>
+          </a:bodyPr>
+          <a:lstStyle/>
+          <a:p>
+            <a:pPr marL="0" indent="0">
+              <a:buNone/>
+            </a:pPr>
+            <a:r>
+              <a:rPr lang="es-PE" sz="4000" b="1" dirty="0" smtClean="0">
+                <a:solidFill>
+                  <a:srgbClr val="FF0000"/>
+                </a:solidFill>
+              </a:rPr>
+              <a:t>Problema: </a:t>
+            </a:r>
+            <a:r>
+              <a:rPr lang="es-PE" sz="3200" dirty="0" smtClean="0"/>
+              <a:t>Incidencias diarias en las estaciones del tren eléctrico, tales como congestión, largas colas, recargas de tarjetas, horarios de llegada de tren.</a:t>
+            </a:r>
+            <a:endParaRPr lang="es-PE" dirty="0"/>
+          </a:p>
+          <a:p>
+            <a:pPr marL="0" indent="0">
+              <a:buNone/>
+            </a:pPr>
+            <a:r>
+              <a:rPr lang="es-PE" sz="4000" b="1" dirty="0" smtClean="0">
+                <a:solidFill>
+                  <a:srgbClr val="00B050"/>
+                </a:solidFill>
+              </a:rPr>
+              <a:t>Motivación: </a:t>
+            </a:r>
+            <a:r>
+              <a:rPr lang="es-PE" sz="3200" dirty="0" smtClean="0"/>
+              <a:t>Poder crear un sistema que solucione estos incidentes, donde el usuario pueda </a:t>
+            </a:r>
+            <a:r>
+              <a:rPr lang="es-ES" sz="3200" dirty="0" smtClean="0"/>
+              <a:t>consultar </a:t>
+            </a:r>
+            <a:r>
+              <a:rPr lang="es-ES" sz="3200" dirty="0"/>
+              <a:t>los horarios del sistema, el saldo que tienen en sus tarjetas afiliadas, mantenerse informados en tiempo real sobre novedades e incidencias en el servicio, entre otros beneficios.</a:t>
+            </a:r>
+          </a:p>
+        </p:txBody>
+      </p:sp>
+      <p:sp>
+        <p:nvSpPr>
+          <p:cNvPr id="4" name="CuadroTexto 3"/>
+          <p:cNvSpPr txBox="1"/>
+          <p:nvPr/>
+        </p:nvSpPr>
+        <p:spPr>
+          <a:xfrm>
+            <a:off x="988291" y="1385455"/>
+            <a:ext cx="10021454" cy="707886"/>
+          </a:xfrm>
+          <a:prstGeom prst="rect">
+            <a:avLst/>
+          </a:prstGeom>
+        </p:spPr>
+        <p:style>
+          <a:lnRef idx="2">
+            <a:schemeClr val="accent5">
+              <a:shade val="50000"/>
+            </a:schemeClr>
+          </a:lnRef>
+          <a:fillRef idx="1">
+            <a:schemeClr val="accent5"/>
+          </a:fillRef>
+          <a:effectRef idx="0">
+            <a:schemeClr val="accent5"/>
+          </a:effectRef>
+          <a:fontRef idx="minor">
+            <a:schemeClr val="lt1"/>
+          </a:fontRef>
+        </p:style>
+        <p:txBody>
+          <a:bodyPr wrap="square" rtlCol="0">
+            <a:spAutoFit/>
+          </a:bodyPr>
+          <a:lstStyle/>
+          <a:p>
+            <a:r>
+              <a:rPr lang="es-PE" sz="2000" dirty="0" smtClean="0"/>
+              <a:t>Nuestro sistema consta de un aplicativo que consta de envío de incidencias, donde el usuario coloca sus nombres, la incidencia, fecha y hora, estación de tren de la incidencia.</a:t>
+            </a:r>
+            <a:endParaRPr lang="es-ES" sz="2000" dirty="0"/>
+          </a:p>
+        </p:txBody>
+      </p:sp>
+    </p:spTree>
+    <p:extLst>
+      <p:ext uri="{BB962C8B-B14F-4D97-AF65-F5344CB8AC3E}">
+        <p14:creationId xmlns:p14="http://schemas.microsoft.com/office/powerpoint/2010/main" val="1544225582"/>
+      </p:ext>
+    </p:extLst>
+  </p:cSld>
+  <p:clrMapOvr>
+    <a:masterClrMapping/>
+  </p:clrMapOvr>
+  <p:timing>
+    <p:tnLst>
+      <p:par>
+        <p:cTn id="1" dur="indefinite" restart="never" nodeType="tmRoot"/>
+      </p:par>
+    </p:tnLst>
+  </p:timing>
+</p:sld>
+</file>
+
+<file path=ppt/slides/slide4.xml><?xml version="1.0" encoding="utf-8"?>
+<p:sld xmlns:a="http://schemas.openxmlformats.org/drawingml/2006/main" xmlns:r="http://schemas.openxmlformats.org/officeDocument/2006/relationships" xmlns:p="http://schemas.openxmlformats.org/presentationml/2006/main">
+  <p:cSld>
+    <p:spTree>
+      <p:nvGrpSpPr>
+        <p:cNvPr id="1" name=""/>
+        <p:cNvGrpSpPr/>
+        <p:nvPr/>
+      </p:nvGrpSpPr>
+      <p:grpSpPr>
+        <a:xfrm>
+          <a:off x="0" y="0"/>
+          <a:ext cx="0" cy="0"/>
+          <a:chOff x="0" y="0"/>
+          <a:chExt cx="0" cy="0"/>
+        </a:xfrm>
+      </p:grpSpPr>
+      <p:sp>
+        <p:nvSpPr>
+          <p:cNvPr id="6" name="Rectángulo 5"/>
+          <p:cNvSpPr/>
+          <p:nvPr/>
+        </p:nvSpPr>
+        <p:spPr>
+          <a:xfrm>
+            <a:off x="5043055" y="1433370"/>
+            <a:ext cx="6770253" cy="1417998"/>
+          </a:xfrm>
+          <a:prstGeom prst="rect">
+            <a:avLst/>
+          </a:prstGeom>
+          <a:ln>
+            <a:noFill/>
+          </a:ln>
+        </p:spPr>
+        <p:style>
+          <a:lnRef idx="2">
+            <a:schemeClr val="accent4">
+              <a:shade val="50000"/>
+            </a:schemeClr>
+          </a:lnRef>
+          <a:fillRef idx="1">
+            <a:schemeClr val="accent4"/>
+          </a:fillRef>
+          <a:effectRef idx="0">
+            <a:schemeClr val="accent4"/>
+          </a:effectRef>
+          <a:fontRef idx="minor">
+            <a:schemeClr val="lt1"/>
+          </a:fontRef>
+        </p:style>
+        <p:txBody>
+          <a:bodyPr rtlCol="0" anchor="ctr"/>
+          <a:lstStyle/>
+          <a:p>
+            <a:pPr algn="ctr"/>
+            <a:endParaRPr lang="es-ES"/>
+          </a:p>
+        </p:txBody>
+      </p:sp>
+      <p:sp>
+        <p:nvSpPr>
+          <p:cNvPr id="5" name="Rectángulo 4"/>
+          <p:cNvSpPr/>
+          <p:nvPr/>
+        </p:nvSpPr>
+        <p:spPr>
+          <a:xfrm>
+            <a:off x="572655" y="1791855"/>
+            <a:ext cx="4470401" cy="794327"/>
+          </a:xfrm>
+          <a:prstGeom prst="rect">
+            <a:avLst/>
+          </a:prstGeom>
+          <a:ln>
+            <a:noFill/>
+          </a:ln>
+        </p:spPr>
+        <p:style>
+          <a:lnRef idx="2">
+            <a:schemeClr val="accent1">
+              <a:shade val="50000"/>
+            </a:schemeClr>
+          </a:lnRef>
+          <a:fillRef idx="1">
+            <a:schemeClr val="accent1"/>
+          </a:fillRef>
+          <a:effectRef idx="0">
+            <a:schemeClr val="accent1"/>
+          </a:effectRef>
+          <a:fontRef idx="minor">
+            <a:schemeClr val="lt1"/>
+          </a:fontRef>
+        </p:style>
+        <p:txBody>
+          <a:bodyPr rtlCol="0" anchor="ctr"/>
+          <a:lstStyle/>
+          <a:p>
+            <a:pPr algn="ctr"/>
+            <a:endParaRPr lang="es-ES"/>
+          </a:p>
+        </p:txBody>
+      </p:sp>
+      <p:sp>
+        <p:nvSpPr>
+          <p:cNvPr id="2" name="Título 1"/>
+          <p:cNvSpPr>
+            <a:spLocks noGrp="1"/>
+          </p:cNvSpPr>
+          <p:nvPr>
+            <p:ph type="title"/>
+          </p:nvPr>
+        </p:nvSpPr>
+        <p:spPr/>
+        <p:txBody>
+          <a:bodyPr>
+            <a:normAutofit/>
+          </a:bodyPr>
+          <a:lstStyle/>
+          <a:p>
+            <a:r>
+              <a:rPr lang="es-PE" sz="4800" b="1" dirty="0" smtClean="0">
+                <a:solidFill>
+                  <a:schemeClr val="accent2">
+                    <a:lumMod val="50000"/>
+                  </a:schemeClr>
+                </a:solidFill>
+              </a:rPr>
+              <a:t>REQUERIMIENTOS FUNCIONALES</a:t>
+            </a:r>
+            <a:endParaRPr lang="es-ES" sz="4800" b="1" dirty="0">
+              <a:solidFill>
+                <a:schemeClr val="accent2">
+                  <a:lumMod val="50000"/>
+                </a:schemeClr>
+              </a:solidFill>
+            </a:endParaRPr>
+          </a:p>
+        </p:txBody>
+      </p:sp>
+      <p:sp>
+        <p:nvSpPr>
+          <p:cNvPr id="3" name="Marcador de contenido 2"/>
+          <p:cNvSpPr>
+            <a:spLocks noGrp="1"/>
+          </p:cNvSpPr>
+          <p:nvPr>
+            <p:ph idx="1"/>
+          </p:nvPr>
+        </p:nvSpPr>
+        <p:spPr>
+          <a:xfrm>
+            <a:off x="5430982" y="1550556"/>
+            <a:ext cx="5922818" cy="1309544"/>
+          </a:xfrm>
+        </p:spPr>
+        <p:txBody>
+          <a:bodyPr>
+            <a:normAutofit fontScale="47500" lnSpcReduction="20000"/>
+          </a:bodyPr>
+          <a:lstStyle/>
+          <a:p>
+            <a:pPr marL="0" indent="0" algn="ctr">
+              <a:buNone/>
+            </a:pPr>
+            <a:r>
+              <a:rPr lang="es-ES" sz="4000" b="1" dirty="0"/>
+              <a:t>Usuario </a:t>
+            </a:r>
+            <a:r>
+              <a:rPr lang="es-ES" sz="4000" b="1" dirty="0" smtClean="0"/>
+              <a:t>Gerencial - Mantenimiento </a:t>
+            </a:r>
+            <a:r>
+              <a:rPr lang="es-ES" sz="4000" b="1" dirty="0"/>
+              <a:t>completo de  usuarios trabajadores:  </a:t>
+            </a:r>
+            <a:endParaRPr lang="es-ES" sz="4000" b="1" dirty="0" smtClean="0"/>
+          </a:p>
+          <a:p>
+            <a:pPr marL="0" indent="0">
+              <a:buNone/>
+            </a:pPr>
+            <a:r>
+              <a:rPr lang="es-ES" sz="4000" dirty="0" smtClean="0"/>
+              <a:t>Debe </a:t>
+            </a:r>
+            <a:r>
+              <a:rPr lang="es-ES" sz="4000" dirty="0"/>
+              <a:t>existir un usuario Gerencial que pueda generar otros usuario Administradores, estos </a:t>
+            </a:r>
+            <a:r>
+              <a:rPr lang="es-ES" sz="4000" dirty="0" err="1"/>
+              <a:t>podran</a:t>
+            </a:r>
+            <a:r>
+              <a:rPr lang="es-ES" sz="4000" dirty="0"/>
+              <a:t> administrar a los clientes. Debe poder crear usuarios Choferes y asistentes</a:t>
+            </a:r>
+            <a:endParaRPr lang="es-ES" sz="3200" dirty="0"/>
+          </a:p>
+        </p:txBody>
+      </p:sp>
+      <p:sp>
+        <p:nvSpPr>
+          <p:cNvPr id="4" name="Marcador de contenido 2"/>
+          <p:cNvSpPr txBox="1">
+            <a:spLocks/>
+          </p:cNvSpPr>
+          <p:nvPr/>
+        </p:nvSpPr>
+        <p:spPr>
+          <a:xfrm>
+            <a:off x="641929" y="2009993"/>
+            <a:ext cx="4401127" cy="396730"/>
+          </a:xfrm>
+          <a:prstGeom prst="rect">
+            <a:avLst/>
+          </a:prstGeom>
+        </p:spPr>
+        <p:txBody>
+          <a:bodyPr vert="horz" lIns="91440" tIns="45720" rIns="91440" bIns="45720" rtlCol="0">
+            <a:noAutofit/>
+          </a:bodyPr>
+          <a:lstStyle>
+            <a:lvl1pPr marL="228600" indent="-228600" algn="l" defTabSz="914400" rtl="0" eaLnBrk="1" latinLnBrk="0" hangingPunct="1">
+              <a:lnSpc>
+                <a:spcPct val="90000"/>
+              </a:lnSpc>
+              <a:spcBef>
+                <a:spcPts val="1000"/>
+              </a:spcBef>
+              <a:buFont typeface="Arial" panose="020B0604020202020204" pitchFamily="34" charset="0"/>
+              <a:buChar char="•"/>
+              <a:defRPr sz="2800" kern="1200">
+                <a:solidFill>
+                  <a:schemeClr val="tx1"/>
+                </a:solidFill>
+                <a:latin typeface="+mn-lt"/>
+                <a:ea typeface="+mn-ea"/>
+                <a:cs typeface="+mn-cs"/>
+              </a:defRPr>
+            </a:lvl1pPr>
+            <a:lvl2pPr marL="685800" indent="-228600" algn="l" defTabSz="914400" rtl="0" eaLnBrk="1" latinLnBrk="0" hangingPunct="1">
+              <a:lnSpc>
+                <a:spcPct val="90000"/>
+              </a:lnSpc>
+              <a:spcBef>
+                <a:spcPts val="500"/>
+              </a:spcBef>
+              <a:buFont typeface="Arial" panose="020B0604020202020204" pitchFamily="34" charset="0"/>
+              <a:buChar char="•"/>
+              <a:defRPr sz="2400" kern="1200">
+                <a:solidFill>
+                  <a:schemeClr val="tx1"/>
+                </a:solidFill>
+                <a:latin typeface="+mn-lt"/>
+                <a:ea typeface="+mn-ea"/>
+                <a:cs typeface="+mn-cs"/>
+              </a:defRPr>
+            </a:lvl2pPr>
+            <a:lvl3pPr marL="1143000" indent="-228600" algn="l" defTabSz="914400" rtl="0" eaLnBrk="1" latinLnBrk="0" hangingPunct="1">
+              <a:lnSpc>
+                <a:spcPct val="90000"/>
+              </a:lnSpc>
+              <a:spcBef>
+                <a:spcPts val="500"/>
+              </a:spcBef>
+              <a:buFont typeface="Arial" panose="020B0604020202020204" pitchFamily="34" charset="0"/>
+              <a:buChar char="•"/>
+              <a:defRPr sz="2000" kern="1200">
+                <a:solidFill>
+                  <a:schemeClr val="tx1"/>
+                </a:solidFill>
+                <a:latin typeface="+mn-lt"/>
+                <a:ea typeface="+mn-ea"/>
+                <a:cs typeface="+mn-cs"/>
+              </a:defRPr>
+            </a:lvl3pPr>
+            <a:lvl4pPr marL="1600200" indent="-228600" algn="l" defTabSz="914400" rtl="0" eaLnBrk="1" latinLnBrk="0" hangingPunct="1">
+              <a:lnSpc>
+                <a:spcPct val="90000"/>
+              </a:lnSpc>
+              <a:spcBef>
+                <a:spcPts val="500"/>
+              </a:spcBef>
+              <a:buFont typeface="Arial" panose="020B0604020202020204" pitchFamily="34" charset="0"/>
+              <a:buChar char="•"/>
+              <a:defRPr sz="1800" kern="1200">
+                <a:solidFill>
+                  <a:schemeClr val="tx1"/>
+                </a:solidFill>
+                <a:latin typeface="+mn-lt"/>
+                <a:ea typeface="+mn-ea"/>
+                <a:cs typeface="+mn-cs"/>
+              </a:defRPr>
+            </a:lvl4pPr>
+            <a:lvl5pPr marL="2057400" indent="-228600" algn="l" defTabSz="914400" rtl="0" eaLnBrk="1" latinLnBrk="0" hangingPunct="1">
+              <a:lnSpc>
+                <a:spcPct val="90000"/>
+              </a:lnSpc>
+              <a:spcBef>
+                <a:spcPts val="500"/>
+              </a:spcBef>
+              <a:buFont typeface="Arial" panose="020B0604020202020204" pitchFamily="34" charset="0"/>
+              <a:buChar char="•"/>
+              <a:defRPr sz="1800" kern="1200">
+                <a:solidFill>
+                  <a:schemeClr val="tx1"/>
+                </a:solidFill>
+                <a:latin typeface="+mn-lt"/>
+                <a:ea typeface="+mn-ea"/>
+                <a:cs typeface="+mn-cs"/>
+              </a:defRPr>
+            </a:lvl5pPr>
+            <a:lvl6pPr marL="2514600" indent="-228600" algn="l" defTabSz="914400" rtl="0" eaLnBrk="1" latinLnBrk="0" hangingPunct="1">
+              <a:lnSpc>
+                <a:spcPct val="90000"/>
+              </a:lnSpc>
+              <a:spcBef>
+                <a:spcPts val="500"/>
+              </a:spcBef>
+              <a:buFont typeface="Arial" panose="020B0604020202020204" pitchFamily="34" charset="0"/>
+              <a:buChar char="•"/>
+              <a:defRPr sz="1800" kern="1200">
+                <a:solidFill>
+                  <a:schemeClr val="tx1"/>
+                </a:solidFill>
+                <a:latin typeface="+mn-lt"/>
+                <a:ea typeface="+mn-ea"/>
+                <a:cs typeface="+mn-cs"/>
+              </a:defRPr>
+            </a:lvl6pPr>
+            <a:lvl7pPr marL="2971800" indent="-228600" algn="l" defTabSz="914400" rtl="0" eaLnBrk="1" latinLnBrk="0" hangingPunct="1">
+              <a:lnSpc>
+                <a:spcPct val="90000"/>
+              </a:lnSpc>
+              <a:spcBef>
+                <a:spcPts val="500"/>
+              </a:spcBef>
+              <a:buFont typeface="Arial" panose="020B0604020202020204" pitchFamily="34" charset="0"/>
+              <a:buChar char="•"/>
+              <a:defRPr sz="1800" kern="1200">
+                <a:solidFill>
+                  <a:schemeClr val="tx1"/>
+                </a:solidFill>
+                <a:latin typeface="+mn-lt"/>
+                <a:ea typeface="+mn-ea"/>
+                <a:cs typeface="+mn-cs"/>
+              </a:defRPr>
+            </a:lvl7pPr>
+            <a:lvl8pPr marL="3429000" indent="-228600" algn="l" defTabSz="914400" rtl="0" eaLnBrk="1" latinLnBrk="0" hangingPunct="1">
+              <a:lnSpc>
+                <a:spcPct val="90000"/>
+              </a:lnSpc>
+              <a:spcBef>
+                <a:spcPts val="500"/>
+              </a:spcBef>
+              <a:buFont typeface="Arial" panose="020B0604020202020204" pitchFamily="34" charset="0"/>
+              <a:buChar char="•"/>
+              <a:defRPr sz="1800" kern="1200">
+                <a:solidFill>
+                  <a:schemeClr val="tx1"/>
+                </a:solidFill>
+                <a:latin typeface="+mn-lt"/>
+                <a:ea typeface="+mn-ea"/>
+                <a:cs typeface="+mn-cs"/>
+              </a:defRPr>
+            </a:lvl8pPr>
+            <a:lvl9pPr marL="3886200" indent="-228600" algn="l" defTabSz="914400" rtl="0" eaLnBrk="1" latinLnBrk="0" hangingPunct="1">
+              <a:lnSpc>
+                <a:spcPct val="90000"/>
+              </a:lnSpc>
+              <a:spcBef>
+                <a:spcPts val="500"/>
+              </a:spcBef>
+              <a:buFont typeface="Arial" panose="020B0604020202020204" pitchFamily="34" charset="0"/>
+              <a:buChar char="•"/>
+              <a:defRPr sz="1800" kern="1200">
+                <a:solidFill>
+                  <a:schemeClr val="tx1"/>
+                </a:solidFill>
+                <a:latin typeface="+mn-lt"/>
+                <a:ea typeface="+mn-ea"/>
+                <a:cs typeface="+mn-cs"/>
+              </a:defRPr>
+            </a:lvl9pPr>
+          </a:lstStyle>
+          <a:p>
+            <a:pPr marL="0" indent="0">
+              <a:buNone/>
+            </a:pPr>
+            <a:r>
+              <a:rPr lang="es-PE" sz="2000" b="1" dirty="0">
+                <a:solidFill>
+                  <a:schemeClr val="bg1"/>
+                </a:solidFill>
+              </a:rPr>
+              <a:t>Funciones </a:t>
+            </a:r>
+            <a:r>
+              <a:rPr lang="es-PE" sz="2000" b="1" dirty="0" smtClean="0">
+                <a:solidFill>
+                  <a:schemeClr val="bg1"/>
+                </a:solidFill>
+              </a:rPr>
+              <a:t>administrativas </a:t>
+            </a:r>
+            <a:r>
+              <a:rPr lang="es-PE" sz="2000" b="1" dirty="0">
+                <a:solidFill>
+                  <a:schemeClr val="bg1"/>
+                </a:solidFill>
+              </a:rPr>
+              <a:t>Gerenciales</a:t>
+            </a:r>
+            <a:endParaRPr lang="es-ES" sz="1600" dirty="0">
+              <a:solidFill>
+                <a:schemeClr val="bg1"/>
+              </a:solidFill>
+            </a:endParaRPr>
+          </a:p>
+        </p:txBody>
+      </p:sp>
+      <p:sp>
+        <p:nvSpPr>
+          <p:cNvPr id="7" name="Rectángulo 6"/>
+          <p:cNvSpPr/>
+          <p:nvPr/>
+        </p:nvSpPr>
+        <p:spPr>
+          <a:xfrm>
+            <a:off x="5043055" y="2989118"/>
+            <a:ext cx="6770253" cy="1431779"/>
+          </a:xfrm>
+          <a:prstGeom prst="rect">
+            <a:avLst/>
+          </a:prstGeom>
+          <a:ln>
+            <a:noFill/>
+          </a:ln>
+        </p:spPr>
+        <p:style>
+          <a:lnRef idx="2">
+            <a:schemeClr val="accent4">
+              <a:shade val="50000"/>
+            </a:schemeClr>
+          </a:lnRef>
+          <a:fillRef idx="1">
+            <a:schemeClr val="accent4"/>
+          </a:fillRef>
+          <a:effectRef idx="0">
+            <a:schemeClr val="accent4"/>
+          </a:effectRef>
+          <a:fontRef idx="minor">
+            <a:schemeClr val="lt1"/>
+          </a:fontRef>
+        </p:style>
+        <p:txBody>
+          <a:bodyPr rtlCol="0" anchor="ctr"/>
+          <a:lstStyle/>
+          <a:p>
+            <a:pPr algn="ctr"/>
+            <a:endParaRPr lang="es-ES"/>
+          </a:p>
+        </p:txBody>
+      </p:sp>
+      <p:sp>
+        <p:nvSpPr>
+          <p:cNvPr id="8" name="Rectángulo 7"/>
+          <p:cNvSpPr/>
+          <p:nvPr/>
+        </p:nvSpPr>
+        <p:spPr>
+          <a:xfrm>
+            <a:off x="572655" y="3268085"/>
+            <a:ext cx="4470401" cy="794327"/>
+          </a:xfrm>
+          <a:prstGeom prst="rect">
+            <a:avLst/>
+          </a:prstGeom>
+          <a:ln>
+            <a:noFill/>
+          </a:ln>
+        </p:spPr>
+        <p:style>
+          <a:lnRef idx="2">
+            <a:schemeClr val="accent1">
+              <a:shade val="50000"/>
+            </a:schemeClr>
+          </a:lnRef>
+          <a:fillRef idx="1">
+            <a:schemeClr val="accent1"/>
+          </a:fillRef>
+          <a:effectRef idx="0">
+            <a:schemeClr val="accent1"/>
+          </a:effectRef>
+          <a:fontRef idx="minor">
+            <a:schemeClr val="lt1"/>
+          </a:fontRef>
+        </p:style>
+        <p:txBody>
+          <a:bodyPr rtlCol="0" anchor="ctr"/>
+          <a:lstStyle/>
+          <a:p>
+            <a:pPr algn="ctr"/>
+            <a:endParaRPr lang="es-ES"/>
+          </a:p>
+        </p:txBody>
+      </p:sp>
+      <p:sp>
+        <p:nvSpPr>
+          <p:cNvPr id="9" name="Marcador de contenido 2"/>
+          <p:cNvSpPr txBox="1">
+            <a:spLocks/>
+          </p:cNvSpPr>
+          <p:nvPr/>
+        </p:nvSpPr>
+        <p:spPr>
+          <a:xfrm>
+            <a:off x="5430982" y="3073765"/>
+            <a:ext cx="5922818" cy="1449676"/>
+          </a:xfrm>
+          <a:prstGeom prst="rect">
+            <a:avLst/>
+          </a:prstGeom>
+        </p:spPr>
+        <p:txBody>
+          <a:bodyPr vert="horz" lIns="91440" tIns="45720" rIns="91440" bIns="45720" rtlCol="0">
+            <a:normAutofit/>
+          </a:bodyPr>
+          <a:lstStyle>
+            <a:lvl1pPr marL="228600" indent="-228600" algn="l" defTabSz="914400" rtl="0" eaLnBrk="1" latinLnBrk="0" hangingPunct="1">
+              <a:lnSpc>
+                <a:spcPct val="90000"/>
+              </a:lnSpc>
+              <a:spcBef>
+                <a:spcPts val="1000"/>
+              </a:spcBef>
+              <a:buFont typeface="Arial" panose="020B0604020202020204" pitchFamily="34" charset="0"/>
+              <a:buChar char="•"/>
+              <a:defRPr sz="2800" kern="1200">
+                <a:solidFill>
+                  <a:schemeClr val="tx1"/>
+                </a:solidFill>
+                <a:latin typeface="+mn-lt"/>
+                <a:ea typeface="+mn-ea"/>
+                <a:cs typeface="+mn-cs"/>
+              </a:defRPr>
+            </a:lvl1pPr>
+            <a:lvl2pPr marL="685800" indent="-228600" algn="l" defTabSz="914400" rtl="0" eaLnBrk="1" latinLnBrk="0" hangingPunct="1">
+              <a:lnSpc>
+                <a:spcPct val="90000"/>
+              </a:lnSpc>
+              <a:spcBef>
+                <a:spcPts val="500"/>
+              </a:spcBef>
+              <a:buFont typeface="Arial" panose="020B0604020202020204" pitchFamily="34" charset="0"/>
+              <a:buChar char="•"/>
+              <a:defRPr sz="2400" kern="1200">
+                <a:solidFill>
+                  <a:schemeClr val="tx1"/>
+                </a:solidFill>
+                <a:latin typeface="+mn-lt"/>
+                <a:ea typeface="+mn-ea"/>
+                <a:cs typeface="+mn-cs"/>
+              </a:defRPr>
+            </a:lvl2pPr>
+            <a:lvl3pPr marL="1143000" indent="-228600" algn="l" defTabSz="914400" rtl="0" eaLnBrk="1" latinLnBrk="0" hangingPunct="1">
+              <a:lnSpc>
+                <a:spcPct val="90000"/>
+              </a:lnSpc>
+              <a:spcBef>
+                <a:spcPts val="500"/>
+              </a:spcBef>
+              <a:buFont typeface="Arial" panose="020B0604020202020204" pitchFamily="34" charset="0"/>
+              <a:buChar char="•"/>
+              <a:defRPr sz="2000" kern="1200">
+                <a:solidFill>
+                  <a:schemeClr val="tx1"/>
+                </a:solidFill>
+                <a:latin typeface="+mn-lt"/>
+                <a:ea typeface="+mn-ea"/>
+                <a:cs typeface="+mn-cs"/>
+              </a:defRPr>
+            </a:lvl3pPr>
+            <a:lvl4pPr marL="1600200" indent="-228600" algn="l" defTabSz="914400" rtl="0" eaLnBrk="1" latinLnBrk="0" hangingPunct="1">
+              <a:lnSpc>
+                <a:spcPct val="90000"/>
+              </a:lnSpc>
+              <a:spcBef>
+                <a:spcPts val="500"/>
+              </a:spcBef>
+              <a:buFont typeface="Arial" panose="020B0604020202020204" pitchFamily="34" charset="0"/>
+              <a:buChar char="•"/>
+              <a:defRPr sz="1800" kern="1200">
+                <a:solidFill>
+                  <a:schemeClr val="tx1"/>
+                </a:solidFill>
+                <a:latin typeface="+mn-lt"/>
+                <a:ea typeface="+mn-ea"/>
+                <a:cs typeface="+mn-cs"/>
+              </a:defRPr>
+            </a:lvl4pPr>
+            <a:lvl5pPr marL="2057400" indent="-228600" algn="l" defTabSz="914400" rtl="0" eaLnBrk="1" latinLnBrk="0" hangingPunct="1">
+              <a:lnSpc>
+                <a:spcPct val="90000"/>
+              </a:lnSpc>
+              <a:spcBef>
+                <a:spcPts val="500"/>
+              </a:spcBef>
+              <a:buFont typeface="Arial" panose="020B0604020202020204" pitchFamily="34" charset="0"/>
+              <a:buChar char="•"/>
+              <a:defRPr sz="1800" kern="1200">
+                <a:solidFill>
+                  <a:schemeClr val="tx1"/>
+                </a:solidFill>
+                <a:latin typeface="+mn-lt"/>
+                <a:ea typeface="+mn-ea"/>
+                <a:cs typeface="+mn-cs"/>
+              </a:defRPr>
+            </a:lvl5pPr>
+            <a:lvl6pPr marL="2514600" indent="-228600" algn="l" defTabSz="914400" rtl="0" eaLnBrk="1" latinLnBrk="0" hangingPunct="1">
+              <a:lnSpc>
+                <a:spcPct val="90000"/>
+              </a:lnSpc>
+              <a:spcBef>
+                <a:spcPts val="500"/>
+              </a:spcBef>
+              <a:buFont typeface="Arial" panose="020B0604020202020204" pitchFamily="34" charset="0"/>
+              <a:buChar char="•"/>
+              <a:defRPr sz="1800" kern="1200">
+                <a:solidFill>
+                  <a:schemeClr val="tx1"/>
+                </a:solidFill>
+                <a:latin typeface="+mn-lt"/>
+                <a:ea typeface="+mn-ea"/>
+                <a:cs typeface="+mn-cs"/>
+              </a:defRPr>
+            </a:lvl6pPr>
+            <a:lvl7pPr marL="2971800" indent="-228600" algn="l" defTabSz="914400" rtl="0" eaLnBrk="1" latinLnBrk="0" hangingPunct="1">
+              <a:lnSpc>
+                <a:spcPct val="90000"/>
+              </a:lnSpc>
+              <a:spcBef>
+                <a:spcPts val="500"/>
+              </a:spcBef>
+              <a:buFont typeface="Arial" panose="020B0604020202020204" pitchFamily="34" charset="0"/>
+              <a:buChar char="•"/>
+              <a:defRPr sz="1800" kern="1200">
+                <a:solidFill>
+                  <a:schemeClr val="tx1"/>
+                </a:solidFill>
+                <a:latin typeface="+mn-lt"/>
+                <a:ea typeface="+mn-ea"/>
+                <a:cs typeface="+mn-cs"/>
+              </a:defRPr>
+            </a:lvl7pPr>
+            <a:lvl8pPr marL="3429000" indent="-228600" algn="l" defTabSz="914400" rtl="0" eaLnBrk="1" latinLnBrk="0" hangingPunct="1">
+              <a:lnSpc>
+                <a:spcPct val="90000"/>
+              </a:lnSpc>
+              <a:spcBef>
+                <a:spcPts val="500"/>
+              </a:spcBef>
+              <a:buFont typeface="Arial" panose="020B0604020202020204" pitchFamily="34" charset="0"/>
+              <a:buChar char="•"/>
+              <a:defRPr sz="1800" kern="1200">
+                <a:solidFill>
+                  <a:schemeClr val="tx1"/>
+                </a:solidFill>
+                <a:latin typeface="+mn-lt"/>
+                <a:ea typeface="+mn-ea"/>
+                <a:cs typeface="+mn-cs"/>
+              </a:defRPr>
+            </a:lvl8pPr>
+            <a:lvl9pPr marL="3886200" indent="-228600" algn="l" defTabSz="914400" rtl="0" eaLnBrk="1" latinLnBrk="0" hangingPunct="1">
+              <a:lnSpc>
+                <a:spcPct val="90000"/>
+              </a:lnSpc>
+              <a:spcBef>
+                <a:spcPts val="500"/>
+              </a:spcBef>
+              <a:buFont typeface="Arial" panose="020B0604020202020204" pitchFamily="34" charset="0"/>
+              <a:buChar char="•"/>
+              <a:defRPr sz="1800" kern="1200">
+                <a:solidFill>
+                  <a:schemeClr val="tx1"/>
+                </a:solidFill>
+                <a:latin typeface="+mn-lt"/>
+                <a:ea typeface="+mn-ea"/>
+                <a:cs typeface="+mn-cs"/>
+              </a:defRPr>
+            </a:lvl9pPr>
+          </a:lstStyle>
+          <a:p>
+            <a:pPr marL="0" indent="0" algn="ctr">
+              <a:buNone/>
+            </a:pPr>
+            <a:r>
+              <a:rPr lang="es-ES" sz="2200" b="1" dirty="0"/>
+              <a:t>Usuario Administrador- Mantenimiento completo de clientes:  </a:t>
+            </a:r>
+            <a:r>
+              <a:rPr lang="es-ES" sz="2200" dirty="0"/>
+              <a:t>EL usuario administrador </a:t>
+            </a:r>
+            <a:r>
+              <a:rPr lang="es-ES" sz="2200" dirty="0" err="1"/>
+              <a:t>podra</a:t>
+            </a:r>
+            <a:r>
+              <a:rPr lang="es-ES" sz="2200" dirty="0"/>
+              <a:t> generar y asignar tarjetas de tren a los clientes que deseen </a:t>
+            </a:r>
+            <a:r>
+              <a:rPr lang="es-ES" sz="2200" dirty="0" smtClean="0"/>
+              <a:t>adquirirlo.</a:t>
+            </a:r>
+            <a:endParaRPr lang="es-ES" sz="2200" dirty="0"/>
+          </a:p>
+        </p:txBody>
+      </p:sp>
+      <p:sp>
+        <p:nvSpPr>
+          <p:cNvPr id="10" name="Marcador de contenido 2"/>
+          <p:cNvSpPr txBox="1">
+            <a:spLocks/>
+          </p:cNvSpPr>
+          <p:nvPr/>
+        </p:nvSpPr>
+        <p:spPr>
+          <a:xfrm>
+            <a:off x="641929" y="3366367"/>
+            <a:ext cx="4401127" cy="396730"/>
+          </a:xfrm>
+          <a:prstGeom prst="rect">
+            <a:avLst/>
+          </a:prstGeom>
+        </p:spPr>
+        <p:txBody>
+          <a:bodyPr vert="horz" lIns="91440" tIns="45720" rIns="91440" bIns="45720" rtlCol="0">
+            <a:noAutofit/>
+          </a:bodyPr>
+          <a:lstStyle>
+            <a:lvl1pPr marL="228600" indent="-228600" algn="l" defTabSz="914400" rtl="0" eaLnBrk="1" latinLnBrk="0" hangingPunct="1">
+              <a:lnSpc>
+                <a:spcPct val="90000"/>
+              </a:lnSpc>
+              <a:spcBef>
+                <a:spcPts val="1000"/>
+              </a:spcBef>
+              <a:buFont typeface="Arial" panose="020B0604020202020204" pitchFamily="34" charset="0"/>
+              <a:buChar char="•"/>
+              <a:defRPr sz="2800" kern="1200">
+                <a:solidFill>
+                  <a:schemeClr val="tx1"/>
+                </a:solidFill>
+                <a:latin typeface="+mn-lt"/>
+                <a:ea typeface="+mn-ea"/>
+                <a:cs typeface="+mn-cs"/>
+              </a:defRPr>
+            </a:lvl1pPr>
+            <a:lvl2pPr marL="685800" indent="-228600" algn="l" defTabSz="914400" rtl="0" eaLnBrk="1" latinLnBrk="0" hangingPunct="1">
+              <a:lnSpc>
+                <a:spcPct val="90000"/>
+              </a:lnSpc>
+              <a:spcBef>
+                <a:spcPts val="500"/>
+              </a:spcBef>
+              <a:buFont typeface="Arial" panose="020B0604020202020204" pitchFamily="34" charset="0"/>
+              <a:buChar char="•"/>
+              <a:defRPr sz="2400" kern="1200">
+                <a:solidFill>
+                  <a:schemeClr val="tx1"/>
+                </a:solidFill>
+                <a:latin typeface="+mn-lt"/>
+                <a:ea typeface="+mn-ea"/>
+                <a:cs typeface="+mn-cs"/>
+              </a:defRPr>
+            </a:lvl2pPr>
+            <a:lvl3pPr marL="1143000" indent="-228600" algn="l" defTabSz="914400" rtl="0" eaLnBrk="1" latinLnBrk="0" hangingPunct="1">
+              <a:lnSpc>
+                <a:spcPct val="90000"/>
+              </a:lnSpc>
+              <a:spcBef>
+                <a:spcPts val="500"/>
+              </a:spcBef>
+              <a:buFont typeface="Arial" panose="020B0604020202020204" pitchFamily="34" charset="0"/>
+              <a:buChar char="•"/>
+              <a:defRPr sz="2000" kern="1200">
+                <a:solidFill>
+                  <a:schemeClr val="tx1"/>
+                </a:solidFill>
+                <a:latin typeface="+mn-lt"/>
+                <a:ea typeface="+mn-ea"/>
+                <a:cs typeface="+mn-cs"/>
+              </a:defRPr>
+            </a:lvl3pPr>
+            <a:lvl4pPr marL="1600200" indent="-228600" algn="l" defTabSz="914400" rtl="0" eaLnBrk="1" latinLnBrk="0" hangingPunct="1">
+              <a:lnSpc>
+                <a:spcPct val="90000"/>
+              </a:lnSpc>
+              <a:spcBef>
+                <a:spcPts val="500"/>
+              </a:spcBef>
+              <a:buFont typeface="Arial" panose="020B0604020202020204" pitchFamily="34" charset="0"/>
+              <a:buChar char="•"/>
+              <a:defRPr sz="1800" kern="1200">
+                <a:solidFill>
+                  <a:schemeClr val="tx1"/>
+                </a:solidFill>
+                <a:latin typeface="+mn-lt"/>
+                <a:ea typeface="+mn-ea"/>
+                <a:cs typeface="+mn-cs"/>
+              </a:defRPr>
+            </a:lvl4pPr>
+            <a:lvl5pPr marL="2057400" indent="-228600" algn="l" defTabSz="914400" rtl="0" eaLnBrk="1" latinLnBrk="0" hangingPunct="1">
+              <a:lnSpc>
+                <a:spcPct val="90000"/>
+              </a:lnSpc>
+              <a:spcBef>
+                <a:spcPts val="500"/>
+              </a:spcBef>
+              <a:buFont typeface="Arial" panose="020B0604020202020204" pitchFamily="34" charset="0"/>
+              <a:buChar char="•"/>
+              <a:defRPr sz="1800" kern="1200">
+                <a:solidFill>
+                  <a:schemeClr val="tx1"/>
+                </a:solidFill>
+                <a:latin typeface="+mn-lt"/>
+                <a:ea typeface="+mn-ea"/>
+                <a:cs typeface="+mn-cs"/>
+              </a:defRPr>
+            </a:lvl5pPr>
+            <a:lvl6pPr marL="2514600" indent="-228600" algn="l" defTabSz="914400" rtl="0" eaLnBrk="1" latinLnBrk="0" hangingPunct="1">
+              <a:lnSpc>
+                <a:spcPct val="90000"/>
+              </a:lnSpc>
+              <a:spcBef>
+                <a:spcPts val="500"/>
+              </a:spcBef>
+              <a:buFont typeface="Arial" panose="020B0604020202020204" pitchFamily="34" charset="0"/>
+              <a:buChar char="•"/>
+              <a:defRPr sz="1800" kern="1200">
+                <a:solidFill>
+                  <a:schemeClr val="tx1"/>
+                </a:solidFill>
+                <a:latin typeface="+mn-lt"/>
+                <a:ea typeface="+mn-ea"/>
+                <a:cs typeface="+mn-cs"/>
+              </a:defRPr>
+            </a:lvl6pPr>
+            <a:lvl7pPr marL="2971800" indent="-228600" algn="l" defTabSz="914400" rtl="0" eaLnBrk="1" latinLnBrk="0" hangingPunct="1">
+              <a:lnSpc>
+                <a:spcPct val="90000"/>
+              </a:lnSpc>
+              <a:spcBef>
+                <a:spcPts val="500"/>
+              </a:spcBef>
+              <a:buFont typeface="Arial" panose="020B0604020202020204" pitchFamily="34" charset="0"/>
+              <a:buChar char="•"/>
+              <a:defRPr sz="1800" kern="1200">
+                <a:solidFill>
+                  <a:schemeClr val="tx1"/>
+                </a:solidFill>
+                <a:latin typeface="+mn-lt"/>
+                <a:ea typeface="+mn-ea"/>
+                <a:cs typeface="+mn-cs"/>
+              </a:defRPr>
+            </a:lvl7pPr>
+            <a:lvl8pPr marL="3429000" indent="-228600" algn="l" defTabSz="914400" rtl="0" eaLnBrk="1" latinLnBrk="0" hangingPunct="1">
+              <a:lnSpc>
+                <a:spcPct val="90000"/>
+              </a:lnSpc>
+              <a:spcBef>
+                <a:spcPts val="500"/>
+              </a:spcBef>
+              <a:buFont typeface="Arial" panose="020B0604020202020204" pitchFamily="34" charset="0"/>
+              <a:buChar char="•"/>
+              <a:defRPr sz="1800" kern="1200">
+                <a:solidFill>
+                  <a:schemeClr val="tx1"/>
+                </a:solidFill>
+                <a:latin typeface="+mn-lt"/>
+                <a:ea typeface="+mn-ea"/>
+                <a:cs typeface="+mn-cs"/>
+              </a:defRPr>
+            </a:lvl8pPr>
+            <a:lvl9pPr marL="3886200" indent="-228600" algn="l" defTabSz="914400" rtl="0" eaLnBrk="1" latinLnBrk="0" hangingPunct="1">
+              <a:lnSpc>
+                <a:spcPct val="90000"/>
+              </a:lnSpc>
+              <a:spcBef>
+                <a:spcPts val="500"/>
+              </a:spcBef>
+              <a:buFont typeface="Arial" panose="020B0604020202020204" pitchFamily="34" charset="0"/>
+              <a:buChar char="•"/>
+              <a:defRPr sz="1800" kern="1200">
+                <a:solidFill>
+                  <a:schemeClr val="tx1"/>
+                </a:solidFill>
+                <a:latin typeface="+mn-lt"/>
+                <a:ea typeface="+mn-ea"/>
+                <a:cs typeface="+mn-cs"/>
+              </a:defRPr>
+            </a:lvl9pPr>
+          </a:lstStyle>
+          <a:p>
+            <a:pPr marL="0" indent="0" algn="ctr">
+              <a:buNone/>
+            </a:pPr>
+            <a:r>
+              <a:rPr lang="es-PE" sz="2000" b="1" dirty="0">
+                <a:solidFill>
+                  <a:schemeClr val="bg1"/>
+                </a:solidFill>
+              </a:rPr>
+              <a:t>Administrador General de clientes - Funciones comerciales</a:t>
+            </a:r>
+            <a:endParaRPr lang="es-ES" sz="1600" dirty="0">
+              <a:solidFill>
+                <a:schemeClr val="bg1"/>
+              </a:solidFill>
+            </a:endParaRPr>
+          </a:p>
+        </p:txBody>
+      </p:sp>
+      <p:sp>
+        <p:nvSpPr>
+          <p:cNvPr id="11" name="Rectángulo 10"/>
+          <p:cNvSpPr/>
+          <p:nvPr/>
+        </p:nvSpPr>
+        <p:spPr>
+          <a:xfrm>
+            <a:off x="5043055" y="4560175"/>
+            <a:ext cx="6770253" cy="1332625"/>
+          </a:xfrm>
+          <a:prstGeom prst="rect">
+            <a:avLst/>
+          </a:prstGeom>
+          <a:ln>
+            <a:noFill/>
+          </a:ln>
+        </p:spPr>
+        <p:style>
+          <a:lnRef idx="2">
+            <a:schemeClr val="accent4">
+              <a:shade val="50000"/>
+            </a:schemeClr>
+          </a:lnRef>
+          <a:fillRef idx="1">
+            <a:schemeClr val="accent4"/>
+          </a:fillRef>
+          <a:effectRef idx="0">
+            <a:schemeClr val="accent4"/>
+          </a:effectRef>
+          <a:fontRef idx="minor">
+            <a:schemeClr val="lt1"/>
+          </a:fontRef>
+        </p:style>
+        <p:txBody>
+          <a:bodyPr rtlCol="0" anchor="ctr"/>
+          <a:lstStyle/>
+          <a:p>
+            <a:pPr algn="ctr"/>
+            <a:endParaRPr lang="es-ES"/>
+          </a:p>
+        </p:txBody>
+      </p:sp>
+      <p:sp>
+        <p:nvSpPr>
+          <p:cNvPr id="12" name="Rectángulo 11"/>
+          <p:cNvSpPr/>
+          <p:nvPr/>
+        </p:nvSpPr>
+        <p:spPr>
+          <a:xfrm>
+            <a:off x="572655" y="4782492"/>
+            <a:ext cx="4470401" cy="794327"/>
+          </a:xfrm>
+          <a:prstGeom prst="rect">
+            <a:avLst/>
+          </a:prstGeom>
+          <a:ln>
+            <a:noFill/>
+          </a:ln>
+        </p:spPr>
+        <p:style>
+          <a:lnRef idx="2">
+            <a:schemeClr val="accent1">
+              <a:shade val="50000"/>
+            </a:schemeClr>
+          </a:lnRef>
+          <a:fillRef idx="1">
+            <a:schemeClr val="accent1"/>
+          </a:fillRef>
+          <a:effectRef idx="0">
+            <a:schemeClr val="accent1"/>
+          </a:effectRef>
+          <a:fontRef idx="minor">
+            <a:schemeClr val="lt1"/>
+          </a:fontRef>
+        </p:style>
+        <p:txBody>
+          <a:bodyPr rtlCol="0" anchor="ctr"/>
+          <a:lstStyle/>
+          <a:p>
+            <a:pPr algn="ctr"/>
+            <a:endParaRPr lang="es-ES"/>
+          </a:p>
+        </p:txBody>
+      </p:sp>
+      <p:sp>
+        <p:nvSpPr>
+          <p:cNvPr id="13" name="Marcador de contenido 2"/>
+          <p:cNvSpPr txBox="1">
+            <a:spLocks/>
+          </p:cNvSpPr>
+          <p:nvPr/>
+        </p:nvSpPr>
+        <p:spPr>
+          <a:xfrm>
+            <a:off x="5430982" y="4720221"/>
+            <a:ext cx="5922818" cy="1449676"/>
+          </a:xfrm>
+          <a:prstGeom prst="rect">
+            <a:avLst/>
+          </a:prstGeom>
+        </p:spPr>
+        <p:txBody>
+          <a:bodyPr vert="horz" lIns="91440" tIns="45720" rIns="91440" bIns="45720" rtlCol="0">
+            <a:normAutofit/>
+          </a:bodyPr>
+          <a:lstStyle>
+            <a:lvl1pPr marL="228600" indent="-228600" algn="l" defTabSz="914400" rtl="0" eaLnBrk="1" latinLnBrk="0" hangingPunct="1">
+              <a:lnSpc>
+                <a:spcPct val="90000"/>
+              </a:lnSpc>
+              <a:spcBef>
+                <a:spcPts val="1000"/>
+              </a:spcBef>
+              <a:buFont typeface="Arial" panose="020B0604020202020204" pitchFamily="34" charset="0"/>
+              <a:buChar char="•"/>
+              <a:defRPr sz="2800" kern="1200">
+                <a:solidFill>
+                  <a:schemeClr val="tx1"/>
+                </a:solidFill>
+                <a:latin typeface="+mn-lt"/>
+                <a:ea typeface="+mn-ea"/>
+                <a:cs typeface="+mn-cs"/>
+              </a:defRPr>
+            </a:lvl1pPr>
+            <a:lvl2pPr marL="685800" indent="-228600" algn="l" defTabSz="914400" rtl="0" eaLnBrk="1" latinLnBrk="0" hangingPunct="1">
+              <a:lnSpc>
+                <a:spcPct val="90000"/>
+              </a:lnSpc>
+              <a:spcBef>
+                <a:spcPts val="500"/>
+              </a:spcBef>
+              <a:buFont typeface="Arial" panose="020B0604020202020204" pitchFamily="34" charset="0"/>
+              <a:buChar char="•"/>
+              <a:defRPr sz="2400" kern="1200">
+                <a:solidFill>
+                  <a:schemeClr val="tx1"/>
+                </a:solidFill>
+                <a:latin typeface="+mn-lt"/>
+                <a:ea typeface="+mn-ea"/>
+                <a:cs typeface="+mn-cs"/>
+              </a:defRPr>
+            </a:lvl2pPr>
+            <a:lvl3pPr marL="1143000" indent="-228600" algn="l" defTabSz="914400" rtl="0" eaLnBrk="1" latinLnBrk="0" hangingPunct="1">
+              <a:lnSpc>
+                <a:spcPct val="90000"/>
+              </a:lnSpc>
+              <a:spcBef>
+                <a:spcPts val="500"/>
+              </a:spcBef>
+              <a:buFont typeface="Arial" panose="020B0604020202020204" pitchFamily="34" charset="0"/>
+              <a:buChar char="•"/>
+              <a:defRPr sz="2000" kern="1200">
+                <a:solidFill>
+                  <a:schemeClr val="tx1"/>
+                </a:solidFill>
+                <a:latin typeface="+mn-lt"/>
+                <a:ea typeface="+mn-ea"/>
+                <a:cs typeface="+mn-cs"/>
+              </a:defRPr>
+            </a:lvl3pPr>
+            <a:lvl4pPr marL="1600200" indent="-228600" algn="l" defTabSz="914400" rtl="0" eaLnBrk="1" latinLnBrk="0" hangingPunct="1">
+              <a:lnSpc>
+                <a:spcPct val="90000"/>
+              </a:lnSpc>
+              <a:spcBef>
+                <a:spcPts val="500"/>
+              </a:spcBef>
+              <a:buFont typeface="Arial" panose="020B0604020202020204" pitchFamily="34" charset="0"/>
+              <a:buChar char="•"/>
+              <a:defRPr sz="1800" kern="1200">
+                <a:solidFill>
+                  <a:schemeClr val="tx1"/>
+                </a:solidFill>
+                <a:latin typeface="+mn-lt"/>
+                <a:ea typeface="+mn-ea"/>
+                <a:cs typeface="+mn-cs"/>
+              </a:defRPr>
+            </a:lvl4pPr>
+            <a:lvl5pPr marL="2057400" indent="-228600" algn="l" defTabSz="914400" rtl="0" eaLnBrk="1" latinLnBrk="0" hangingPunct="1">
+              <a:lnSpc>
+                <a:spcPct val="90000"/>
+              </a:lnSpc>
+              <a:spcBef>
+                <a:spcPts val="500"/>
+              </a:spcBef>
+              <a:buFont typeface="Arial" panose="020B0604020202020204" pitchFamily="34" charset="0"/>
+              <a:buChar char="•"/>
+              <a:defRPr sz="1800" kern="1200">
+                <a:solidFill>
+                  <a:schemeClr val="tx1"/>
+                </a:solidFill>
+                <a:latin typeface="+mn-lt"/>
+                <a:ea typeface="+mn-ea"/>
+                <a:cs typeface="+mn-cs"/>
+              </a:defRPr>
+            </a:lvl5pPr>
+            <a:lvl6pPr marL="2514600" indent="-228600" algn="l" defTabSz="914400" rtl="0" eaLnBrk="1" latinLnBrk="0" hangingPunct="1">
+              <a:lnSpc>
+                <a:spcPct val="90000"/>
+              </a:lnSpc>
+              <a:spcBef>
+                <a:spcPts val="500"/>
+              </a:spcBef>
+              <a:buFont typeface="Arial" panose="020B0604020202020204" pitchFamily="34" charset="0"/>
+              <a:buChar char="•"/>
+              <a:defRPr sz="1800" kern="1200">
+                <a:solidFill>
+                  <a:schemeClr val="tx1"/>
+                </a:solidFill>
+                <a:latin typeface="+mn-lt"/>
+                <a:ea typeface="+mn-ea"/>
+                <a:cs typeface="+mn-cs"/>
+              </a:defRPr>
+            </a:lvl6pPr>
+            <a:lvl7pPr marL="2971800" indent="-228600" algn="l" defTabSz="914400" rtl="0" eaLnBrk="1" latinLnBrk="0" hangingPunct="1">
+              <a:lnSpc>
+                <a:spcPct val="90000"/>
+              </a:lnSpc>
+              <a:spcBef>
+                <a:spcPts val="500"/>
+              </a:spcBef>
+              <a:buFont typeface="Arial" panose="020B0604020202020204" pitchFamily="34" charset="0"/>
+              <a:buChar char="•"/>
+              <a:defRPr sz="1800" kern="1200">
+                <a:solidFill>
+                  <a:schemeClr val="tx1"/>
+                </a:solidFill>
+                <a:latin typeface="+mn-lt"/>
+                <a:ea typeface="+mn-ea"/>
+                <a:cs typeface="+mn-cs"/>
+              </a:defRPr>
+            </a:lvl7pPr>
+            <a:lvl8pPr marL="3429000" indent="-228600" algn="l" defTabSz="914400" rtl="0" eaLnBrk="1" latinLnBrk="0" hangingPunct="1">
+              <a:lnSpc>
+                <a:spcPct val="90000"/>
+              </a:lnSpc>
+              <a:spcBef>
+                <a:spcPts val="500"/>
+              </a:spcBef>
+              <a:buFont typeface="Arial" panose="020B0604020202020204" pitchFamily="34" charset="0"/>
+              <a:buChar char="•"/>
+              <a:defRPr sz="1800" kern="1200">
+                <a:solidFill>
+                  <a:schemeClr val="tx1"/>
+                </a:solidFill>
+                <a:latin typeface="+mn-lt"/>
+                <a:ea typeface="+mn-ea"/>
+                <a:cs typeface="+mn-cs"/>
+              </a:defRPr>
+            </a:lvl8pPr>
+            <a:lvl9pPr marL="3886200" indent="-228600" algn="l" defTabSz="914400" rtl="0" eaLnBrk="1" latinLnBrk="0" hangingPunct="1">
+              <a:lnSpc>
+                <a:spcPct val="90000"/>
+              </a:lnSpc>
+              <a:spcBef>
+                <a:spcPts val="500"/>
+              </a:spcBef>
+              <a:buFont typeface="Arial" panose="020B0604020202020204" pitchFamily="34" charset="0"/>
+              <a:buChar char="•"/>
+              <a:defRPr sz="1800" kern="1200">
+                <a:solidFill>
+                  <a:schemeClr val="tx1"/>
+                </a:solidFill>
+                <a:latin typeface="+mn-lt"/>
+                <a:ea typeface="+mn-ea"/>
+                <a:cs typeface="+mn-cs"/>
+              </a:defRPr>
+            </a:lvl9pPr>
+          </a:lstStyle>
+          <a:p>
+            <a:pPr marL="0" indent="0" algn="ctr">
+              <a:buNone/>
+            </a:pPr>
+            <a:r>
+              <a:rPr lang="es-ES" sz="2200" b="1" dirty="0"/>
+              <a:t>Consulta de horarios de partida y llegada: </a:t>
+            </a:r>
+            <a:r>
+              <a:rPr lang="es-ES" sz="2200" dirty="0"/>
+              <a:t>El usuario administrador debe poder visualizar el horario de partida y llegada de cada tren.</a:t>
+            </a:r>
+          </a:p>
+        </p:txBody>
+      </p:sp>
+      <p:sp>
+        <p:nvSpPr>
+          <p:cNvPr id="14" name="Marcador de contenido 2"/>
+          <p:cNvSpPr txBox="1">
+            <a:spLocks/>
+          </p:cNvSpPr>
+          <p:nvPr/>
+        </p:nvSpPr>
+        <p:spPr>
+          <a:xfrm>
+            <a:off x="641929" y="4918660"/>
+            <a:ext cx="4401127" cy="396730"/>
+          </a:xfrm>
+          <a:prstGeom prst="rect">
+            <a:avLst/>
+          </a:prstGeom>
+        </p:spPr>
+        <p:txBody>
+          <a:bodyPr vert="horz" lIns="91440" tIns="45720" rIns="91440" bIns="45720" rtlCol="0">
+            <a:noAutofit/>
+          </a:bodyPr>
+          <a:lstStyle>
+            <a:lvl1pPr marL="228600" indent="-228600" algn="l" defTabSz="914400" rtl="0" eaLnBrk="1" latinLnBrk="0" hangingPunct="1">
+              <a:lnSpc>
+                <a:spcPct val="90000"/>
+              </a:lnSpc>
+              <a:spcBef>
+                <a:spcPts val="1000"/>
+              </a:spcBef>
+              <a:buFont typeface="Arial" panose="020B0604020202020204" pitchFamily="34" charset="0"/>
+              <a:buChar char="•"/>
+              <a:defRPr sz="2800" kern="1200">
+                <a:solidFill>
+                  <a:schemeClr val="tx1"/>
+                </a:solidFill>
+                <a:latin typeface="+mn-lt"/>
+                <a:ea typeface="+mn-ea"/>
+                <a:cs typeface="+mn-cs"/>
+              </a:defRPr>
+            </a:lvl1pPr>
+            <a:lvl2pPr marL="685800" indent="-228600" algn="l" defTabSz="914400" rtl="0" eaLnBrk="1" latinLnBrk="0" hangingPunct="1">
+              <a:lnSpc>
+                <a:spcPct val="90000"/>
+              </a:lnSpc>
+              <a:spcBef>
+                <a:spcPts val="500"/>
+              </a:spcBef>
+              <a:buFont typeface="Arial" panose="020B0604020202020204" pitchFamily="34" charset="0"/>
+              <a:buChar char="•"/>
+              <a:defRPr sz="2400" kern="1200">
+                <a:solidFill>
+                  <a:schemeClr val="tx1"/>
+                </a:solidFill>
+                <a:latin typeface="+mn-lt"/>
+                <a:ea typeface="+mn-ea"/>
+                <a:cs typeface="+mn-cs"/>
+              </a:defRPr>
+            </a:lvl2pPr>
+            <a:lvl3pPr marL="1143000" indent="-228600" algn="l" defTabSz="914400" rtl="0" eaLnBrk="1" latinLnBrk="0" hangingPunct="1">
+              <a:lnSpc>
+                <a:spcPct val="90000"/>
+              </a:lnSpc>
+              <a:spcBef>
+                <a:spcPts val="500"/>
+              </a:spcBef>
+              <a:buFont typeface="Arial" panose="020B0604020202020204" pitchFamily="34" charset="0"/>
+              <a:buChar char="•"/>
+              <a:defRPr sz="2000" kern="1200">
+                <a:solidFill>
+                  <a:schemeClr val="tx1"/>
+                </a:solidFill>
+                <a:latin typeface="+mn-lt"/>
+                <a:ea typeface="+mn-ea"/>
+                <a:cs typeface="+mn-cs"/>
+              </a:defRPr>
+            </a:lvl3pPr>
+            <a:lvl4pPr marL="1600200" indent="-228600" algn="l" defTabSz="914400" rtl="0" eaLnBrk="1" latinLnBrk="0" hangingPunct="1">
+              <a:lnSpc>
+                <a:spcPct val="90000"/>
+              </a:lnSpc>
+              <a:spcBef>
+                <a:spcPts val="500"/>
+              </a:spcBef>
+              <a:buFont typeface="Arial" panose="020B0604020202020204" pitchFamily="34" charset="0"/>
+              <a:buChar char="•"/>
+              <a:defRPr sz="1800" kern="1200">
+                <a:solidFill>
+                  <a:schemeClr val="tx1"/>
+                </a:solidFill>
+                <a:latin typeface="+mn-lt"/>
+                <a:ea typeface="+mn-ea"/>
+                <a:cs typeface="+mn-cs"/>
+              </a:defRPr>
+            </a:lvl4pPr>
+            <a:lvl5pPr marL="2057400" indent="-228600" algn="l" defTabSz="914400" rtl="0" eaLnBrk="1" latinLnBrk="0" hangingPunct="1">
+              <a:lnSpc>
+                <a:spcPct val="90000"/>
+              </a:lnSpc>
+              <a:spcBef>
+                <a:spcPts val="500"/>
+              </a:spcBef>
+              <a:buFont typeface="Arial" panose="020B0604020202020204" pitchFamily="34" charset="0"/>
+              <a:buChar char="•"/>
+              <a:defRPr sz="1800" kern="1200">
+                <a:solidFill>
+                  <a:schemeClr val="tx1"/>
+                </a:solidFill>
+                <a:latin typeface="+mn-lt"/>
+                <a:ea typeface="+mn-ea"/>
+                <a:cs typeface="+mn-cs"/>
+              </a:defRPr>
+            </a:lvl5pPr>
+            <a:lvl6pPr marL="2514600" indent="-228600" algn="l" defTabSz="914400" rtl="0" eaLnBrk="1" latinLnBrk="0" hangingPunct="1">
+              <a:lnSpc>
+                <a:spcPct val="90000"/>
+              </a:lnSpc>
+              <a:spcBef>
+                <a:spcPts val="500"/>
+              </a:spcBef>
+              <a:buFont typeface="Arial" panose="020B0604020202020204" pitchFamily="34" charset="0"/>
+              <a:buChar char="•"/>
+              <a:defRPr sz="1800" kern="1200">
+                <a:solidFill>
+                  <a:schemeClr val="tx1"/>
+                </a:solidFill>
+                <a:latin typeface="+mn-lt"/>
+                <a:ea typeface="+mn-ea"/>
+                <a:cs typeface="+mn-cs"/>
+              </a:defRPr>
+            </a:lvl6pPr>
+            <a:lvl7pPr marL="2971800" indent="-228600" algn="l" defTabSz="914400" rtl="0" eaLnBrk="1" latinLnBrk="0" hangingPunct="1">
+              <a:lnSpc>
+                <a:spcPct val="90000"/>
+              </a:lnSpc>
+              <a:spcBef>
+                <a:spcPts val="500"/>
+              </a:spcBef>
+              <a:buFont typeface="Arial" panose="020B0604020202020204" pitchFamily="34" charset="0"/>
+              <a:buChar char="•"/>
+              <a:defRPr sz="1800" kern="1200">
+                <a:solidFill>
+                  <a:schemeClr val="tx1"/>
+                </a:solidFill>
+                <a:latin typeface="+mn-lt"/>
+                <a:ea typeface="+mn-ea"/>
+                <a:cs typeface="+mn-cs"/>
+              </a:defRPr>
+            </a:lvl7pPr>
+            <a:lvl8pPr marL="3429000" indent="-228600" algn="l" defTabSz="914400" rtl="0" eaLnBrk="1" latinLnBrk="0" hangingPunct="1">
+              <a:lnSpc>
+                <a:spcPct val="90000"/>
+              </a:lnSpc>
+              <a:spcBef>
+                <a:spcPts val="500"/>
+              </a:spcBef>
+              <a:buFont typeface="Arial" panose="020B0604020202020204" pitchFamily="34" charset="0"/>
+              <a:buChar char="•"/>
+              <a:defRPr sz="1800" kern="1200">
+                <a:solidFill>
+                  <a:schemeClr val="tx1"/>
+                </a:solidFill>
+                <a:latin typeface="+mn-lt"/>
+                <a:ea typeface="+mn-ea"/>
+                <a:cs typeface="+mn-cs"/>
+              </a:defRPr>
+            </a:lvl8pPr>
+            <a:lvl9pPr marL="3886200" indent="-228600" algn="l" defTabSz="914400" rtl="0" eaLnBrk="1" latinLnBrk="0" hangingPunct="1">
+              <a:lnSpc>
+                <a:spcPct val="90000"/>
+              </a:lnSpc>
+              <a:spcBef>
+                <a:spcPts val="500"/>
+              </a:spcBef>
+              <a:buFont typeface="Arial" panose="020B0604020202020204" pitchFamily="34" charset="0"/>
+              <a:buChar char="•"/>
+              <a:defRPr sz="1800" kern="1200">
+                <a:solidFill>
+                  <a:schemeClr val="tx1"/>
+                </a:solidFill>
+                <a:latin typeface="+mn-lt"/>
+                <a:ea typeface="+mn-ea"/>
+                <a:cs typeface="+mn-cs"/>
+              </a:defRPr>
+            </a:lvl9pPr>
+          </a:lstStyle>
+          <a:p>
+            <a:pPr marL="0" indent="0" algn="ctr">
+              <a:buNone/>
+            </a:pPr>
+            <a:r>
+              <a:rPr lang="es-PE" sz="2000" b="1" dirty="0" smtClean="0">
+                <a:solidFill>
+                  <a:schemeClr val="bg1"/>
+                </a:solidFill>
+              </a:rPr>
+              <a:t>Función de seguridad</a:t>
+            </a:r>
+            <a:endParaRPr lang="es-ES" sz="1600" dirty="0">
+              <a:solidFill>
+                <a:schemeClr val="bg1"/>
+              </a:solidFill>
+            </a:endParaRPr>
+          </a:p>
+        </p:txBody>
+      </p:sp>
+    </p:spTree>
+    <p:extLst>
+      <p:ext uri="{BB962C8B-B14F-4D97-AF65-F5344CB8AC3E}">
+        <p14:creationId xmlns:p14="http://schemas.microsoft.com/office/powerpoint/2010/main" val="3222981627"/>
+      </p:ext>
+    </p:extLst>
+  </p:cSld>
+  <p:clrMapOvr>
+    <a:masterClrMapping/>
+  </p:clrMapOvr>
+  <p:timing>
+    <p:tnLst>
+      <p:par>
+        <p:cTn id="1" dur="indefinite" restart="never" nodeType="tmRoot"/>
+      </p:par>
+    </p:tnLst>
+  </p:timing>
+</p:sld>
+</file>
+
+<file path=ppt/slides/slide5.xml><?xml version="1.0" encoding="utf-8"?>
+<p:sld xmlns:a="http://schemas.openxmlformats.org/drawingml/2006/main" xmlns:r="http://schemas.openxmlformats.org/officeDocument/2006/relationships" xmlns:p="http://schemas.openxmlformats.org/presentationml/2006/main">
+  <p:cSld>
+    <p:spTree>
+      <p:nvGrpSpPr>
+        <p:cNvPr id="1" name=""/>
+        <p:cNvGrpSpPr/>
+        <p:nvPr/>
+      </p:nvGrpSpPr>
+      <p:grpSpPr>
+        <a:xfrm>
+          <a:off x="0" y="0"/>
+          <a:ext cx="0" cy="0"/>
+          <a:chOff x="0" y="0"/>
+          <a:chExt cx="0" cy="0"/>
+        </a:xfrm>
+      </p:grpSpPr>
+      <p:sp>
+        <p:nvSpPr>
+          <p:cNvPr id="2" name="Título 1"/>
+          <p:cNvSpPr>
+            <a:spLocks noGrp="1"/>
+          </p:cNvSpPr>
+          <p:nvPr>
+            <p:ph type="title"/>
+          </p:nvPr>
+        </p:nvSpPr>
+        <p:spPr>
+          <a:xfrm>
+            <a:off x="4107873" y="-189057"/>
+            <a:ext cx="10515600" cy="1325563"/>
+          </a:xfrm>
+        </p:spPr>
+        <p:txBody>
           <a:bodyPr/>
           <a:lstStyle/>
           <a:p>
-            <a:endParaRPr lang="es-ES"/>
-          </a:p>
-        </p:txBody>
-      </p:sp>
-      <p:sp>
-        <p:nvSpPr>
-          <p:cNvPr id="3" name="Subtítulo 2"/>
-          <p:cNvSpPr>
-            <a:spLocks noGrp="1"/>
-          </p:cNvSpPr>
-          <p:nvPr>
-            <p:ph type="subTitle" idx="1"/>
+            <a:r>
+              <a:rPr lang="es-PE" b="1" dirty="0" smtClean="0">
+                <a:solidFill>
+                  <a:srgbClr val="C00000"/>
+                </a:solidFill>
+              </a:rPr>
+              <a:t>DEMO</a:t>
+            </a:r>
+            <a:endParaRPr lang="es-ES" b="1" dirty="0">
+              <a:solidFill>
+                <a:srgbClr val="C00000"/>
+              </a:solidFill>
+            </a:endParaRPr>
+          </a:p>
+        </p:txBody>
+      </p:sp>
+      <p:pic>
+        <p:nvPicPr>
+          <p:cNvPr id="4" name="Imagen 3"/>
+          <p:cNvPicPr>
+            <a:picLocks noChangeAspect="1"/>
+          </p:cNvPicPr>
+          <p:nvPr/>
+        </p:nvPicPr>
+        <p:blipFill>
+          <a:blip r:embed="rId2"/>
+          <a:stretch>
+            <a:fillRect/>
+          </a:stretch>
+        </p:blipFill>
+        <p:spPr>
+          <a:xfrm>
+            <a:off x="591126" y="673774"/>
+            <a:ext cx="10612583" cy="5537682"/>
+          </a:xfrm>
+          <a:prstGeom prst="rect">
+            <a:avLst/>
+          </a:prstGeom>
+        </p:spPr>
+      </p:pic>
+      <p:cxnSp>
+        <p:nvCxnSpPr>
+          <p:cNvPr id="5" name="Conector recto de flecha 4">
+            <a:extLst>
+              <a:ext uri="{FF2B5EF4-FFF2-40B4-BE49-F238E27FC236}">
+                <a16:creationId xmlns:a16="http://schemas.microsoft.com/office/drawing/2014/main" xmlns="" id="{C26B9D47-B88F-4F53-AC52-02F54B951DD2}"/>
+              </a:ext>
+            </a:extLst>
+          </p:cNvPr>
+          <p:cNvCxnSpPr>
+            <a:cxnSpLocks/>
+            <a:endCxn id="6" idx="0"/>
+          </p:cNvCxnSpPr>
+          <p:nvPr/>
+        </p:nvCxnSpPr>
+        <p:spPr>
+          <a:xfrm>
+            <a:off x="8075360" y="1867452"/>
+            <a:ext cx="520148" cy="1278835"/>
+          </a:xfrm>
+          <a:prstGeom prst="straightConnector1">
+            <a:avLst/>
+          </a:prstGeom>
+          <a:ln>
+            <a:solidFill>
+              <a:srgbClr val="FF0000"/>
+            </a:solidFill>
+            <a:tailEnd type="triangle"/>
+          </a:ln>
+        </p:spPr>
+        <p:style>
+          <a:lnRef idx="3">
+            <a:schemeClr val="accent2"/>
+          </a:lnRef>
+          <a:fillRef idx="0">
+            <a:schemeClr val="accent2"/>
+          </a:fillRef>
+          <a:effectRef idx="2">
+            <a:schemeClr val="accent2"/>
+          </a:effectRef>
+          <a:fontRef idx="minor">
+            <a:schemeClr val="tx1"/>
+          </a:fontRef>
+        </p:style>
+      </p:cxnSp>
+      <p:sp>
+        <p:nvSpPr>
+          <p:cNvPr id="6" name="Rectángulo 5">
+            <a:extLst>
+              <a:ext uri="{FF2B5EF4-FFF2-40B4-BE49-F238E27FC236}">
+                <a16:creationId xmlns:a16="http://schemas.microsoft.com/office/drawing/2014/main" xmlns="" id="{4CD2051E-4555-4AD3-958B-B22F88A17FB8}"/>
+              </a:ext>
+            </a:extLst>
+          </p:cNvPr>
+          <p:cNvSpPr/>
+          <p:nvPr/>
+        </p:nvSpPr>
+        <p:spPr>
+          <a:xfrm>
+            <a:off x="8138308" y="3146287"/>
+            <a:ext cx="914400" cy="433283"/>
+          </a:xfrm>
+          <a:prstGeom prst="rect">
+            <a:avLst/>
+          </a:prstGeom>
+          <a:solidFill>
+            <a:srgbClr val="FFFF00"/>
+          </a:solidFill>
+        </p:spPr>
+        <p:style>
+          <a:lnRef idx="2">
+            <a:schemeClr val="accent3"/>
+          </a:lnRef>
+          <a:fillRef idx="1">
+            <a:schemeClr val="lt1"/>
+          </a:fillRef>
+          <a:effectRef idx="0">
+            <a:schemeClr val="accent3"/>
+          </a:effectRef>
+          <a:fontRef idx="minor">
+            <a:schemeClr val="dk1"/>
+          </a:fontRef>
+        </p:style>
+        <p:txBody>
+          <a:bodyPr rtlCol="0" anchor="ctr"/>
+          <a:lstStyle/>
+          <a:p>
+            <a:pPr algn="ctr"/>
+            <a:r>
+              <a:rPr lang="es-PE" b="1" dirty="0"/>
+              <a:t>Vistas </a:t>
+            </a:r>
+          </a:p>
+        </p:txBody>
+      </p:sp>
+      <p:sp>
+        <p:nvSpPr>
+          <p:cNvPr id="7" name="Rectángulo 6">
+            <a:extLst>
+              <a:ext uri="{FF2B5EF4-FFF2-40B4-BE49-F238E27FC236}">
+                <a16:creationId xmlns:a16="http://schemas.microsoft.com/office/drawing/2014/main" xmlns="" id="{F8CBCAD6-0C6E-477D-9578-C5109764AE1F}"/>
+              </a:ext>
+            </a:extLst>
+          </p:cNvPr>
+          <p:cNvSpPr/>
+          <p:nvPr/>
+        </p:nvSpPr>
+        <p:spPr>
+          <a:xfrm>
+            <a:off x="7783812" y="5680513"/>
+            <a:ext cx="1775792" cy="498390"/>
+          </a:xfrm>
+          <a:prstGeom prst="rect">
+            <a:avLst/>
+          </a:prstGeom>
+          <a:solidFill>
+            <a:srgbClr val="FFFF00"/>
+          </a:solidFill>
+        </p:spPr>
+        <p:style>
+          <a:lnRef idx="2">
+            <a:schemeClr val="accent3"/>
+          </a:lnRef>
+          <a:fillRef idx="1">
+            <a:schemeClr val="lt1"/>
+          </a:fillRef>
+          <a:effectRef idx="0">
+            <a:schemeClr val="accent3"/>
+          </a:effectRef>
+          <a:fontRef idx="minor">
+            <a:schemeClr val="dk1"/>
+          </a:fontRef>
+        </p:style>
+        <p:txBody>
+          <a:bodyPr rtlCol="0" anchor="ctr"/>
+          <a:lstStyle/>
+          <a:p>
+            <a:pPr algn="ctr"/>
+            <a:r>
+              <a:rPr lang="es-PE" b="1" dirty="0" err="1"/>
+              <a:t>footer</a:t>
+            </a:r>
+            <a:endParaRPr lang="es-PE" b="1" dirty="0"/>
+          </a:p>
+        </p:txBody>
+      </p:sp>
+      <p:sp>
+        <p:nvSpPr>
+          <p:cNvPr id="8" name="Rectángulo 7">
+            <a:extLst>
+              <a:ext uri="{FF2B5EF4-FFF2-40B4-BE49-F238E27FC236}">
+                <a16:creationId xmlns:a16="http://schemas.microsoft.com/office/drawing/2014/main" xmlns="" id="{3C207052-A985-4B17-828A-41874475EA50}"/>
+              </a:ext>
+            </a:extLst>
+          </p:cNvPr>
+          <p:cNvSpPr/>
+          <p:nvPr/>
+        </p:nvSpPr>
+        <p:spPr>
+          <a:xfrm>
+            <a:off x="591126" y="1136506"/>
+            <a:ext cx="914400" cy="410818"/>
+          </a:xfrm>
+          <a:prstGeom prst="rect">
+            <a:avLst/>
+          </a:prstGeom>
+          <a:solidFill>
+            <a:srgbClr val="FFFF00"/>
+          </a:solidFill>
+        </p:spPr>
+        <p:style>
+          <a:lnRef idx="2">
+            <a:schemeClr val="accent3"/>
+          </a:lnRef>
+          <a:fillRef idx="1">
+            <a:schemeClr val="lt1"/>
+          </a:fillRef>
+          <a:effectRef idx="0">
+            <a:schemeClr val="accent3"/>
+          </a:effectRef>
+          <a:fontRef idx="minor">
+            <a:schemeClr val="dk1"/>
+          </a:fontRef>
+        </p:style>
+        <p:txBody>
+          <a:bodyPr rtlCol="0" anchor="ctr"/>
+          <a:lstStyle/>
+          <a:p>
+            <a:pPr algn="ctr"/>
+            <a:r>
+              <a:rPr lang="es-PE" sz="1400" b="1" dirty="0" err="1"/>
+              <a:t>header</a:t>
+            </a:r>
+            <a:endParaRPr lang="es-PE" sz="1400" b="1" dirty="0"/>
+          </a:p>
+        </p:txBody>
+      </p:sp>
+    </p:spTree>
+    <p:extLst>
+      <p:ext uri="{BB962C8B-B14F-4D97-AF65-F5344CB8AC3E}">
+        <p14:creationId xmlns:p14="http://schemas.microsoft.com/office/powerpoint/2010/main" val="3180144397"/>
+      </p:ext>
+    </p:extLst>
+  </p:cSld>
+  <p:clrMapOvr>
+    <a:masterClrMapping/>
+  </p:clrMapOvr>
+  <p:timing>
+    <p:tnLst>
+      <p:par>
+        <p:cTn id="1" dur="indefinite" restart="never" nodeType="tmRoot"/>
+      </p:par>
+    </p:tnLst>
+  </p:timing>
+</p:sld>
+</file>
+
+<file path=ppt/slides/slide6.xml><?xml version="1.0" encoding="utf-8"?>
+<p:sld xmlns:a="http://schemas.openxmlformats.org/drawingml/2006/main" xmlns:r="http://schemas.openxmlformats.org/officeDocument/2006/relationships" xmlns:p="http://schemas.openxmlformats.org/presentationml/2006/main">
+  <p:cSld>
+    <p:spTree>
+      <p:nvGrpSpPr>
+        <p:cNvPr id="1" name=""/>
+        <p:cNvGrpSpPr/>
+        <p:nvPr/>
+      </p:nvGrpSpPr>
+      <p:grpSpPr>
+        <a:xfrm>
+          <a:off x="0" y="0"/>
+          <a:ext cx="0" cy="0"/>
+          <a:chOff x="0" y="0"/>
+          <a:chExt cx="0" cy="0"/>
+        </a:xfrm>
+      </p:grpSpPr>
+      <p:sp>
+        <p:nvSpPr>
+          <p:cNvPr id="2" name="Título 1"/>
+          <p:cNvSpPr>
+            <a:spLocks noGrp="1"/>
+          </p:cNvSpPr>
+          <p:nvPr>
+            <p:ph type="title"/>
+          </p:nvPr>
+        </p:nvSpPr>
+        <p:spPr>
+          <a:xfrm>
+            <a:off x="3553691" y="0"/>
+            <a:ext cx="10515600" cy="1325563"/>
+          </a:xfrm>
+        </p:spPr>
+        <p:txBody>
+          <a:bodyPr/>
+          <a:lstStyle/>
+          <a:p>
+            <a:r>
+              <a:rPr lang="es-PE" b="1" dirty="0" smtClean="0">
+                <a:solidFill>
+                  <a:srgbClr val="C00000"/>
+                </a:solidFill>
+              </a:rPr>
+              <a:t>DEMO</a:t>
+            </a:r>
+            <a:endParaRPr lang="es-ES" b="1" dirty="0">
+              <a:solidFill>
+                <a:srgbClr val="C00000"/>
+              </a:solidFill>
+            </a:endParaRPr>
+          </a:p>
+        </p:txBody>
+      </p:sp>
+      <p:pic>
+        <p:nvPicPr>
+          <p:cNvPr id="5" name="Imagen 4"/>
+          <p:cNvPicPr>
+            <a:picLocks noChangeAspect="1"/>
+          </p:cNvPicPr>
+          <p:nvPr/>
+        </p:nvPicPr>
+        <p:blipFill>
+          <a:blip r:embed="rId2"/>
+          <a:stretch>
+            <a:fillRect/>
+          </a:stretch>
+        </p:blipFill>
+        <p:spPr>
+          <a:xfrm>
+            <a:off x="584872" y="1057542"/>
+            <a:ext cx="2538639" cy="5098493"/>
+          </a:xfrm>
+          <a:prstGeom prst="rect">
+            <a:avLst/>
+          </a:prstGeom>
+        </p:spPr>
+      </p:pic>
+      <p:pic>
+        <p:nvPicPr>
+          <p:cNvPr id="6" name="Imagen 5"/>
+          <p:cNvPicPr>
+            <a:picLocks noChangeAspect="1"/>
+          </p:cNvPicPr>
+          <p:nvPr/>
+        </p:nvPicPr>
+        <p:blipFill>
+          <a:blip r:embed="rId3"/>
+          <a:stretch>
+            <a:fillRect/>
+          </a:stretch>
+        </p:blipFill>
+        <p:spPr>
+          <a:xfrm>
+            <a:off x="3346023" y="1057542"/>
+            <a:ext cx="2585051" cy="5098493"/>
+          </a:xfrm>
+          <a:prstGeom prst="rect">
+            <a:avLst/>
+          </a:prstGeom>
+        </p:spPr>
+      </p:pic>
+      <p:pic>
+        <p:nvPicPr>
+          <p:cNvPr id="7" name="Imagen 6"/>
+          <p:cNvPicPr>
+            <a:picLocks noChangeAspect="1"/>
+          </p:cNvPicPr>
+          <p:nvPr/>
+        </p:nvPicPr>
+        <p:blipFill>
+          <a:blip r:embed="rId4"/>
+          <a:stretch>
+            <a:fillRect/>
+          </a:stretch>
+        </p:blipFill>
+        <p:spPr>
+          <a:xfrm>
+            <a:off x="6376097" y="1097024"/>
+            <a:ext cx="2534288" cy="5082813"/>
+          </a:xfrm>
+          <a:prstGeom prst="rect">
+            <a:avLst/>
+          </a:prstGeom>
+        </p:spPr>
+      </p:pic>
+      <p:pic>
+        <p:nvPicPr>
+          <p:cNvPr id="8" name="Imagen 7"/>
+          <p:cNvPicPr>
+            <a:picLocks noChangeAspect="1"/>
+          </p:cNvPicPr>
+          <p:nvPr/>
+        </p:nvPicPr>
+        <p:blipFill>
+          <a:blip r:embed="rId5"/>
+          <a:stretch>
+            <a:fillRect/>
+          </a:stretch>
+        </p:blipFill>
+        <p:spPr>
+          <a:xfrm>
+            <a:off x="9212406" y="1057542"/>
+            <a:ext cx="2537862" cy="5082813"/>
+          </a:xfrm>
+          <a:prstGeom prst="rect">
+            <a:avLst/>
+          </a:prstGeom>
+        </p:spPr>
+      </p:pic>
+    </p:spTree>
+    <p:extLst>
+      <p:ext uri="{BB962C8B-B14F-4D97-AF65-F5344CB8AC3E}">
+        <p14:creationId xmlns:p14="http://schemas.microsoft.com/office/powerpoint/2010/main" val="235248119"/>
+      </p:ext>
+    </p:extLst>
+  </p:cSld>
+  <p:clrMapOvr>
+    <a:masterClrMapping/>
+  </p:clrMapOvr>
+  <p:timing>
+    <p:tnLst>
+      <p:par>
+        <p:cTn id="1" dur="indefinite" restart="never" nodeType="tmRoot"/>
+      </p:par>
+    </p:tnLst>
+  </p:timing>
+</p:sld>
+</file>
+
+<file path=ppt/slides/slide7.xml><?xml version="1.0" encoding="utf-8"?>
+<p:sld xmlns:a="http://schemas.openxmlformats.org/drawingml/2006/main" xmlns:r="http://schemas.openxmlformats.org/officeDocument/2006/relationships" xmlns:p="http://schemas.openxmlformats.org/presentationml/2006/main">
+  <p:cSld>
+    <p:spTree>
+      <p:nvGrpSpPr>
+        <p:cNvPr id="1" name=""/>
+        <p:cNvGrpSpPr/>
+        <p:nvPr/>
+      </p:nvGrpSpPr>
+      <p:grpSpPr>
+        <a:xfrm>
+          <a:off x="0" y="0"/>
+          <a:ext cx="0" cy="0"/>
+          <a:chOff x="0" y="0"/>
+          <a:chExt cx="0" cy="0"/>
+        </a:xfrm>
+      </p:grpSpPr>
+      <p:sp>
+        <p:nvSpPr>
+          <p:cNvPr id="3" name="Marcador de contenido 2"/>
+          <p:cNvSpPr>
+            <a:spLocks noGrp="1"/>
+          </p:cNvSpPr>
+          <p:nvPr>
+            <p:ph idx="1"/>
           </p:nvPr>
         </p:nvSpPr>
         <p:spPr/>
         <p:txBody>
-          <a:bodyPr/>
-          <a:lstStyle/>
-          <a:p>
-            <a:endParaRPr lang="es-ES"/>
+          <a:bodyPr>
+            <a:normAutofit fontScale="47500" lnSpcReduction="20000"/>
+          </a:bodyPr>
+          <a:lstStyle/>
+          <a:p>
+            <a:pPr algn="just">
+              <a:lnSpc>
+                <a:spcPct val="150000"/>
+              </a:lnSpc>
+            </a:pPr>
+            <a:r>
+              <a:rPr lang="es-PE" dirty="0" smtClean="0">
+                <a:latin typeface="Arial" panose="020B0604020202020204" pitchFamily="34" charset="0"/>
+                <a:cs typeface="Arial" panose="020B0604020202020204" pitchFamily="34" charset="0"/>
+              </a:rPr>
+              <a:t>El </a:t>
+            </a:r>
+            <a:r>
+              <a:rPr lang="es-PE" dirty="0">
+                <a:latin typeface="Arial" panose="020B0604020202020204" pitchFamily="34" charset="0"/>
+                <a:cs typeface="Arial" panose="020B0604020202020204" pitchFamily="34" charset="0"/>
+              </a:rPr>
+              <a:t>proyecto será un </a:t>
+            </a:r>
+            <a:r>
+              <a:rPr lang="es-PE" dirty="0" err="1">
+                <a:latin typeface="Arial" panose="020B0604020202020204" pitchFamily="34" charset="0"/>
+                <a:cs typeface="Arial" panose="020B0604020202020204" pitchFamily="34" charset="0"/>
+              </a:rPr>
+              <a:t>Dynamic</a:t>
+            </a:r>
+            <a:r>
+              <a:rPr lang="es-PE" dirty="0">
+                <a:latin typeface="Arial" panose="020B0604020202020204" pitchFamily="34" charset="0"/>
+                <a:cs typeface="Arial" panose="020B0604020202020204" pitchFamily="34" charset="0"/>
+              </a:rPr>
+              <a:t> web </a:t>
+            </a:r>
+            <a:r>
+              <a:rPr lang="es-PE" dirty="0" err="1">
+                <a:latin typeface="Arial" panose="020B0604020202020204" pitchFamily="34" charset="0"/>
+                <a:cs typeface="Arial" panose="020B0604020202020204" pitchFamily="34" charset="0"/>
+              </a:rPr>
+              <a:t>project</a:t>
+            </a:r>
+            <a:r>
+              <a:rPr lang="es-PE" dirty="0">
+                <a:latin typeface="Arial" panose="020B0604020202020204" pitchFamily="34" charset="0"/>
+                <a:cs typeface="Arial" panose="020B0604020202020204" pitchFamily="34" charset="0"/>
+              </a:rPr>
+              <a:t> implementado con la arquitectura MVC(Modelo Vista Controlador), las herramientas que utilizaremos para realizar dicha tarea son Eclipse, el servidor Apache </a:t>
+            </a:r>
+            <a:r>
+              <a:rPr lang="es-PE" dirty="0" err="1">
+                <a:latin typeface="Arial" panose="020B0604020202020204" pitchFamily="34" charset="0"/>
+                <a:cs typeface="Arial" panose="020B0604020202020204" pitchFamily="34" charset="0"/>
+              </a:rPr>
+              <a:t>Tomcat</a:t>
+            </a:r>
+            <a:r>
+              <a:rPr lang="es-PE" dirty="0">
+                <a:latin typeface="Arial" panose="020B0604020202020204" pitchFamily="34" charset="0"/>
+                <a:cs typeface="Arial" panose="020B0604020202020204" pitchFamily="34" charset="0"/>
+              </a:rPr>
+              <a:t>, XAMPP y el sistema de manejo de base de datos que utilizaremos es el MYSQL. Los contenidos que tendrá el trabajo son las siguientes:</a:t>
+            </a:r>
+          </a:p>
+          <a:p>
+            <a:pPr algn="just">
+              <a:lnSpc>
+                <a:spcPct val="150000"/>
+              </a:lnSpc>
+              <a:buFont typeface="Wingdings" panose="05000000000000000000" pitchFamily="2" charset="2"/>
+              <a:buChar char="Ø"/>
+            </a:pPr>
+            <a:r>
+              <a:rPr lang="es-PE" dirty="0">
+                <a:latin typeface="Arial" panose="020B0604020202020204" pitchFamily="34" charset="0"/>
+                <a:cs typeface="Arial" panose="020B0604020202020204" pitchFamily="34" charset="0"/>
+              </a:rPr>
+              <a:t>En un paquete de nombre </a:t>
+            </a:r>
+            <a:r>
+              <a:rPr lang="es-PE" dirty="0" err="1">
+                <a:latin typeface="Arial" panose="020B0604020202020204" pitchFamily="34" charset="0"/>
+                <a:cs typeface="Arial" panose="020B0604020202020204" pitchFamily="34" charset="0"/>
+              </a:rPr>
+              <a:t>WebContent</a:t>
+            </a:r>
+            <a:r>
+              <a:rPr lang="es-PE" dirty="0">
+                <a:latin typeface="Arial" panose="020B0604020202020204" pitchFamily="34" charset="0"/>
+                <a:cs typeface="Arial" panose="020B0604020202020204" pitchFamily="34" charset="0"/>
+              </a:rPr>
+              <a:t> estarán todas las vistas </a:t>
+            </a:r>
+            <a:r>
+              <a:rPr lang="es-PE" dirty="0" err="1">
+                <a:latin typeface="Arial" panose="020B0604020202020204" pitchFamily="34" charset="0"/>
+                <a:cs typeface="Arial" panose="020B0604020202020204" pitchFamily="34" charset="0"/>
+              </a:rPr>
+              <a:t>jsp</a:t>
+            </a:r>
+            <a:r>
+              <a:rPr lang="es-PE" dirty="0">
+                <a:latin typeface="Arial" panose="020B0604020202020204" pitchFamily="34" charset="0"/>
+                <a:cs typeface="Arial" panose="020B0604020202020204" pitchFamily="34" charset="0"/>
+              </a:rPr>
+              <a:t>(Formularios con código HTML y JavaScript). La cual serán las interfaces de los usuarios, con estilos CSS. Para que sea más presentable.</a:t>
+            </a:r>
+          </a:p>
+          <a:p>
+            <a:pPr algn="just">
+              <a:lnSpc>
+                <a:spcPct val="150000"/>
+              </a:lnSpc>
+              <a:buFont typeface="Wingdings" panose="05000000000000000000" pitchFamily="2" charset="2"/>
+              <a:buChar char="Ø"/>
+            </a:pPr>
+            <a:r>
+              <a:rPr lang="es-PE" dirty="0">
+                <a:latin typeface="Arial" panose="020B0604020202020204" pitchFamily="34" charset="0"/>
+                <a:cs typeface="Arial" panose="020B0604020202020204" pitchFamily="34" charset="0"/>
+              </a:rPr>
+              <a:t>En “java </a:t>
+            </a:r>
+            <a:r>
+              <a:rPr lang="es-PE" dirty="0" err="1">
+                <a:latin typeface="Arial" panose="020B0604020202020204" pitchFamily="34" charset="0"/>
+                <a:cs typeface="Arial" panose="020B0604020202020204" pitchFamily="34" charset="0"/>
+              </a:rPr>
+              <a:t>Resources</a:t>
+            </a:r>
+            <a:r>
+              <a:rPr lang="es-PE" dirty="0">
+                <a:latin typeface="Arial" panose="020B0604020202020204" pitchFamily="34" charset="0"/>
+                <a:cs typeface="Arial" panose="020B0604020202020204" pitchFamily="34" charset="0"/>
+              </a:rPr>
+              <a:t>” crearemos un paquete de nombre “</a:t>
+            </a:r>
+            <a:r>
+              <a:rPr lang="es-PE" dirty="0" err="1">
+                <a:latin typeface="Arial" panose="020B0604020202020204" pitchFamily="34" charset="0"/>
+                <a:cs typeface="Arial" panose="020B0604020202020204" pitchFamily="34" charset="0"/>
+              </a:rPr>
+              <a:t>Src</a:t>
+            </a:r>
+            <a:r>
+              <a:rPr lang="es-PE" dirty="0">
+                <a:latin typeface="Arial" panose="020B0604020202020204" pitchFamily="34" charset="0"/>
+                <a:cs typeface="Arial" panose="020B0604020202020204" pitchFamily="34" charset="0"/>
+              </a:rPr>
+              <a:t>” en la cual encontraremos el controlador la cual Responde a eventos y invoca peticiones al ‘Modelo’ como por ejemplo eliminar, actualizar y agregar. También encontraremos el Modelo la cual genera la lógica de negocio y las consultas que realizaremos. Por otro lado, encontramos a la entidad los cual representas los campos de la base de datos y cada uno de los atributos están con métodos </a:t>
+            </a:r>
+            <a:r>
+              <a:rPr lang="es-PE" dirty="0" err="1">
+                <a:latin typeface="Arial" panose="020B0604020202020204" pitchFamily="34" charset="0"/>
+                <a:cs typeface="Arial" panose="020B0604020202020204" pitchFamily="34" charset="0"/>
+              </a:rPr>
+              <a:t>get</a:t>
+            </a:r>
+            <a:r>
+              <a:rPr lang="es-PE" dirty="0">
+                <a:latin typeface="Arial" panose="020B0604020202020204" pitchFamily="34" charset="0"/>
+                <a:cs typeface="Arial" panose="020B0604020202020204" pitchFamily="34" charset="0"/>
+              </a:rPr>
+              <a:t> y set.</a:t>
+            </a:r>
+          </a:p>
+          <a:p>
+            <a:pPr algn="just">
+              <a:lnSpc>
+                <a:spcPct val="150000"/>
+              </a:lnSpc>
+              <a:buFont typeface="Wingdings" panose="05000000000000000000" pitchFamily="2" charset="2"/>
+              <a:buChar char="Ø"/>
+            </a:pPr>
+            <a:r>
+              <a:rPr lang="es-PE" dirty="0">
+                <a:latin typeface="Arial" panose="020B0604020202020204" pitchFamily="34" charset="0"/>
+                <a:cs typeface="Arial" panose="020B0604020202020204" pitchFamily="34" charset="0"/>
+              </a:rPr>
+              <a:t>En el paquete Meta-</a:t>
+            </a:r>
+            <a:r>
+              <a:rPr lang="es-PE" dirty="0" err="1">
+                <a:latin typeface="Arial" panose="020B0604020202020204" pitchFamily="34" charset="0"/>
+                <a:cs typeface="Arial" panose="020B0604020202020204" pitchFamily="34" charset="0"/>
+              </a:rPr>
+              <a:t>inf</a:t>
+            </a:r>
+            <a:r>
+              <a:rPr lang="es-PE" dirty="0">
+                <a:latin typeface="Arial" panose="020B0604020202020204" pitchFamily="34" charset="0"/>
+                <a:cs typeface="Arial" panose="020B0604020202020204" pitchFamily="34" charset="0"/>
+              </a:rPr>
+              <a:t> crearemos un archivo XML para crear la conexión a la base de datos.</a:t>
+            </a:r>
+          </a:p>
+          <a:p>
+            <a:pPr algn="just">
+              <a:lnSpc>
+                <a:spcPct val="150000"/>
+              </a:lnSpc>
+              <a:buFont typeface="Wingdings" panose="05000000000000000000" pitchFamily="2" charset="2"/>
+              <a:buChar char="Ø"/>
+            </a:pPr>
+            <a:r>
+              <a:rPr lang="es-PE" dirty="0">
+                <a:latin typeface="Arial" panose="020B0604020202020204" pitchFamily="34" charset="0"/>
+                <a:cs typeface="Arial" panose="020B0604020202020204" pitchFamily="34" charset="0"/>
+              </a:rPr>
+              <a:t>En el MYSQL crearemos una base de datos con el comando créate </a:t>
+            </a:r>
+            <a:r>
+              <a:rPr lang="es-PE" dirty="0" err="1">
+                <a:latin typeface="Arial" panose="020B0604020202020204" pitchFamily="34" charset="0"/>
+                <a:cs typeface="Arial" panose="020B0604020202020204" pitchFamily="34" charset="0"/>
+              </a:rPr>
+              <a:t>database</a:t>
+            </a:r>
+            <a:r>
+              <a:rPr lang="es-PE" dirty="0">
+                <a:latin typeface="Arial" panose="020B0604020202020204" pitchFamily="34" charset="0"/>
+                <a:cs typeface="Arial" panose="020B0604020202020204" pitchFamily="34" charset="0"/>
+              </a:rPr>
+              <a:t> “el nombre”, luego crearemos los campos con la instrucción créate </a:t>
+            </a:r>
+            <a:r>
+              <a:rPr lang="es-PE" dirty="0" err="1">
+                <a:latin typeface="Arial" panose="020B0604020202020204" pitchFamily="34" charset="0"/>
+                <a:cs typeface="Arial" panose="020B0604020202020204" pitchFamily="34" charset="0"/>
+              </a:rPr>
+              <a:t>table</a:t>
+            </a:r>
+            <a:r>
+              <a:rPr lang="es-PE" dirty="0">
+                <a:latin typeface="Arial" panose="020B0604020202020204" pitchFamily="34" charset="0"/>
+                <a:cs typeface="Arial" panose="020B0604020202020204" pitchFamily="34" charset="0"/>
+              </a:rPr>
+              <a:t> “El _nombre de la tabla”(“dentro de esto los atributos con sus respectivos valores </a:t>
+            </a:r>
+            <a:r>
+              <a:rPr lang="es-PE" dirty="0" err="1">
+                <a:latin typeface="Arial" panose="020B0604020202020204" pitchFamily="34" charset="0"/>
+                <a:cs typeface="Arial" panose="020B0604020202020204" pitchFamily="34" charset="0"/>
+              </a:rPr>
+              <a:t>int</a:t>
+            </a:r>
+            <a:r>
+              <a:rPr lang="es-PE" dirty="0">
+                <a:latin typeface="Arial" panose="020B0604020202020204" pitchFamily="34" charset="0"/>
+                <a:cs typeface="Arial" panose="020B0604020202020204" pitchFamily="34" charset="0"/>
+              </a:rPr>
+              <a:t>, </a:t>
+            </a:r>
+            <a:r>
+              <a:rPr lang="es-PE" dirty="0" err="1">
+                <a:latin typeface="Arial" panose="020B0604020202020204" pitchFamily="34" charset="0"/>
+                <a:cs typeface="Arial" panose="020B0604020202020204" pitchFamily="34" charset="0"/>
+              </a:rPr>
+              <a:t>varchar</a:t>
+            </a:r>
+            <a:r>
+              <a:rPr lang="es-PE" dirty="0">
+                <a:latin typeface="Arial" panose="020B0604020202020204" pitchFamily="34" charset="0"/>
+                <a:cs typeface="Arial" panose="020B0604020202020204" pitchFamily="34" charset="0"/>
+              </a:rPr>
+              <a:t> , etc.”)</a:t>
+            </a:r>
+            <a:endParaRPr lang="es-PE" dirty="0"/>
+          </a:p>
+        </p:txBody>
+      </p:sp>
+      <p:sp>
+        <p:nvSpPr>
+          <p:cNvPr id="4" name="Rectángulo 3"/>
+          <p:cNvSpPr/>
+          <p:nvPr/>
+        </p:nvSpPr>
+        <p:spPr>
+          <a:xfrm>
+            <a:off x="2038646" y="566241"/>
+            <a:ext cx="6901056" cy="923330"/>
+          </a:xfrm>
+          <a:prstGeom prst="rect">
+            <a:avLst/>
+          </a:prstGeom>
+          <a:noFill/>
+        </p:spPr>
+        <p:txBody>
+          <a:bodyPr wrap="none" lIns="91440" tIns="45720" rIns="91440" bIns="45720">
+            <a:spAutoFit/>
+          </a:bodyPr>
+          <a:lstStyle/>
+          <a:p>
+            <a:pPr algn="ctr"/>
+            <a:r>
+              <a:rPr lang="es-ES" sz="5400" b="1" dirty="0" smtClean="0">
+                <a:ln w="9525">
+                  <a:solidFill>
+                    <a:schemeClr val="bg1"/>
+                  </a:solidFill>
+                  <a:prstDash val="solid"/>
+                </a:ln>
+                <a:solidFill>
+                  <a:schemeClr val="tx1">
+                    <a:lumMod val="95000"/>
+                    <a:lumOff val="5000"/>
+                  </a:schemeClr>
+                </a:solidFill>
+                <a:effectLst>
+                  <a:outerShdw blurRad="12700" dist="38100" dir="2700000" algn="tl" rotWithShape="0">
+                    <a:schemeClr val="accent5">
+                      <a:lumMod val="60000"/>
+                      <a:lumOff val="40000"/>
+                    </a:schemeClr>
+                  </a:outerShdw>
+                </a:effectLst>
+              </a:rPr>
+              <a:t>Contenido del proyecto</a:t>
+            </a:r>
+            <a:endParaRPr lang="es-ES" sz="5400" b="1" cap="none" spc="0" dirty="0">
+              <a:ln w="9525">
+                <a:solidFill>
+                  <a:schemeClr val="bg1"/>
+                </a:solidFill>
+                <a:prstDash val="solid"/>
+              </a:ln>
+              <a:solidFill>
+                <a:schemeClr val="tx1">
+                  <a:lumMod val="95000"/>
+                  <a:lumOff val="5000"/>
+                </a:schemeClr>
+              </a:solidFill>
+              <a:effectLst>
+                <a:outerShdw blurRad="12700" dist="38100" dir="2700000" algn="tl" rotWithShape="0">
+                  <a:schemeClr val="accent5">
+                    <a:lumMod val="60000"/>
+                    <a:lumOff val="40000"/>
+                  </a:schemeClr>
+                </a:outerShdw>
+              </a:effectLst>
+            </a:endParaRPr>
+          </a:p>
+        </p:txBody>
+      </p:sp>
+    </p:spTree>
+    <p:extLst>
+      <p:ext uri="{BB962C8B-B14F-4D97-AF65-F5344CB8AC3E}">
+        <p14:creationId xmlns:p14="http://schemas.microsoft.com/office/powerpoint/2010/main" val="2992608996"/>
+      </p:ext>
+    </p:extLst>
+  </p:cSld>
+  <p:clrMapOvr>
+    <a:masterClrMapping/>
+  </p:clrMapOvr>
+</p:sld>
+</file>
+
+<file path=ppt/slides/slide8.xml><?xml version="1.0" encoding="utf-8"?>
+<p:sld xmlns:a="http://schemas.openxmlformats.org/drawingml/2006/main" xmlns:r="http://schemas.openxmlformats.org/officeDocument/2006/relationships" xmlns:p="http://schemas.openxmlformats.org/presentationml/2006/main">
+  <p:cSld>
+    <p:spTree>
+      <p:nvGrpSpPr>
+        <p:cNvPr id="1" name=""/>
+        <p:cNvGrpSpPr/>
+        <p:nvPr/>
+      </p:nvGrpSpPr>
+      <p:grpSpPr>
+        <a:xfrm>
+          <a:off x="0" y="0"/>
+          <a:ext cx="0" cy="0"/>
+          <a:chOff x="0" y="0"/>
+          <a:chExt cx="0" cy="0"/>
+        </a:xfrm>
+      </p:grpSpPr>
+      <p:sp>
+        <p:nvSpPr>
+          <p:cNvPr id="3" name="Marcador de contenido 2"/>
+          <p:cNvSpPr>
+            <a:spLocks noGrp="1"/>
+          </p:cNvSpPr>
+          <p:nvPr>
+            <p:ph idx="1"/>
+          </p:nvPr>
+        </p:nvSpPr>
+        <p:spPr>
+          <a:xfrm>
+            <a:off x="598056" y="2124363"/>
+            <a:ext cx="10515600" cy="2260744"/>
+          </a:xfrm>
+        </p:spPr>
+        <p:txBody>
+          <a:bodyPr>
+            <a:normAutofit/>
+          </a:bodyPr>
+          <a:lstStyle/>
+          <a:p>
+            <a:pPr marL="0" indent="0" algn="ctr">
+              <a:buNone/>
+            </a:pPr>
+            <a:r>
+              <a:rPr lang="es-PE" sz="6000" b="1" dirty="0" smtClean="0">
+                <a:solidFill>
+                  <a:srgbClr val="C00000"/>
+                </a:solidFill>
+              </a:rPr>
+              <a:t>GRACIAS</a:t>
+            </a:r>
+            <a:endParaRPr lang="es-ES" sz="6000" b="1" dirty="0">
+              <a:solidFill>
+                <a:srgbClr val="C00000"/>
+              </a:solidFill>
+            </a:endParaRPr>
           </a:p>
         </p:txBody>
       </p:sp>
@@ -3029,8 +6724,8 @@
         </p:blipFill>
         <p:spPr>
           <a:xfrm>
-            <a:off x="0" y="0"/>
-            <a:ext cx="12186080" cy="6858000"/>
+            <a:off x="2306587" y="4385107"/>
+            <a:ext cx="6421776" cy="1038617"/>
           </a:xfrm>
           <a:prstGeom prst="rect">
             <a:avLst/>
@@ -3040,13 +6735,20 @@
     </p:spTree>
     <p:extLst>
       <p:ext uri="{BB962C8B-B14F-4D97-AF65-F5344CB8AC3E}">
-        <p14:creationId xmlns:p14="http://schemas.microsoft.com/office/powerpoint/2010/main" val="3289308945"/>
+        <p14:creationId xmlns:p14="http://schemas.microsoft.com/office/powerpoint/2010/main" val="2488998528"/>
       </p:ext>
     </p:extLst>
   </p:cSld>
   <p:clrMapOvr>
     <a:masterClrMapping/>
   </p:clrMapOvr>
+  <p:timing>
+    <p:tnLst>
+      <p:par>
+        <p:cTn id="1" dur="indefinite" restart="never" nodeType="tmRoot"/>
+      </p:par>
+    </p:tnLst>
+  </p:timing>
 </p:sld>
 </file>
 
@@ -3309,4 +7011,265 @@
     </a:ext>
   </a:extLst>
 </a:theme>
+</file>
+
+<file path=ppt/theme/theme2.xml><?xml version="1.0" encoding="utf-8"?>
+<a:theme xmlns:a="http://schemas.openxmlformats.org/drawingml/2006/main" name="Tema de Office">
+  <a:themeElements>
+    <a:clrScheme name="Office">
+      <a:dk1>
+        <a:sysClr val="windowText" lastClr="000000"/>
+      </a:dk1>
+      <a:lt1>
+        <a:sysClr val="window" lastClr="FFFFFF"/>
+      </a:lt1>
+      <a:dk2>
+        <a:srgbClr val="44546A"/>
+      </a:dk2>
+      <a:lt2>
+        <a:srgbClr val="E7E6E6"/>
+      </a:lt2>
+      <a:accent1>
+        <a:srgbClr val="5B9BD5"/>
+      </a:accent1>
+      <a:accent2>
+        <a:srgbClr val="ED7D31"/>
+      </a:accent2>
+      <a:accent3>
+        <a:srgbClr val="A5A5A5"/>
+      </a:accent3>
+      <a:accent4>
+        <a:srgbClr val="FFC000"/>
+      </a:accent4>
+      <a:accent5>
+        <a:srgbClr val="4472C4"/>
+      </a:accent5>
+      <a:accent6>
+        <a:srgbClr val="70AD47"/>
+      </a:accent6>
+      <a:hlink>
+        <a:srgbClr val="0563C1"/>
+      </a:hlink>
+      <a:folHlink>
+        <a:srgbClr val="954F72"/>
+      </a:folHlink>
+    </a:clrScheme>
+    <a:fontScheme name="Office">
+      <a:majorFont>
+        <a:latin typeface="Calibri Light" panose="020F0302020204030204"/>
+        <a:ea typeface=""/>
+        <a:cs typeface=""/>
+        <a:font script="Jpan" typeface="ＭＳ Ｐゴシック"/>
+        <a:font script="Hang" typeface="맑은 고딕"/>
+        <a:font script="Hans" typeface="宋体"/>
+        <a:font script="Hant" typeface="新細明體"/>
+        <a:font script="Arab" typeface="Times New Roman"/>
+        <a:font script="Hebr" typeface="Times New Roman"/>
+        <a:font script="Thai" typeface="Angsana New"/>
+        <a:font script="Ethi" typeface="Nyala"/>
+        <a:font script="Beng" typeface="Vrinda"/>
+        <a:font script="Gujr" typeface="Shruti"/>
+        <a:font script="Khmr" typeface="MoolBoran"/>
+        <a:font script="Knda" typeface="Tunga"/>
+        <a:font script="Guru" typeface="Raavi"/>
+        <a:font script="Cans" typeface="Euphemia"/>
+        <a:font script="Cher" typeface="Plantagenet Cherokee"/>
+        <a:font script="Yiii" typeface="Microsoft Yi Baiti"/>
+        <a:font script="Tibt" typeface="Microsoft Himalaya"/>
+        <a:font script="Thaa" typeface="MV Boli"/>
+        <a:font script="Deva" typeface="Mangal"/>
+        <a:font script="Telu" typeface="Gautami"/>
+        <a:font script="Taml" typeface="Latha"/>
+        <a:font script="Syrc" typeface="Estrangelo Edessa"/>
+        <a:font script="Orya" typeface="Kalinga"/>
+        <a:font script="Mlym" typeface="Kartika"/>
+        <a:font script="Laoo" typeface="DokChampa"/>
+        <a:font script="Sinh" typeface="Iskoola Pota"/>
+        <a:font script="Mong" typeface="Mongolian Baiti"/>
+        <a:font script="Viet" typeface="Times New Roman"/>
+        <a:font script="Uigh" typeface="Microsoft Uighur"/>
+        <a:font script="Geor" typeface="Sylfaen"/>
+      </a:majorFont>
+      <a:minorFont>
+        <a:latin typeface="Calibri" panose="020F0502020204030204"/>
+        <a:ea typeface=""/>
+        <a:cs typeface=""/>
+        <a:font script="Jpan" typeface="ＭＳ Ｐゴシック"/>
+        <a:font script="Hang" typeface="맑은 고딕"/>
+        <a:font script="Hans" typeface="宋体"/>
+        <a:font script="Hant" typeface="新細明體"/>
+        <a:font script="Arab" typeface="Arial"/>
+        <a:font script="Hebr" typeface="Arial"/>
+        <a:font script="Thai" typeface="Cordia New"/>
+        <a:font script="Ethi" typeface="Nyala"/>
+        <a:font script="Beng" typeface="Vrinda"/>
+        <a:font script="Gujr" typeface="Shruti"/>
+        <a:font script="Khmr" typeface="DaunPenh"/>
+        <a:font script="Knda" typeface="Tunga"/>
+        <a:font script="Guru" typeface="Raavi"/>
+        <a:font script="Cans" typeface="Euphemia"/>
+        <a:font script="Cher" typeface="Plantagenet Cherokee"/>
+        <a:font script="Yiii" typeface="Microsoft Yi Baiti"/>
+        <a:font script="Tibt" typeface="Microsoft Himalaya"/>
+        <a:font script="Thaa" typeface="MV Boli"/>
+        <a:font script="Deva" typeface="Mangal"/>
+        <a:font script="Telu" typeface="Gautami"/>
+        <a:font script="Taml" typeface="Latha"/>
+        <a:font script="Syrc" typeface="Estrangelo Edessa"/>
+        <a:font script="Orya" typeface="Kalinga"/>
+        <a:font script="Mlym" typeface="Kartika"/>
+        <a:font script="Laoo" typeface="DokChampa"/>
+        <a:font script="Sinh" typeface="Iskoola Pota"/>
+        <a:font script="Mong" typeface="Mongolian Baiti"/>
+        <a:font script="Viet" typeface="Arial"/>
+        <a:font script="Uigh" typeface="Microsoft Uighur"/>
+        <a:font script="Geor" typeface="Sylfaen"/>
+      </a:minorFont>
+    </a:fontScheme>
+    <a:fmtScheme name="Office">
+      <a:fillStyleLst>
+        <a:solidFill>
+          <a:schemeClr val="phClr"/>
+        </a:solidFill>
+        <a:gradFill rotWithShape="1">
+          <a:gsLst>
+            <a:gs pos="0">
+              <a:schemeClr val="phClr">
+                <a:lumMod val="110000"/>
+                <a:satMod val="105000"/>
+                <a:tint val="67000"/>
+              </a:schemeClr>
+            </a:gs>
+            <a:gs pos="50000">
+              <a:schemeClr val="phClr">
+                <a:lumMod val="105000"/>
+                <a:satMod val="103000"/>
+                <a:tint val="73000"/>
+              </a:schemeClr>
+            </a:gs>
+            <a:gs pos="100000">
+              <a:schemeClr val="phClr">
+                <a:lumMod val="105000"/>
+                <a:satMod val="109000"/>
+                <a:tint val="81000"/>
+              </a:schemeClr>
+            </a:gs>
+          </a:gsLst>
+          <a:lin ang="5400000" scaled="0"/>
+        </a:gradFill>
+        <a:gradFill rotWithShape="1">
+          <a:gsLst>
+            <a:gs pos="0">
+              <a:schemeClr val="phClr">
+                <a:satMod val="103000"/>
+                <a:lumMod val="102000"/>
+                <a:tint val="94000"/>
+              </a:schemeClr>
+            </a:gs>
+            <a:gs pos="50000">
+              <a:schemeClr val="phClr">
+                <a:satMod val="110000"/>
+                <a:lumMod val="100000"/>
+                <a:shade val="100000"/>
+              </a:schemeClr>
+            </a:gs>
+            <a:gs pos="100000">
+              <a:schemeClr val="phClr">
+                <a:lumMod val="99000"/>
+                <a:satMod val="120000"/>
+                <a:shade val="78000"/>
+              </a:schemeClr>
+            </a:gs>
+          </a:gsLst>
+          <a:lin ang="5400000" scaled="0"/>
+        </a:gradFill>
+      </a:fillStyleLst>
+      <a:lnStyleLst>
+        <a:ln w="6350" cap="flat" cmpd="sng" algn="ctr">
+          <a:solidFill>
+            <a:schemeClr val="phClr"/>
+          </a:solidFill>
+          <a:prstDash val="solid"/>
+          <a:miter lim="800000"/>
+        </a:ln>
+        <a:ln w="12700" cap="flat" cmpd="sng" algn="ctr">
+          <a:solidFill>
+            <a:schemeClr val="phClr"/>
+          </a:solidFill>
+          <a:prstDash val="solid"/>
+          <a:miter lim="800000"/>
+        </a:ln>
+        <a:ln w="19050" cap="flat" cmpd="sng" algn="ctr">
+          <a:solidFill>
+            <a:schemeClr val="phClr"/>
+          </a:solidFill>
+          <a:prstDash val="solid"/>
+          <a:miter lim="800000"/>
+        </a:ln>
+      </a:lnStyleLst>
+      <a:effectStyleLst>
+        <a:effectStyle>
+          <a:effectLst/>
+        </a:effectStyle>
+        <a:effectStyle>
+          <a:effectLst/>
+        </a:effectStyle>
+        <a:effectStyle>
+          <a:effectLst>
+            <a:outerShdw blurRad="57150" dist="19050" dir="5400000" algn="ctr" rotWithShape="0">
+              <a:srgbClr val="000000">
+                <a:alpha val="63000"/>
+              </a:srgbClr>
+            </a:outerShdw>
+          </a:effectLst>
+        </a:effectStyle>
+      </a:effectStyleLst>
+      <a:bgFillStyleLst>
+        <a:solidFill>
+          <a:schemeClr val="phClr"/>
+        </a:solidFill>
+        <a:solidFill>
+          <a:schemeClr val="phClr">
+            <a:tint val="95000"/>
+            <a:satMod val="170000"/>
+          </a:schemeClr>
+        </a:solidFill>
+        <a:gradFill rotWithShape="1">
+          <a:gsLst>
+            <a:gs pos="0">
+              <a:schemeClr val="phClr">
+                <a:tint val="93000"/>
+                <a:satMod val="150000"/>
+                <a:shade val="98000"/>
+                <a:lumMod val="102000"/>
+              </a:schemeClr>
+            </a:gs>
+            <a:gs pos="50000">
+              <a:schemeClr val="phClr">
+                <a:tint val="98000"/>
+                <a:satMod val="130000"/>
+                <a:shade val="90000"/>
+                <a:lumMod val="103000"/>
+              </a:schemeClr>
+            </a:gs>
+            <a:gs pos="100000">
+              <a:schemeClr val="phClr">
+                <a:shade val="63000"/>
+                <a:satMod val="120000"/>
+              </a:schemeClr>
+            </a:gs>
+          </a:gsLst>
+          <a:lin ang="5400000" scaled="0"/>
+        </a:gradFill>
+      </a:bgFillStyleLst>
+    </a:fmtScheme>
+  </a:themeElements>
+  <a:objectDefaults/>
+  <a:extraClrSchemeLst/>
+  <a:extLst>
+    <a:ext uri="{05A4C25C-085E-4340-85A3-A5531E510DB2}">
+      <thm15:themeFamily xmlns:thm15="http://schemas.microsoft.com/office/thememl/2012/main" name="Office Theme" id="{62F939B6-93AF-4DB8-9C6B-D6C7DFDC589F}" vid="{4A3C46E8-61CC-4603-A589-7422A47A8E4A}"/>
+    </a:ext>
+  </a:extLst>
+</a:theme>
 </file>
</xml_diff>